<commit_message>
Quick cosmetic updates to slides
</commit_message>
<xml_diff>
--- a/Proj_presentation.pptx
+++ b/Proj_presentation.pptx
@@ -146,12 +146,9 @@
           <a:lstStyle/>
           <a:p>
             <a:pPr>
-              <a:defRPr sz="1400" b="0" i="0" u="none" strike="noStrike" kern="1200" spc="0" baseline="0">
+              <a:defRPr sz="2000" b="1" i="0" u="none" strike="noStrike" kern="1200" spc="0" baseline="0">
                 <a:solidFill>
-                  <a:schemeClr val="tx1">
-                    <a:lumMod val="65000"/>
-                    <a:lumOff val="35000"/>
-                  </a:schemeClr>
+                  <a:schemeClr val="tx1"/>
                 </a:solidFill>
                 <a:latin typeface="+mn-lt"/>
                 <a:ea typeface="+mn-ea"/>
@@ -159,23 +156,43 @@
               </a:defRPr>
             </a:pPr>
             <a:r>
-              <a:rPr lang="en-US"/>
+              <a:rPr lang="en-US" sz="2000" b="1">
+                <a:solidFill>
+                  <a:schemeClr val="tx1"/>
+                </a:solidFill>
+              </a:rPr>
               <a:t>WSL Test Run</a:t>
             </a:r>
           </a:p>
           <a:p>
             <a:pPr>
-              <a:defRPr/>
+              <a:defRPr sz="2000" b="1">
+                <a:solidFill>
+                  <a:schemeClr val="tx1"/>
+                </a:solidFill>
+              </a:defRPr>
             </a:pPr>
             <a:r>
-              <a:rPr lang="en-US"/>
+              <a:rPr lang="en-US" sz="2000" b="1">
+                <a:solidFill>
+                  <a:schemeClr val="tx1"/>
+                </a:solidFill>
+              </a:rPr>
               <a:t>Times</a:t>
             </a:r>
             <a:r>
-              <a:rPr lang="en-US" baseline="0"/>
+              <a:rPr lang="en-US" sz="2000" b="1" baseline="0">
+                <a:solidFill>
+                  <a:schemeClr val="tx1"/>
+                </a:solidFill>
+              </a:rPr>
               <a:t> in seconds</a:t>
             </a:r>
-            <a:endParaRPr lang="en-US"/>
+            <a:endParaRPr lang="en-US" sz="2000" b="1">
+              <a:solidFill>
+                <a:schemeClr val="tx1"/>
+              </a:solidFill>
+            </a:endParaRPr>
           </a:p>
         </c:rich>
       </c:tx>
@@ -192,12 +209,9 @@
         <a:lstStyle/>
         <a:p>
           <a:pPr>
-            <a:defRPr sz="1400" b="0" i="0" u="none" strike="noStrike" kern="1200" spc="0" baseline="0">
+            <a:defRPr sz="2000" b="1" i="0" u="none" strike="noStrike" kern="1200" spc="0" baseline="0">
               <a:solidFill>
-                <a:schemeClr val="tx1">
-                  <a:lumMod val="65000"/>
-                  <a:lumOff val="35000"/>
-                </a:schemeClr>
+                <a:schemeClr val="tx1"/>
               </a:solidFill>
               <a:latin typeface="+mn-lt"/>
               <a:ea typeface="+mn-ea"/>
@@ -751,12 +765,9 @@
           <a:lstStyle/>
           <a:p>
             <a:pPr>
-              <a:defRPr sz="1050" b="0" i="0" u="none" strike="noStrike" kern="1200" baseline="0">
+              <a:defRPr sz="1400" b="0" i="0" u="none" strike="noStrike" kern="1200" baseline="0">
                 <a:solidFill>
-                  <a:schemeClr val="tx1">
-                    <a:lumMod val="65000"/>
-                    <a:lumOff val="35000"/>
-                  </a:schemeClr>
+                  <a:schemeClr val="tx1"/>
                 </a:solidFill>
                 <a:latin typeface="+mn-lt"/>
                 <a:ea typeface="+mn-ea"/>
@@ -810,12 +821,9 @@
           <a:lstStyle/>
           <a:p>
             <a:pPr>
-              <a:defRPr sz="900" b="0" i="0" u="none" strike="noStrike" kern="1200" baseline="0">
+              <a:defRPr sz="1400" b="0" i="0" u="none" strike="noStrike" kern="1200" baseline="0">
                 <a:solidFill>
-                  <a:schemeClr val="tx1">
-                    <a:lumMod val="65000"/>
-                    <a:lumOff val="35000"/>
-                  </a:schemeClr>
+                  <a:schemeClr val="tx1"/>
                 </a:solidFill>
                 <a:latin typeface="+mn-lt"/>
                 <a:ea typeface="+mn-ea"/>
@@ -846,12 +854,9 @@
           <a:lstStyle/>
           <a:p>
             <a:pPr>
-              <a:defRPr sz="1100" b="0" i="0" u="none" strike="noStrike" kern="1200" baseline="0">
+              <a:defRPr sz="1400" b="0" i="0" u="none" strike="noStrike" kern="1200" baseline="0">
                 <a:solidFill>
-                  <a:schemeClr val="tx1">
-                    <a:lumMod val="65000"/>
-                    <a:lumOff val="35000"/>
-                  </a:schemeClr>
+                  <a:schemeClr val="tx1"/>
                 </a:solidFill>
                 <a:latin typeface="+mn-lt"/>
                 <a:ea typeface="+mn-ea"/>
@@ -869,12 +874,9 @@
           <a:lstStyle/>
           <a:p>
             <a:pPr>
-              <a:defRPr sz="1100" b="0" i="0" u="none" strike="noStrike" kern="1200" baseline="0">
+              <a:defRPr sz="1400" b="0" i="0" u="none" strike="noStrike" kern="1200" baseline="0">
                 <a:solidFill>
-                  <a:schemeClr val="tx1">
-                    <a:lumMod val="65000"/>
-                    <a:lumOff val="35000"/>
-                  </a:schemeClr>
+                  <a:schemeClr val="tx1"/>
                 </a:solidFill>
                 <a:latin typeface="+mn-lt"/>
                 <a:ea typeface="+mn-ea"/>
@@ -892,12 +894,9 @@
           <a:lstStyle/>
           <a:p>
             <a:pPr>
-              <a:defRPr sz="1100" b="0" i="0" u="none" strike="noStrike" kern="1200" baseline="0">
+              <a:defRPr sz="1400" b="0" i="0" u="none" strike="noStrike" kern="1200" baseline="0">
                 <a:solidFill>
-                  <a:schemeClr val="tx1">
-                    <a:lumMod val="65000"/>
-                    <a:lumOff val="35000"/>
-                  </a:schemeClr>
+                  <a:schemeClr val="tx1"/>
                 </a:solidFill>
                 <a:latin typeface="+mn-lt"/>
                 <a:ea typeface="+mn-ea"/>
@@ -915,12 +914,9 @@
           <a:lstStyle/>
           <a:p>
             <a:pPr>
-              <a:defRPr sz="1100" b="0" i="0" u="none" strike="noStrike" kern="1200" baseline="0">
+              <a:defRPr sz="1400" b="0" i="0" u="none" strike="noStrike" kern="1200" baseline="0">
                 <a:solidFill>
-                  <a:schemeClr val="tx1">
-                    <a:lumMod val="65000"/>
-                    <a:lumOff val="35000"/>
-                  </a:schemeClr>
+                  <a:schemeClr val="tx1"/>
                 </a:solidFill>
                 <a:latin typeface="+mn-lt"/>
                 <a:ea typeface="+mn-ea"/>
@@ -938,12 +934,9 @@
           <a:lstStyle/>
           <a:p>
             <a:pPr>
-              <a:defRPr sz="1100" b="0" i="0" u="none" strike="noStrike" kern="1200" baseline="0">
+              <a:defRPr sz="1400" b="0" i="0" u="none" strike="noStrike" kern="1200" baseline="0">
                 <a:solidFill>
-                  <a:schemeClr val="tx1">
-                    <a:lumMod val="65000"/>
-                    <a:lumOff val="35000"/>
-                  </a:schemeClr>
+                  <a:schemeClr val="tx1"/>
                 </a:solidFill>
                 <a:latin typeface="+mn-lt"/>
                 <a:ea typeface="+mn-ea"/>
@@ -967,12 +960,9 @@
         <a:lstStyle/>
         <a:p>
           <a:pPr>
-            <a:defRPr sz="900" b="0" i="0" u="none" strike="noStrike" kern="1200" baseline="0">
+            <a:defRPr sz="1400" b="0" i="0" u="none" strike="noStrike" kern="1200" baseline="0">
               <a:solidFill>
-                <a:schemeClr val="tx1">
-                  <a:lumMod val="65000"/>
-                  <a:lumOff val="35000"/>
-                </a:schemeClr>
+                <a:schemeClr val="tx1"/>
               </a:solidFill>
               <a:latin typeface="+mn-lt"/>
               <a:ea typeface="+mn-ea"/>
@@ -1038,12 +1028,9 @@
           <a:lstStyle/>
           <a:p>
             <a:pPr>
-              <a:defRPr sz="1400" b="0" i="0" u="none" strike="noStrike" kern="1200" spc="0" baseline="0">
+              <a:defRPr sz="2000" b="1" i="0" u="none" strike="noStrike" kern="1200" spc="0" baseline="0">
                 <a:solidFill>
-                  <a:schemeClr val="tx1">
-                    <a:lumMod val="65000"/>
-                    <a:lumOff val="35000"/>
-                  </a:schemeClr>
+                  <a:schemeClr val="tx1"/>
                 </a:solidFill>
                 <a:latin typeface="+mn-lt"/>
                 <a:ea typeface="+mn-ea"/>
@@ -1051,23 +1038,43 @@
               </a:defRPr>
             </a:pPr>
             <a:r>
-              <a:rPr lang="en-US"/>
+              <a:rPr lang="en-US" sz="2000" b="1">
+                <a:solidFill>
+                  <a:schemeClr val="tx1"/>
+                </a:solidFill>
+              </a:rPr>
               <a:t>T2</a:t>
             </a:r>
             <a:r>
-              <a:rPr lang="en-US" baseline="0"/>
+              <a:rPr lang="en-US" sz="2000" b="1" baseline="0">
+                <a:solidFill>
+                  <a:schemeClr val="tx1"/>
+                </a:solidFill>
+              </a:rPr>
               <a:t> Micro</a:t>
             </a:r>
           </a:p>
           <a:p>
             <a:pPr>
-              <a:defRPr/>
+              <a:defRPr sz="2000" b="1">
+                <a:solidFill>
+                  <a:schemeClr val="tx1"/>
+                </a:solidFill>
+              </a:defRPr>
             </a:pPr>
             <a:r>
-              <a:rPr lang="en-US" baseline="0"/>
+              <a:rPr lang="en-US" sz="2000" b="1" baseline="0">
+                <a:solidFill>
+                  <a:schemeClr val="tx1"/>
+                </a:solidFill>
+              </a:rPr>
               <a:t>Times in Seconds</a:t>
             </a:r>
-            <a:endParaRPr lang="en-US"/>
+            <a:endParaRPr lang="en-US" sz="2000" b="1">
+              <a:solidFill>
+                <a:schemeClr val="tx1"/>
+              </a:solidFill>
+            </a:endParaRPr>
           </a:p>
         </c:rich>
       </c:tx>
@@ -1084,12 +1091,9 @@
         <a:lstStyle/>
         <a:p>
           <a:pPr>
-            <a:defRPr sz="1400" b="0" i="0" u="none" strike="noStrike" kern="1200" spc="0" baseline="0">
+            <a:defRPr sz="2000" b="1" i="0" u="none" strike="noStrike" kern="1200" spc="0" baseline="0">
               <a:solidFill>
-                <a:schemeClr val="tx1">
-                  <a:lumMod val="65000"/>
-                  <a:lumOff val="35000"/>
-                </a:schemeClr>
+                <a:schemeClr val="tx1"/>
               </a:solidFill>
               <a:latin typeface="+mn-lt"/>
               <a:ea typeface="+mn-ea"/>
@@ -1643,12 +1647,9 @@
           <a:lstStyle/>
           <a:p>
             <a:pPr>
-              <a:defRPr sz="1050" b="0" i="0" u="none" strike="noStrike" kern="1200" baseline="0">
+              <a:defRPr sz="1400" b="0" i="0" u="none" strike="noStrike" kern="1200" baseline="0">
                 <a:solidFill>
-                  <a:schemeClr val="tx1">
-                    <a:lumMod val="65000"/>
-                    <a:lumOff val="35000"/>
-                  </a:schemeClr>
+                  <a:schemeClr val="tx1"/>
                 </a:solidFill>
                 <a:latin typeface="+mn-lt"/>
                 <a:ea typeface="+mn-ea"/>
@@ -1702,12 +1703,9 @@
           <a:lstStyle/>
           <a:p>
             <a:pPr>
-              <a:defRPr sz="900" b="0" i="0" u="none" strike="noStrike" kern="1200" baseline="0">
+              <a:defRPr sz="1400" b="0" i="0" u="none" strike="noStrike" kern="1200" baseline="0">
                 <a:solidFill>
-                  <a:schemeClr val="tx1">
-                    <a:lumMod val="65000"/>
-                    <a:lumOff val="35000"/>
-                  </a:schemeClr>
+                  <a:schemeClr val="tx1"/>
                 </a:solidFill>
                 <a:latin typeface="+mn-lt"/>
                 <a:ea typeface="+mn-ea"/>
@@ -1738,12 +1736,9 @@
           <a:lstStyle/>
           <a:p>
             <a:pPr>
-              <a:defRPr sz="1100" b="0" i="0" u="none" strike="noStrike" kern="1200" baseline="0">
+              <a:defRPr sz="1400" b="0" i="0" u="none" strike="noStrike" kern="1200" baseline="0">
                 <a:solidFill>
-                  <a:schemeClr val="tx1">
-                    <a:lumMod val="65000"/>
-                    <a:lumOff val="35000"/>
-                  </a:schemeClr>
+                  <a:schemeClr val="tx1"/>
                 </a:solidFill>
                 <a:latin typeface="+mn-lt"/>
                 <a:ea typeface="+mn-ea"/>
@@ -1761,12 +1756,9 @@
           <a:lstStyle/>
           <a:p>
             <a:pPr>
-              <a:defRPr sz="1100" b="0" i="0" u="none" strike="noStrike" kern="1200" baseline="0">
+              <a:defRPr sz="1400" b="0" i="0" u="none" strike="noStrike" kern="1200" baseline="0">
                 <a:solidFill>
-                  <a:schemeClr val="tx1">
-                    <a:lumMod val="65000"/>
-                    <a:lumOff val="35000"/>
-                  </a:schemeClr>
+                  <a:schemeClr val="tx1"/>
                 </a:solidFill>
                 <a:latin typeface="+mn-lt"/>
                 <a:ea typeface="+mn-ea"/>
@@ -1784,12 +1776,9 @@
           <a:lstStyle/>
           <a:p>
             <a:pPr>
-              <a:defRPr sz="1100" b="0" i="0" u="none" strike="noStrike" kern="1200" baseline="0">
+              <a:defRPr sz="1400" b="0" i="0" u="none" strike="noStrike" kern="1200" baseline="0">
                 <a:solidFill>
-                  <a:schemeClr val="tx1">
-                    <a:lumMod val="65000"/>
-                    <a:lumOff val="35000"/>
-                  </a:schemeClr>
+                  <a:schemeClr val="tx1"/>
                 </a:solidFill>
                 <a:latin typeface="+mn-lt"/>
                 <a:ea typeface="+mn-ea"/>
@@ -1807,12 +1796,9 @@
           <a:lstStyle/>
           <a:p>
             <a:pPr>
-              <a:defRPr sz="1100" b="0" i="0" u="none" strike="noStrike" kern="1200" baseline="0">
+              <a:defRPr sz="1400" b="0" i="0" u="none" strike="noStrike" kern="1200" baseline="0">
                 <a:solidFill>
-                  <a:schemeClr val="tx1">
-                    <a:lumMod val="65000"/>
-                    <a:lumOff val="35000"/>
-                  </a:schemeClr>
+                  <a:schemeClr val="tx1"/>
                 </a:solidFill>
                 <a:latin typeface="+mn-lt"/>
                 <a:ea typeface="+mn-ea"/>
@@ -1830,12 +1816,9 @@
           <a:lstStyle/>
           <a:p>
             <a:pPr>
-              <a:defRPr sz="1100" b="0" i="0" u="none" strike="noStrike" kern="1200" baseline="0">
+              <a:defRPr sz="1400" b="0" i="0" u="none" strike="noStrike" kern="1200" baseline="0">
                 <a:solidFill>
-                  <a:schemeClr val="tx1">
-                    <a:lumMod val="65000"/>
-                    <a:lumOff val="35000"/>
-                  </a:schemeClr>
+                  <a:schemeClr val="tx1"/>
                 </a:solidFill>
                 <a:latin typeface="+mn-lt"/>
                 <a:ea typeface="+mn-ea"/>
@@ -1859,12 +1842,9 @@
         <a:lstStyle/>
         <a:p>
           <a:pPr>
-            <a:defRPr sz="900" b="0" i="0" u="none" strike="noStrike" kern="1200" baseline="0">
+            <a:defRPr sz="1400" b="0" i="0" u="none" strike="noStrike" kern="1200" baseline="0">
               <a:solidFill>
-                <a:schemeClr val="tx1">
-                  <a:lumMod val="65000"/>
-                  <a:lumOff val="35000"/>
-                </a:schemeClr>
+                <a:schemeClr val="tx1"/>
               </a:solidFill>
               <a:latin typeface="+mn-lt"/>
               <a:ea typeface="+mn-ea"/>
@@ -1930,27 +1910,28 @@
           <a:lstStyle/>
           <a:p>
             <a:pPr>
-              <a:defRPr sz="1400" b="0" i="0" u="none" strike="noStrike" kern="1200" spc="0" baseline="0">
+              <a:defRPr sz="2400" b="1" i="0" u="none" strike="noStrike" kern="1200" spc="100" baseline="0">
                 <a:solidFill>
-                  <a:schemeClr val="tx1">
-                    <a:lumMod val="65000"/>
-                    <a:lumOff val="35000"/>
+                  <a:schemeClr val="lt1">
+                    <a:lumMod val="95000"/>
                   </a:schemeClr>
                 </a:solidFill>
+                <a:effectLst>
+                  <a:outerShdw blurRad="50800" dist="38100" dir="5400000" algn="t" rotWithShape="0">
+                    <a:prstClr val="black">
+                      <a:alpha val="40000"/>
+                    </a:prstClr>
+                  </a:outerShdw>
+                </a:effectLst>
                 <a:latin typeface="+mn-lt"/>
                 <a:ea typeface="+mn-ea"/>
                 <a:cs typeface="+mn-cs"/>
               </a:defRPr>
             </a:pPr>
             <a:r>
-              <a:rPr lang="en-US"/>
-              <a:t>Processing</a:t>
+              <a:rPr lang="en-US" sz="2400"/>
+              <a:t>Processing Time To Build Dictionary</a:t>
             </a:r>
-            <a:r>
-              <a:rPr lang="en-US" baseline="0"/>
-              <a:t> Time To Build Dictionary</a:t>
-            </a:r>
-            <a:endParaRPr lang="en-US"/>
           </a:p>
         </c:rich>
       </c:tx>
@@ -1967,13 +1948,19 @@
         <a:lstStyle/>
         <a:p>
           <a:pPr>
-            <a:defRPr sz="1400" b="0" i="0" u="none" strike="noStrike" kern="1200" spc="0" baseline="0">
+            <a:defRPr sz="2400" b="1" i="0" u="none" strike="noStrike" kern="1200" spc="100" baseline="0">
               <a:solidFill>
-                <a:schemeClr val="tx1">
-                  <a:lumMod val="65000"/>
-                  <a:lumOff val="35000"/>
+                <a:schemeClr val="lt1">
+                  <a:lumMod val="95000"/>
                 </a:schemeClr>
               </a:solidFill>
+              <a:effectLst>
+                <a:outerShdw blurRad="50800" dist="38100" dir="5400000" algn="t" rotWithShape="0">
+                  <a:prstClr val="black">
+                    <a:alpha val="40000"/>
+                  </a:prstClr>
+                </a:outerShdw>
+              </a:effectLst>
               <a:latin typeface="+mn-lt"/>
               <a:ea typeface="+mn-ea"/>
               <a:cs typeface="+mn-cs"/>
@@ -2005,13 +1992,42 @@
             </c:strRef>
           </c:tx>
           <c:spPr>
-            <a:solidFill>
-              <a:schemeClr val="accent1"/>
-            </a:solidFill>
+            <a:gradFill rotWithShape="1">
+              <a:gsLst>
+                <a:gs pos="0">
+                  <a:schemeClr val="accent1">
+                    <a:satMod val="103000"/>
+                    <a:lumMod val="102000"/>
+                    <a:tint val="94000"/>
+                  </a:schemeClr>
+                </a:gs>
+                <a:gs pos="50000">
+                  <a:schemeClr val="accent1">
+                    <a:satMod val="110000"/>
+                    <a:lumMod val="100000"/>
+                    <a:shade val="100000"/>
+                  </a:schemeClr>
+                </a:gs>
+                <a:gs pos="100000">
+                  <a:schemeClr val="accent1">
+                    <a:lumMod val="99000"/>
+                    <a:satMod val="120000"/>
+                    <a:shade val="78000"/>
+                  </a:schemeClr>
+                </a:gs>
+              </a:gsLst>
+              <a:lin ang="5400000" scaled="0"/>
+            </a:gradFill>
             <a:ln>
               <a:noFill/>
             </a:ln>
-            <a:effectLst/>
+            <a:effectLst>
+              <a:outerShdw blurRad="57150" dist="19050" dir="5400000" algn="ctr" rotWithShape="0">
+                <a:srgbClr val="000000">
+                  <a:alpha val="63000"/>
+                </a:srgbClr>
+              </a:outerShdw>
+            </a:effectLst>
           </c:spPr>
           <c:invertIfNegative val="0"/>
           <c:cat>
@@ -2071,13 +2087,42 @@
             </c:strRef>
           </c:tx>
           <c:spPr>
-            <a:solidFill>
-              <a:schemeClr val="accent2"/>
-            </a:solidFill>
+            <a:gradFill rotWithShape="1">
+              <a:gsLst>
+                <a:gs pos="0">
+                  <a:schemeClr val="accent2">
+                    <a:satMod val="103000"/>
+                    <a:lumMod val="102000"/>
+                    <a:tint val="94000"/>
+                  </a:schemeClr>
+                </a:gs>
+                <a:gs pos="50000">
+                  <a:schemeClr val="accent2">
+                    <a:satMod val="110000"/>
+                    <a:lumMod val="100000"/>
+                    <a:shade val="100000"/>
+                  </a:schemeClr>
+                </a:gs>
+                <a:gs pos="100000">
+                  <a:schemeClr val="accent2">
+                    <a:lumMod val="99000"/>
+                    <a:satMod val="120000"/>
+                    <a:shade val="78000"/>
+                  </a:schemeClr>
+                </a:gs>
+              </a:gsLst>
+              <a:lin ang="5400000" scaled="0"/>
+            </a:gradFill>
             <a:ln>
               <a:noFill/>
             </a:ln>
-            <a:effectLst/>
+            <a:effectLst>
+              <a:outerShdw blurRad="57150" dist="19050" dir="5400000" algn="ctr" rotWithShape="0">
+                <a:srgbClr val="000000">
+                  <a:alpha val="63000"/>
+                </a:srgbClr>
+              </a:outerShdw>
+            </a:effectLst>
           </c:spPr>
           <c:invertIfNegative val="0"/>
           <c:cat>
@@ -2137,13 +2182,42 @@
             </c:strRef>
           </c:tx>
           <c:spPr>
-            <a:solidFill>
-              <a:schemeClr val="accent3"/>
-            </a:solidFill>
+            <a:gradFill rotWithShape="1">
+              <a:gsLst>
+                <a:gs pos="0">
+                  <a:schemeClr val="accent3">
+                    <a:satMod val="103000"/>
+                    <a:lumMod val="102000"/>
+                    <a:tint val="94000"/>
+                  </a:schemeClr>
+                </a:gs>
+                <a:gs pos="50000">
+                  <a:schemeClr val="accent3">
+                    <a:satMod val="110000"/>
+                    <a:lumMod val="100000"/>
+                    <a:shade val="100000"/>
+                  </a:schemeClr>
+                </a:gs>
+                <a:gs pos="100000">
+                  <a:schemeClr val="accent3">
+                    <a:lumMod val="99000"/>
+                    <a:satMod val="120000"/>
+                    <a:shade val="78000"/>
+                  </a:schemeClr>
+                </a:gs>
+              </a:gsLst>
+              <a:lin ang="5400000" scaled="0"/>
+            </a:gradFill>
             <a:ln>
               <a:noFill/>
             </a:ln>
-            <a:effectLst/>
+            <a:effectLst>
+              <a:outerShdw blurRad="57150" dist="19050" dir="5400000" algn="ctr" rotWithShape="0">
+                <a:srgbClr val="000000">
+                  <a:alpha val="63000"/>
+                </a:srgbClr>
+              </a:outerShdw>
+            </a:effectLst>
           </c:spPr>
           <c:invertIfNegative val="0"/>
           <c:cat>
@@ -2196,7 +2270,8 @@
           <c:showPercent val="0"/>
           <c:showBubbleSize val="0"/>
         </c:dLbls>
-        <c:gapWidth val="219"/>
+        <c:gapWidth val="100"/>
+        <c:overlap val="-24"/>
         <c:axId val="679547096"/>
         <c:axId val="679547456"/>
       </c:barChart>
@@ -2213,11 +2288,11 @@
         <c:tickLblPos val="nextTo"/>
         <c:spPr>
           <a:noFill/>
-          <a:ln w="9525" cap="flat" cmpd="sng" algn="ctr">
+          <a:ln w="12700" cap="flat" cmpd="sng" algn="ctr">
             <a:solidFill>
-              <a:schemeClr val="tx1">
-                <a:lumMod val="15000"/>
-                <a:lumOff val="85000"/>
+              <a:schemeClr val="lt1">
+                <a:lumMod val="95000"/>
+                <a:alpha val="54000"/>
               </a:schemeClr>
             </a:solidFill>
             <a:round/>
@@ -2229,11 +2304,10 @@
           <a:lstStyle/>
           <a:p>
             <a:pPr>
-              <a:defRPr sz="1100" b="0" i="0" u="none" strike="noStrike" kern="1200" baseline="0">
+              <a:defRPr sz="1400" b="0" i="0" u="none" strike="noStrike" kern="1200" baseline="0">
                 <a:solidFill>
-                  <a:schemeClr val="tx1">
-                    <a:lumMod val="65000"/>
-                    <a:lumOff val="35000"/>
+                  <a:schemeClr val="lt1">
+                    <a:lumMod val="85000"/>
                   </a:schemeClr>
                 </a:solidFill>
                 <a:latin typeface="+mn-lt"/>
@@ -2262,9 +2336,9 @@
           <c:spPr>
             <a:ln w="9525" cap="flat" cmpd="sng" algn="ctr">
               <a:solidFill>
-                <a:schemeClr val="tx1">
-                  <a:lumMod val="15000"/>
-                  <a:lumOff val="85000"/>
+                <a:schemeClr val="lt1">
+                  <a:lumMod val="95000"/>
+                  <a:alpha val="10000"/>
                 </a:schemeClr>
               </a:solidFill>
               <a:round/>
@@ -2288,11 +2362,10 @@
           <a:lstStyle/>
           <a:p>
             <a:pPr>
-              <a:defRPr sz="900" b="0" i="0" u="none" strike="noStrike" kern="1200" baseline="0">
+              <a:defRPr sz="1400" b="0" i="0" u="none" strike="noStrike" kern="1200" baseline="0">
                 <a:solidFill>
-                  <a:schemeClr val="tx1">
-                    <a:lumMod val="65000"/>
-                    <a:lumOff val="35000"/>
+                  <a:schemeClr val="lt1">
+                    <a:lumMod val="85000"/>
                   </a:schemeClr>
                 </a:solidFill>
                 <a:latin typeface="+mn-lt"/>
@@ -2324,11 +2397,10 @@
           <a:lstStyle/>
           <a:p>
             <a:pPr>
-              <a:defRPr sz="1100" b="0" i="0" u="none" strike="noStrike" kern="1200" baseline="0">
+              <a:defRPr sz="1400" b="0" i="0" u="none" strike="noStrike" kern="1200" baseline="0">
                 <a:solidFill>
-                  <a:schemeClr val="tx1">
-                    <a:lumMod val="65000"/>
-                    <a:lumOff val="35000"/>
+                  <a:schemeClr val="lt1">
+                    <a:lumMod val="85000"/>
                   </a:schemeClr>
                 </a:solidFill>
                 <a:latin typeface="+mn-lt"/>
@@ -2347,11 +2419,10 @@
           <a:lstStyle/>
           <a:p>
             <a:pPr>
-              <a:defRPr sz="1100" b="0" i="0" u="none" strike="noStrike" kern="1200" baseline="0">
+              <a:defRPr sz="1400" b="0" i="0" u="none" strike="noStrike" kern="1200" baseline="0">
                 <a:solidFill>
-                  <a:schemeClr val="tx1">
-                    <a:lumMod val="65000"/>
-                    <a:lumOff val="35000"/>
+                  <a:schemeClr val="lt1">
+                    <a:lumMod val="85000"/>
                   </a:schemeClr>
                 </a:solidFill>
                 <a:latin typeface="+mn-lt"/>
@@ -2370,11 +2441,10 @@
           <a:lstStyle/>
           <a:p>
             <a:pPr>
-              <a:defRPr sz="1100" b="0" i="0" u="none" strike="noStrike" kern="1200" baseline="0">
+              <a:defRPr sz="1400" b="0" i="0" u="none" strike="noStrike" kern="1200" baseline="0">
                 <a:solidFill>
-                  <a:schemeClr val="tx1">
-                    <a:lumMod val="65000"/>
-                    <a:lumOff val="35000"/>
+                  <a:schemeClr val="lt1">
+                    <a:lumMod val="85000"/>
                   </a:schemeClr>
                 </a:solidFill>
                 <a:latin typeface="+mn-lt"/>
@@ -2399,11 +2469,10 @@
         <a:lstStyle/>
         <a:p>
           <a:pPr>
-            <a:defRPr sz="900" b="0" i="0" u="none" strike="noStrike" kern="1200" baseline="0">
+            <a:defRPr sz="1400" b="0" i="0" u="none" strike="noStrike" kern="1200" baseline="0">
               <a:solidFill>
-                <a:schemeClr val="tx1">
-                  <a:lumMod val="65000"/>
-                  <a:lumOff val="35000"/>
+                <a:schemeClr val="lt1">
+                  <a:lumMod val="85000"/>
                 </a:schemeClr>
               </a:solidFill>
               <a:latin typeface="+mn-lt"/>
@@ -2427,7 +2496,26 @@
     <c:showDLblsOverMax val="0"/>
   </c:chart>
   <c:spPr>
-    <a:noFill/>
+    <a:gradFill flip="none" rotWithShape="1">
+      <a:gsLst>
+        <a:gs pos="0">
+          <a:schemeClr val="dk1">
+            <a:lumMod val="65000"/>
+            <a:lumOff val="35000"/>
+          </a:schemeClr>
+        </a:gs>
+        <a:gs pos="100000">
+          <a:schemeClr val="dk1">
+            <a:lumMod val="85000"/>
+            <a:lumOff val="15000"/>
+          </a:schemeClr>
+        </a:gs>
+      </a:gsLst>
+      <a:path path="circle">
+        <a:fillToRect l="50000" t="50000" r="50000" b="50000"/>
+      </a:path>
+      <a:tileRect/>
+    </a:gradFill>
     <a:ln>
       <a:noFill/>
     </a:ln>
@@ -2470,27 +2558,28 @@
           <a:lstStyle/>
           <a:p>
             <a:pPr>
-              <a:defRPr sz="1400" b="1" i="0" u="none" strike="noStrike" kern="1200" spc="0" baseline="0">
+              <a:defRPr sz="2400" b="1" i="0" u="none" strike="noStrike" kern="1200" spc="100" baseline="0">
                 <a:solidFill>
-                  <a:schemeClr val="tx1">
-                    <a:lumMod val="65000"/>
-                    <a:lumOff val="35000"/>
+                  <a:schemeClr val="lt1">
+                    <a:lumMod val="95000"/>
                   </a:schemeClr>
                 </a:solidFill>
+                <a:effectLst>
+                  <a:outerShdw blurRad="50800" dist="38100" dir="5400000" algn="t" rotWithShape="0">
+                    <a:prstClr val="black">
+                      <a:alpha val="40000"/>
+                    </a:prstClr>
+                  </a:outerShdw>
+                </a:effectLst>
                 <a:latin typeface="+mn-lt"/>
                 <a:ea typeface="+mn-ea"/>
                 <a:cs typeface="+mn-cs"/>
               </a:defRPr>
             </a:pPr>
             <a:r>
-              <a:rPr lang="en-US" b="1"/>
-              <a:t>Random</a:t>
+              <a:rPr lang="en-US" sz="2400"/>
+              <a:t>Random Access IO</a:t>
             </a:r>
-            <a:r>
-              <a:rPr lang="en-US" b="1" baseline="0"/>
-              <a:t> Access IO</a:t>
-            </a:r>
-            <a:endParaRPr lang="en-US" b="1"/>
           </a:p>
         </c:rich>
       </c:tx>
@@ -2507,13 +2596,19 @@
         <a:lstStyle/>
         <a:p>
           <a:pPr>
-            <a:defRPr sz="1400" b="1" i="0" u="none" strike="noStrike" kern="1200" spc="0" baseline="0">
+            <a:defRPr sz="2400" b="1" i="0" u="none" strike="noStrike" kern="1200" spc="100" baseline="0">
               <a:solidFill>
-                <a:schemeClr val="tx1">
-                  <a:lumMod val="65000"/>
-                  <a:lumOff val="35000"/>
+                <a:schemeClr val="lt1">
+                  <a:lumMod val="95000"/>
                 </a:schemeClr>
               </a:solidFill>
+              <a:effectLst>
+                <a:outerShdw blurRad="50800" dist="38100" dir="5400000" algn="t" rotWithShape="0">
+                  <a:prstClr val="black">
+                    <a:alpha val="40000"/>
+                  </a:prstClr>
+                </a:outerShdw>
+              </a:effectLst>
               <a:latin typeface="+mn-lt"/>
               <a:ea typeface="+mn-ea"/>
               <a:cs typeface="+mn-cs"/>
@@ -2555,33 +2650,42 @@
             </c:strRef>
           </c:tx>
           <c:spPr>
-            <a:gradFill flip="none" rotWithShape="1">
+            <a:gradFill rotWithShape="1">
               <a:gsLst>
                 <a:gs pos="0">
                   <a:schemeClr val="accent1">
-                    <a:lumMod val="67000"/>
+                    <a:satMod val="103000"/>
+                    <a:lumMod val="102000"/>
+                    <a:tint val="94000"/>
                   </a:schemeClr>
                 </a:gs>
-                <a:gs pos="48000">
+                <a:gs pos="50000">
                   <a:schemeClr val="accent1">
-                    <a:lumMod val="97000"/>
-                    <a:lumOff val="3000"/>
+                    <a:satMod val="110000"/>
+                    <a:lumMod val="100000"/>
+                    <a:shade val="100000"/>
                   </a:schemeClr>
                 </a:gs>
                 <a:gs pos="100000">
                   <a:schemeClr val="accent1">
-                    <a:lumMod val="60000"/>
-                    <a:lumOff val="40000"/>
+                    <a:lumMod val="99000"/>
+                    <a:satMod val="120000"/>
+                    <a:shade val="78000"/>
                   </a:schemeClr>
                 </a:gs>
               </a:gsLst>
-              <a:lin ang="16200000" scaled="1"/>
-              <a:tileRect/>
+              <a:lin ang="5400000" scaled="0"/>
             </a:gradFill>
             <a:ln>
               <a:noFill/>
             </a:ln>
-            <a:effectLst/>
+            <a:effectLst>
+              <a:outerShdw blurRad="57150" dist="19050" dir="5400000" algn="ctr" rotWithShape="0">
+                <a:srgbClr val="000000">
+                  <a:alpha val="63000"/>
+                </a:srgbClr>
+              </a:outerShdw>
+            </a:effectLst>
           </c:spPr>
           <c:invertIfNegative val="0"/>
           <c:cat>
@@ -2641,35 +2745,42 @@
             </c:strRef>
           </c:tx>
           <c:spPr>
-            <a:gradFill flip="none" rotWithShape="1">
+            <a:gradFill rotWithShape="1">
               <a:gsLst>
                 <a:gs pos="0">
-                  <a:schemeClr val="accent6">
-                    <a:lumMod val="0"/>
-                    <a:lumOff val="100000"/>
+                  <a:schemeClr val="accent2">
+                    <a:satMod val="103000"/>
+                    <a:lumMod val="102000"/>
+                    <a:tint val="94000"/>
                   </a:schemeClr>
                 </a:gs>
-                <a:gs pos="35000">
-                  <a:schemeClr val="accent6">
-                    <a:lumMod val="0"/>
-                    <a:lumOff val="100000"/>
+                <a:gs pos="50000">
+                  <a:schemeClr val="accent2">
+                    <a:satMod val="110000"/>
+                    <a:lumMod val="100000"/>
+                    <a:shade val="100000"/>
                   </a:schemeClr>
                 </a:gs>
                 <a:gs pos="100000">
-                  <a:schemeClr val="accent6">
-                    <a:lumMod val="100000"/>
+                  <a:schemeClr val="accent2">
+                    <a:lumMod val="99000"/>
+                    <a:satMod val="120000"/>
+                    <a:shade val="78000"/>
                   </a:schemeClr>
                 </a:gs>
               </a:gsLst>
-              <a:path path="circle">
-                <a:fillToRect l="50000" t="-80000" r="50000" b="180000"/>
-              </a:path>
-              <a:tileRect/>
+              <a:lin ang="5400000" scaled="0"/>
             </a:gradFill>
             <a:ln>
               <a:noFill/>
             </a:ln>
-            <a:effectLst/>
+            <a:effectLst>
+              <a:outerShdw blurRad="57150" dist="19050" dir="5400000" algn="ctr" rotWithShape="0">
+                <a:srgbClr val="000000">
+                  <a:alpha val="63000"/>
+                </a:srgbClr>
+              </a:outerShdw>
+            </a:effectLst>
           </c:spPr>
           <c:invertIfNegative val="0"/>
           <c:cat>
@@ -2729,33 +2840,42 @@
             </c:strRef>
           </c:tx>
           <c:spPr>
-            <a:gradFill flip="none" rotWithShape="1">
+            <a:gradFill rotWithShape="1">
               <a:gsLst>
                 <a:gs pos="0">
-                  <a:schemeClr val="accent2">
-                    <a:lumMod val="67000"/>
+                  <a:schemeClr val="accent3">
+                    <a:satMod val="103000"/>
+                    <a:lumMod val="102000"/>
+                    <a:tint val="94000"/>
                   </a:schemeClr>
                 </a:gs>
-                <a:gs pos="48000">
-                  <a:schemeClr val="accent2">
-                    <a:lumMod val="97000"/>
-                    <a:lumOff val="3000"/>
+                <a:gs pos="50000">
+                  <a:schemeClr val="accent3">
+                    <a:satMod val="110000"/>
+                    <a:lumMod val="100000"/>
+                    <a:shade val="100000"/>
                   </a:schemeClr>
                 </a:gs>
                 <a:gs pos="100000">
-                  <a:schemeClr val="accent2">
-                    <a:lumMod val="60000"/>
-                    <a:lumOff val="40000"/>
+                  <a:schemeClr val="accent3">
+                    <a:lumMod val="99000"/>
+                    <a:satMod val="120000"/>
+                    <a:shade val="78000"/>
                   </a:schemeClr>
                 </a:gs>
               </a:gsLst>
-              <a:lin ang="16200000" scaled="1"/>
-              <a:tileRect/>
+              <a:lin ang="5400000" scaled="0"/>
             </a:gradFill>
             <a:ln>
               <a:noFill/>
             </a:ln>
-            <a:effectLst/>
+            <a:effectLst>
+              <a:outerShdw blurRad="57150" dist="19050" dir="5400000" algn="ctr" rotWithShape="0">
+                <a:srgbClr val="000000">
+                  <a:alpha val="63000"/>
+                </a:srgbClr>
+              </a:outerShdw>
+            </a:effectLst>
           </c:spPr>
           <c:invertIfNegative val="0"/>
           <c:cat>
@@ -2808,7 +2928,8 @@
           <c:showPercent val="0"/>
           <c:showBubbleSize val="0"/>
         </c:dLbls>
-        <c:gapWidth val="219"/>
+        <c:gapWidth val="100"/>
+        <c:overlap val="-24"/>
         <c:axId val="582589432"/>
         <c:axId val="582594112"/>
       </c:barChart>
@@ -2825,11 +2946,11 @@
         <c:tickLblPos val="nextTo"/>
         <c:spPr>
           <a:noFill/>
-          <a:ln w="9525" cap="flat" cmpd="sng" algn="ctr">
+          <a:ln w="12700" cap="flat" cmpd="sng" algn="ctr">
             <a:solidFill>
-              <a:schemeClr val="tx1">
-                <a:lumMod val="15000"/>
-                <a:lumOff val="85000"/>
+              <a:schemeClr val="lt1">
+                <a:lumMod val="95000"/>
+                <a:alpha val="54000"/>
               </a:schemeClr>
             </a:solidFill>
             <a:round/>
@@ -2841,11 +2962,10 @@
           <a:lstStyle/>
           <a:p>
             <a:pPr>
-              <a:defRPr sz="1200" b="0" i="0" u="none" strike="noStrike" kern="1200" baseline="0">
+              <a:defRPr sz="1400" b="0" i="0" u="none" strike="noStrike" kern="1200" baseline="0">
                 <a:solidFill>
-                  <a:schemeClr val="tx1">
-                    <a:lumMod val="65000"/>
-                    <a:lumOff val="35000"/>
+                  <a:schemeClr val="lt1">
+                    <a:lumMod val="85000"/>
                   </a:schemeClr>
                 </a:solidFill>
                 <a:latin typeface="+mn-lt"/>
@@ -2874,9 +2994,9 @@
           <c:spPr>
             <a:ln w="9525" cap="flat" cmpd="sng" algn="ctr">
               <a:solidFill>
-                <a:schemeClr val="tx1">
-                  <a:lumMod val="15000"/>
-                  <a:lumOff val="85000"/>
+                <a:schemeClr val="lt1">
+                  <a:lumMod val="95000"/>
+                  <a:alpha val="10000"/>
                 </a:schemeClr>
               </a:solidFill>
               <a:round/>
@@ -2900,11 +3020,10 @@
           <a:lstStyle/>
           <a:p>
             <a:pPr>
-              <a:defRPr sz="900" b="0" i="0" u="none" strike="noStrike" kern="1200" baseline="0">
+              <a:defRPr sz="1400" b="0" i="0" u="none" strike="noStrike" kern="1200" baseline="0">
                 <a:solidFill>
-                  <a:schemeClr val="tx1">
-                    <a:lumMod val="65000"/>
-                    <a:lumOff val="35000"/>
+                  <a:schemeClr val="lt1">
+                    <a:lumMod val="85000"/>
                   </a:schemeClr>
                 </a:solidFill>
                 <a:latin typeface="+mn-lt"/>
@@ -2936,11 +3055,10 @@
           <a:lstStyle/>
           <a:p>
             <a:pPr>
-              <a:defRPr sz="1200" b="1" i="0" u="none" strike="noStrike" kern="1200" baseline="0">
+              <a:defRPr sz="1400" b="0" i="0" u="none" strike="noStrike" kern="1200" baseline="0">
                 <a:solidFill>
-                  <a:schemeClr val="tx1">
-                    <a:lumMod val="65000"/>
-                    <a:lumOff val="35000"/>
+                  <a:schemeClr val="lt1">
+                    <a:lumMod val="85000"/>
                   </a:schemeClr>
                 </a:solidFill>
                 <a:latin typeface="+mn-lt"/>
@@ -2959,11 +3077,10 @@
           <a:lstStyle/>
           <a:p>
             <a:pPr>
-              <a:defRPr sz="1200" b="1" i="0" u="none" strike="noStrike" kern="1200" baseline="0">
+              <a:defRPr sz="1400" b="0" i="0" u="none" strike="noStrike" kern="1200" baseline="0">
                 <a:solidFill>
-                  <a:schemeClr val="tx1">
-                    <a:lumMod val="65000"/>
-                    <a:lumOff val="35000"/>
+                  <a:schemeClr val="lt1">
+                    <a:lumMod val="85000"/>
                   </a:schemeClr>
                 </a:solidFill>
                 <a:latin typeface="+mn-lt"/>
@@ -2982,11 +3099,10 @@
           <a:lstStyle/>
           <a:p>
             <a:pPr>
-              <a:defRPr sz="1200" b="1" i="0" u="none" strike="noStrike" kern="1200" baseline="0">
+              <a:defRPr sz="1400" b="0" i="0" u="none" strike="noStrike" kern="1200" baseline="0">
                 <a:solidFill>
-                  <a:schemeClr val="tx1">
-                    <a:lumMod val="65000"/>
-                    <a:lumOff val="35000"/>
+                  <a:schemeClr val="lt1">
+                    <a:lumMod val="85000"/>
                   </a:schemeClr>
                 </a:solidFill>
                 <a:latin typeface="+mn-lt"/>
@@ -3011,11 +3127,10 @@
         <a:lstStyle/>
         <a:p>
           <a:pPr>
-            <a:defRPr sz="900" b="0" i="0" u="none" strike="noStrike" kern="1200" baseline="0">
+            <a:defRPr sz="1400" b="0" i="0" u="none" strike="noStrike" kern="1200" baseline="0">
               <a:solidFill>
-                <a:schemeClr val="tx1">
-                  <a:lumMod val="65000"/>
-                  <a:lumOff val="35000"/>
+                <a:schemeClr val="lt1">
+                  <a:lumMod val="85000"/>
                 </a:schemeClr>
               </a:solidFill>
               <a:latin typeface="+mn-lt"/>
@@ -3039,7 +3154,26 @@
     <c:showDLblsOverMax val="0"/>
   </c:chart>
   <c:spPr>
-    <a:noFill/>
+    <a:gradFill flip="none" rotWithShape="1">
+      <a:gsLst>
+        <a:gs pos="0">
+          <a:schemeClr val="dk1">
+            <a:lumMod val="65000"/>
+            <a:lumOff val="35000"/>
+          </a:schemeClr>
+        </a:gs>
+        <a:gs pos="100000">
+          <a:schemeClr val="dk1">
+            <a:lumMod val="85000"/>
+            <a:lumOff val="15000"/>
+          </a:schemeClr>
+        </a:gs>
+      </a:gsLst>
+      <a:path path="circle">
+        <a:fillToRect l="50000" t="50000" r="50000" b="50000"/>
+      </a:path>
+      <a:tileRect/>
+    </a:gradFill>
     <a:ln>
       <a:noFill/>
     </a:ln>
@@ -4228,76 +4362,81 @@
 </file>
 
 <file path=ppt/charts/style3.xml><?xml version="1.0" encoding="utf-8"?>
-<cs:chartStyle xmlns:cs="http://schemas.microsoft.com/office/drawing/2012/chartStyle" xmlns:a="http://schemas.openxmlformats.org/drawingml/2006/main" id="332">
+<cs:chartStyle xmlns:cs="http://schemas.microsoft.com/office/drawing/2012/chartStyle" xmlns:a="http://schemas.openxmlformats.org/drawingml/2006/main" id="209">
   <cs:axisTitle>
     <cs:lnRef idx="0"/>
     <cs:fillRef idx="0"/>
     <cs:effectRef idx="0"/>
     <cs:fontRef idx="minor">
-      <a:schemeClr val="tx1">
-        <a:lumMod val="65000"/>
-        <a:lumOff val="35000"/>
+      <a:schemeClr val="lt1">
+        <a:lumMod val="85000"/>
       </a:schemeClr>
     </cs:fontRef>
-    <cs:defRPr sz="1000" kern="1200"/>
+    <cs:defRPr sz="1197" b="1" kern="1200" cap="all"/>
   </cs:axisTitle>
   <cs:categoryAxis>
     <cs:lnRef idx="0"/>
     <cs:fillRef idx="0"/>
     <cs:effectRef idx="0"/>
     <cs:fontRef idx="minor">
-      <a:schemeClr val="tx1">
-        <a:lumMod val="65000"/>
-        <a:lumOff val="35000"/>
+      <a:schemeClr val="lt1">
+        <a:lumMod val="85000"/>
       </a:schemeClr>
     </cs:fontRef>
     <cs:spPr>
-      <a:ln w="9525" cap="flat" cmpd="sng" algn="ctr">
+      <a:ln w="12700" cap="flat" cmpd="sng" algn="ctr">
         <a:solidFill>
-          <a:schemeClr val="tx1">
-            <a:lumMod val="15000"/>
-            <a:lumOff val="85000"/>
+          <a:schemeClr val="lt1">
+            <a:lumMod val="95000"/>
+            <a:alpha val="54000"/>
           </a:schemeClr>
         </a:solidFill>
         <a:round/>
       </a:ln>
     </cs:spPr>
-    <cs:defRPr sz="900" kern="1200"/>
+    <cs:defRPr sz="1197" kern="1200"/>
   </cs:categoryAxis>
-  <cs:chartArea mods="allowNoFillOverride allowNoLineOverride">
+  <cs:chartArea>
     <cs:lnRef idx="0"/>
     <cs:fillRef idx="0"/>
     <cs:effectRef idx="0"/>
     <cs:fontRef idx="minor">
-      <a:schemeClr val="tx1"/>
+      <a:schemeClr val="dk1"/>
     </cs:fontRef>
     <cs:spPr>
-      <a:solidFill>
-        <a:schemeClr val="bg1"/>
-      </a:solidFill>
-      <a:ln w="9525" cap="flat" cmpd="sng" algn="ctr">
-        <a:solidFill>
-          <a:schemeClr val="tx1">
-            <a:lumMod val="15000"/>
-            <a:lumOff val="85000"/>
-          </a:schemeClr>
-        </a:solidFill>
-        <a:round/>
-      </a:ln>
+      <a:gradFill flip="none" rotWithShape="1">
+        <a:gsLst>
+          <a:gs pos="0">
+            <a:schemeClr val="dk1">
+              <a:lumMod val="65000"/>
+              <a:lumOff val="35000"/>
+            </a:schemeClr>
+          </a:gs>
+          <a:gs pos="100000">
+            <a:schemeClr val="dk1">
+              <a:lumMod val="85000"/>
+              <a:lumOff val="15000"/>
+            </a:schemeClr>
+          </a:gs>
+        </a:gsLst>
+        <a:path path="circle">
+          <a:fillToRect l="50000" t="50000" r="50000" b="50000"/>
+        </a:path>
+        <a:tileRect/>
+      </a:gradFill>
     </cs:spPr>
-    <cs:defRPr sz="1000" kern="1200"/>
+    <cs:defRPr sz="1330" kern="1200"/>
   </cs:chartArea>
   <cs:dataLabel>
     <cs:lnRef idx="0"/>
     <cs:fillRef idx="0"/>
     <cs:effectRef idx="0"/>
     <cs:fontRef idx="minor">
-      <a:schemeClr val="tx1">
-        <a:lumMod val="75000"/>
-        <a:lumOff val="25000"/>
+      <a:schemeClr val="lt1">
+        <a:lumMod val="85000"/>
       </a:schemeClr>
     </cs:fontRef>
-    <cs:defRPr sz="900" kern="1200"/>
+    <cs:defRPr sz="1197" kern="1200"/>
   </cs:dataLabel>
   <cs:dataLabelCallout>
     <cs:lnRef idx="0"/>
@@ -4313,51 +4452,43 @@
       <a:solidFill>
         <a:schemeClr val="lt1"/>
       </a:solidFill>
-      <a:ln>
-        <a:solidFill>
-          <a:schemeClr val="dk1">
-            <a:lumMod val="25000"/>
-            <a:lumOff val="75000"/>
-          </a:schemeClr>
-        </a:solidFill>
-      </a:ln>
     </cs:spPr>
-    <cs:defRPr sz="900" kern="1200"/>
+    <cs:defRPr sz="1197" kern="1200"/>
     <cs:bodyPr rot="0" spcFirstLastPara="1" vertOverflow="clip" horzOverflow="clip" vert="horz" wrap="square" lIns="36576" tIns="18288" rIns="36576" bIns="18288" anchor="ctr" anchorCtr="1">
       <a:spAutoFit/>
     </cs:bodyPr>
   </cs:dataLabelCallout>
   <cs:dataPoint>
     <cs:lnRef idx="0"/>
-    <cs:fillRef idx="1">
+    <cs:fillRef idx="3">
       <cs:styleClr val="auto"/>
     </cs:fillRef>
-    <cs:effectRef idx="0"/>
+    <cs:effectRef idx="3"/>
     <cs:fontRef idx="minor">
-      <a:schemeClr val="tx1"/>
+      <a:schemeClr val="lt1"/>
     </cs:fontRef>
   </cs:dataPoint>
   <cs:dataPoint3D>
     <cs:lnRef idx="0"/>
-    <cs:fillRef idx="1">
+    <cs:fillRef idx="3">
       <cs:styleClr val="auto"/>
     </cs:fillRef>
-    <cs:effectRef idx="0"/>
+    <cs:effectRef idx="3"/>
     <cs:fontRef idx="minor">
-      <a:schemeClr val="tx1"/>
+      <a:schemeClr val="lt1"/>
     </cs:fontRef>
   </cs:dataPoint3D>
   <cs:dataPointLine>
     <cs:lnRef idx="0">
       <cs:styleClr val="auto"/>
     </cs:lnRef>
-    <cs:fillRef idx="1"/>
-    <cs:effectRef idx="0"/>
+    <cs:fillRef idx="3"/>
+    <cs:effectRef idx="3"/>
     <cs:fontRef idx="minor">
-      <a:schemeClr val="tx1"/>
+      <a:schemeClr val="lt1"/>
     </cs:fontRef>
     <cs:spPr>
-      <a:ln w="28575" cap="rnd">
+      <a:ln w="34925" cap="rnd">
         <a:solidFill>
           <a:schemeClr val="phClr"/>
         </a:solidFill>
@@ -4369,30 +4500,31 @@
     <cs:lnRef idx="0">
       <cs:styleClr val="auto"/>
     </cs:lnRef>
-    <cs:fillRef idx="1">
+    <cs:fillRef idx="3">
       <cs:styleClr val="auto"/>
     </cs:fillRef>
-    <cs:effectRef idx="0"/>
+    <cs:effectRef idx="3"/>
     <cs:fontRef idx="minor">
-      <a:schemeClr val="tx1"/>
+      <a:schemeClr val="lt1"/>
     </cs:fontRef>
     <cs:spPr>
       <a:ln w="9525">
         <a:solidFill>
           <a:schemeClr val="phClr"/>
         </a:solidFill>
+        <a:round/>
       </a:ln>
     </cs:spPr>
   </cs:dataPointMarker>
-  <cs:dataPointMarkerLayout symbol="circle" size="5"/>
+  <cs:dataPointMarkerLayout symbol="circle" size="6"/>
   <cs:dataPointWireframe>
     <cs:lnRef idx="0">
       <cs:styleClr val="auto"/>
     </cs:lnRef>
-    <cs:fillRef idx="1"/>
-    <cs:effectRef idx="0"/>
+    <cs:fillRef idx="3"/>
+    <cs:effectRef idx="3"/>
     <cs:fontRef idx="minor">
-      <a:schemeClr val="tx1"/>
+      <a:schemeClr val="lt1"/>
     </cs:fontRef>
     <cs:spPr>
       <a:ln w="9525" cap="rnd">
@@ -4408,44 +4540,41 @@
     <cs:fillRef idx="0"/>
     <cs:effectRef idx="0"/>
     <cs:fontRef idx="minor">
-      <a:schemeClr val="tx1">
-        <a:lumMod val="65000"/>
-        <a:lumOff val="35000"/>
+      <a:schemeClr val="lt1">
+        <a:lumMod val="85000"/>
       </a:schemeClr>
     </cs:fontRef>
     <cs:spPr>
-      <a:noFill/>
-      <a:ln w="9525" cap="flat" cmpd="sng" algn="ctr">
+      <a:ln w="9525">
         <a:solidFill>
-          <a:schemeClr val="tx1">
-            <a:lumMod val="15000"/>
-            <a:lumOff val="85000"/>
+          <a:schemeClr val="lt1">
+            <a:lumMod val="95000"/>
+            <a:alpha val="54000"/>
           </a:schemeClr>
         </a:solidFill>
-        <a:round/>
       </a:ln>
     </cs:spPr>
-    <cs:defRPr sz="900" kern="1200"/>
+    <cs:defRPr sz="1197" kern="1200"/>
   </cs:dataTable>
   <cs:downBar>
     <cs:lnRef idx="0"/>
     <cs:fillRef idx="0"/>
     <cs:effectRef idx="0"/>
     <cs:fontRef idx="minor">
-      <a:schemeClr val="dk1"/>
+      <a:schemeClr val="lt1"/>
     </cs:fontRef>
     <cs:spPr>
       <a:solidFill>
         <a:schemeClr val="dk1">
-          <a:lumMod val="65000"/>
-          <a:lumOff val="35000"/>
+          <a:lumMod val="75000"/>
+          <a:lumOff val="25000"/>
         </a:schemeClr>
       </a:solidFill>
       <a:ln w="9525">
         <a:solidFill>
-          <a:schemeClr val="tx1">
-            <a:lumMod val="65000"/>
-            <a:lumOff val="35000"/>
+          <a:schemeClr val="lt1">
+            <a:lumMod val="95000"/>
+            <a:alpha val="54000"/>
           </a:schemeClr>
         </a:solidFill>
       </a:ln>
@@ -4456,17 +4585,17 @@
     <cs:fillRef idx="0"/>
     <cs:effectRef idx="0"/>
     <cs:fontRef idx="minor">
-      <a:schemeClr val="tx1"/>
+      <a:schemeClr val="lt1"/>
     </cs:fontRef>
     <cs:spPr>
-      <a:ln w="9525" cap="flat" cmpd="sng" algn="ctr">
+      <a:ln w="9525">
         <a:solidFill>
-          <a:schemeClr val="tx1">
-            <a:lumMod val="35000"/>
-            <a:lumOff val="65000"/>
+          <a:schemeClr val="lt1">
+            <a:lumMod val="95000"/>
+            <a:alpha val="54000"/>
           </a:schemeClr>
         </a:solidFill>
-        <a:round/>
+        <a:prstDash val="dash"/>
       </a:ln>
     </cs:spPr>
   </cs:dropLine>
@@ -4475,14 +4604,13 @@
     <cs:fillRef idx="0"/>
     <cs:effectRef idx="0"/>
     <cs:fontRef idx="minor">
-      <a:schemeClr val="tx1"/>
+      <a:schemeClr val="lt1"/>
     </cs:fontRef>
     <cs:spPr>
       <a:ln w="9525" cap="flat" cmpd="sng" algn="ctr">
         <a:solidFill>
-          <a:schemeClr val="tx1">
-            <a:lumMod val="65000"/>
-            <a:lumOff val="35000"/>
+          <a:schemeClr val="lt1">
+            <a:lumMod val="95000"/>
           </a:schemeClr>
         </a:solidFill>
         <a:round/>
@@ -4494,28 +4622,22 @@
     <cs:fillRef idx="0"/>
     <cs:effectRef idx="0"/>
     <cs:fontRef idx="minor">
-      <a:schemeClr val="tx1"/>
+      <a:schemeClr val="lt1"/>
     </cs:fontRef>
-    <cs:spPr>
-      <a:noFill/>
-      <a:ln>
-        <a:noFill/>
-      </a:ln>
-    </cs:spPr>
   </cs:floor>
   <cs:gridlineMajor>
     <cs:lnRef idx="0"/>
     <cs:fillRef idx="0"/>
     <cs:effectRef idx="0"/>
     <cs:fontRef idx="minor">
-      <a:schemeClr val="tx1"/>
+      <a:schemeClr val="lt1"/>
     </cs:fontRef>
     <cs:spPr>
       <a:ln w="9525" cap="flat" cmpd="sng" algn="ctr">
         <a:solidFill>
-          <a:schemeClr val="tx1">
-            <a:lumMod val="15000"/>
-            <a:lumOff val="85000"/>
+          <a:schemeClr val="lt1">
+            <a:lumMod val="95000"/>
+            <a:alpha val="10000"/>
           </a:schemeClr>
         </a:solidFill>
         <a:round/>
@@ -4527,17 +4649,16 @@
     <cs:fillRef idx="0"/>
     <cs:effectRef idx="0"/>
     <cs:fontRef idx="minor">
-      <a:schemeClr val="tx1"/>
+      <a:schemeClr val="lt1"/>
     </cs:fontRef>
     <cs:spPr>
-      <a:ln w="9525" cap="flat" cmpd="sng" algn="ctr">
+      <a:ln>
         <a:solidFill>
-          <a:schemeClr val="tx1">
-            <a:lumMod val="5000"/>
-            <a:lumOff val="95000"/>
+          <a:schemeClr val="lt1">
+            <a:lumMod val="95000"/>
+            <a:alpha val="5000"/>
           </a:schemeClr>
         </a:solidFill>
-        <a:round/>
       </a:ln>
     </cs:spPr>
   </cs:gridlineMinor>
@@ -4546,17 +4667,17 @@
     <cs:fillRef idx="0"/>
     <cs:effectRef idx="0"/>
     <cs:fontRef idx="minor">
-      <a:schemeClr val="tx1"/>
+      <a:schemeClr val="lt1"/>
     </cs:fontRef>
     <cs:spPr>
-      <a:ln w="9525" cap="flat" cmpd="sng" algn="ctr">
+      <a:ln w="9525">
         <a:solidFill>
-          <a:schemeClr val="tx1">
-            <a:lumMod val="75000"/>
-            <a:lumOff val="25000"/>
+          <a:schemeClr val="lt1">
+            <a:lumMod val="95000"/>
+            <a:alpha val="54000"/>
           </a:schemeClr>
         </a:solidFill>
-        <a:round/>
+        <a:prstDash val="dash"/>
       </a:ln>
     </cs:spPr>
   </cs:hiLoLine>
@@ -4565,17 +4686,16 @@
     <cs:fillRef idx="0"/>
     <cs:effectRef idx="0"/>
     <cs:fontRef idx="minor">
-      <a:schemeClr val="tx1"/>
+      <a:schemeClr val="lt1"/>
     </cs:fontRef>
     <cs:spPr>
-      <a:ln w="9525" cap="flat" cmpd="sng" algn="ctr">
+      <a:ln w="9525">
         <a:solidFill>
-          <a:schemeClr val="tx1">
-            <a:lumMod val="35000"/>
-            <a:lumOff val="65000"/>
+          <a:schemeClr val="lt1">
+            <a:lumMod val="95000"/>
+            <a:alpha val="54000"/>
           </a:schemeClr>
         </a:solidFill>
-        <a:round/>
       </a:ln>
     </cs:spPr>
   </cs:leaderLine>
@@ -4584,27 +4704,26 @@
     <cs:fillRef idx="0"/>
     <cs:effectRef idx="0"/>
     <cs:fontRef idx="minor">
-      <a:schemeClr val="tx1">
-        <a:lumMod val="65000"/>
-        <a:lumOff val="35000"/>
+      <a:schemeClr val="lt1">
+        <a:lumMod val="85000"/>
       </a:schemeClr>
     </cs:fontRef>
-    <cs:defRPr sz="900" kern="1200"/>
+    <cs:defRPr sz="1197" kern="1200"/>
   </cs:legend>
-  <cs:plotArea mods="allowNoFillOverride allowNoLineOverride">
+  <cs:plotArea>
     <cs:lnRef idx="0"/>
     <cs:fillRef idx="0"/>
     <cs:effectRef idx="0"/>
     <cs:fontRef idx="minor">
-      <a:schemeClr val="tx1"/>
+      <a:schemeClr val="lt1"/>
     </cs:fontRef>
   </cs:plotArea>
-  <cs:plotArea3D mods="allowNoFillOverride allowNoLineOverride">
+  <cs:plotArea3D>
     <cs:lnRef idx="0"/>
     <cs:fillRef idx="0"/>
     <cs:effectRef idx="0"/>
     <cs:fontRef idx="minor">
-      <a:schemeClr val="tx1"/>
+      <a:schemeClr val="lt1"/>
     </cs:fontRef>
   </cs:plotArea3D>
   <cs:seriesAxis>
@@ -4612,26 +4731,36 @@
     <cs:fillRef idx="0"/>
     <cs:effectRef idx="0"/>
     <cs:fontRef idx="minor">
-      <a:schemeClr val="tx1">
-        <a:lumMod val="65000"/>
-        <a:lumOff val="35000"/>
+      <a:schemeClr val="lt1">
+        <a:lumMod val="85000"/>
       </a:schemeClr>
     </cs:fontRef>
-    <cs:defRPr sz="900" kern="1200"/>
+    <cs:spPr>
+      <a:ln w="12700" cap="flat" cmpd="sng" algn="ctr">
+        <a:solidFill>
+          <a:schemeClr val="lt1">
+            <a:lumMod val="95000"/>
+            <a:alpha val="54000"/>
+          </a:schemeClr>
+        </a:solidFill>
+        <a:round/>
+      </a:ln>
+    </cs:spPr>
+    <cs:defRPr sz="1197" kern="1200"/>
   </cs:seriesAxis>
   <cs:seriesLine>
     <cs:lnRef idx="0"/>
     <cs:fillRef idx="0"/>
     <cs:effectRef idx="0"/>
     <cs:fontRef idx="minor">
-      <a:schemeClr val="tx1"/>
+      <a:schemeClr val="lt1"/>
     </cs:fontRef>
     <cs:spPr>
       <a:ln w="9525" cap="flat" cmpd="sng" algn="ctr">
         <a:solidFill>
-          <a:schemeClr val="tx1">
-            <a:lumMod val="35000"/>
-            <a:lumOff val="65000"/>
+          <a:schemeClr val="lt1">
+            <a:lumMod val="95000"/>
+            <a:alpha val="54000"/>
           </a:schemeClr>
         </a:solidFill>
         <a:round/>
@@ -4643,12 +4772,19 @@
     <cs:fillRef idx="0"/>
     <cs:effectRef idx="0"/>
     <cs:fontRef idx="minor">
-      <a:schemeClr val="tx1">
-        <a:lumMod val="65000"/>
-        <a:lumOff val="35000"/>
+      <a:schemeClr val="lt1">
+        <a:lumMod val="95000"/>
       </a:schemeClr>
     </cs:fontRef>
-    <cs:defRPr sz="1400" b="0" kern="1200" spc="0" baseline="0"/>
+    <cs:defRPr sz="2128" b="1" kern="1200" spc="100" baseline="0">
+      <a:effectLst>
+        <a:outerShdw blurRad="50800" dist="38100" dir="5400000" algn="t" rotWithShape="0">
+          <a:prstClr val="black">
+            <a:alpha val="40000"/>
+          </a:prstClr>
+        </a:outerShdw>
+      </a:effectLst>
+    </cs:defRPr>
   </cs:title>
   <cs:trendline>
     <cs:lnRef idx="0">
@@ -4657,14 +4793,13 @@
     <cs:fillRef idx="0"/>
     <cs:effectRef idx="0"/>
     <cs:fontRef idx="minor">
-      <a:schemeClr val="tx1"/>
+      <a:schemeClr val="lt1"/>
     </cs:fontRef>
     <cs:spPr>
       <a:ln w="19050" cap="rnd">
         <a:solidFill>
           <a:schemeClr val="phClr"/>
         </a:solidFill>
-        <a:prstDash val="sysDot"/>
       </a:ln>
     </cs:spPr>
   </cs:trendline>
@@ -4673,19 +4808,18 @@
     <cs:fillRef idx="0"/>
     <cs:effectRef idx="0"/>
     <cs:fontRef idx="minor">
-      <a:schemeClr val="tx1">
-        <a:lumMod val="65000"/>
-        <a:lumOff val="35000"/>
+      <a:schemeClr val="lt1">
+        <a:lumMod val="85000"/>
       </a:schemeClr>
     </cs:fontRef>
-    <cs:defRPr sz="900" kern="1200"/>
+    <cs:defRPr sz="1197" kern="1200"/>
   </cs:trendlineLabel>
   <cs:upBar>
     <cs:lnRef idx="0"/>
     <cs:fillRef idx="0"/>
     <cs:effectRef idx="0"/>
     <cs:fontRef idx="minor">
-      <a:schemeClr val="dk1"/>
+      <a:schemeClr val="lt1"/>
     </cs:fontRef>
     <cs:spPr>
       <a:solidFill>
@@ -4693,9 +4827,9 @@
       </a:solidFill>
       <a:ln w="9525">
         <a:solidFill>
-          <a:schemeClr val="tx1">
-            <a:lumMod val="15000"/>
-            <a:lumOff val="85000"/>
+          <a:schemeClr val="lt1">
+            <a:lumMod val="95000"/>
+            <a:alpha val="54000"/>
           </a:schemeClr>
         </a:solidFill>
       </a:ln>
@@ -4706,101 +4840,99 @@
     <cs:fillRef idx="0"/>
     <cs:effectRef idx="0"/>
     <cs:fontRef idx="minor">
-      <a:schemeClr val="tx1">
-        <a:lumMod val="65000"/>
-        <a:lumOff val="35000"/>
+      <a:schemeClr val="lt1">
+        <a:lumMod val="85000"/>
       </a:schemeClr>
     </cs:fontRef>
-    <cs:defRPr sz="900" kern="1200"/>
+    <cs:defRPr sz="1197" kern="1200"/>
   </cs:valueAxis>
   <cs:wall>
     <cs:lnRef idx="0"/>
     <cs:fillRef idx="0"/>
     <cs:effectRef idx="0"/>
     <cs:fontRef idx="minor">
-      <a:schemeClr val="tx1"/>
+      <a:schemeClr val="lt1"/>
     </cs:fontRef>
-    <cs:spPr>
-      <a:noFill/>
-      <a:ln>
-        <a:noFill/>
-      </a:ln>
-    </cs:spPr>
   </cs:wall>
 </cs:chartStyle>
 </file>
 
 <file path=ppt/charts/style4.xml><?xml version="1.0" encoding="utf-8"?>
-<cs:chartStyle xmlns:cs="http://schemas.microsoft.com/office/drawing/2012/chartStyle" xmlns:a="http://schemas.openxmlformats.org/drawingml/2006/main" id="332">
+<cs:chartStyle xmlns:cs="http://schemas.microsoft.com/office/drawing/2012/chartStyle" xmlns:a="http://schemas.openxmlformats.org/drawingml/2006/main" id="209">
   <cs:axisTitle>
     <cs:lnRef idx="0"/>
     <cs:fillRef idx="0"/>
     <cs:effectRef idx="0"/>
     <cs:fontRef idx="minor">
-      <a:schemeClr val="tx1">
-        <a:lumMod val="65000"/>
-        <a:lumOff val="35000"/>
+      <a:schemeClr val="lt1">
+        <a:lumMod val="85000"/>
       </a:schemeClr>
     </cs:fontRef>
-    <cs:defRPr sz="1000" kern="1200"/>
+    <cs:defRPr sz="1197" b="1" kern="1200" cap="all"/>
   </cs:axisTitle>
   <cs:categoryAxis>
     <cs:lnRef idx="0"/>
     <cs:fillRef idx="0"/>
     <cs:effectRef idx="0"/>
     <cs:fontRef idx="minor">
-      <a:schemeClr val="tx1">
-        <a:lumMod val="65000"/>
-        <a:lumOff val="35000"/>
+      <a:schemeClr val="lt1">
+        <a:lumMod val="85000"/>
       </a:schemeClr>
     </cs:fontRef>
     <cs:spPr>
-      <a:ln w="9525" cap="flat" cmpd="sng" algn="ctr">
+      <a:ln w="12700" cap="flat" cmpd="sng" algn="ctr">
         <a:solidFill>
-          <a:schemeClr val="tx1">
-            <a:lumMod val="15000"/>
-            <a:lumOff val="85000"/>
+          <a:schemeClr val="lt1">
+            <a:lumMod val="95000"/>
+            <a:alpha val="54000"/>
           </a:schemeClr>
         </a:solidFill>
         <a:round/>
       </a:ln>
     </cs:spPr>
-    <cs:defRPr sz="900" kern="1200"/>
+    <cs:defRPr sz="1197" kern="1200"/>
   </cs:categoryAxis>
-  <cs:chartArea mods="allowNoFillOverride allowNoLineOverride">
+  <cs:chartArea>
     <cs:lnRef idx="0"/>
     <cs:fillRef idx="0"/>
     <cs:effectRef idx="0"/>
     <cs:fontRef idx="minor">
-      <a:schemeClr val="tx1"/>
+      <a:schemeClr val="dk1"/>
     </cs:fontRef>
     <cs:spPr>
-      <a:solidFill>
-        <a:schemeClr val="bg1"/>
-      </a:solidFill>
-      <a:ln w="9525" cap="flat" cmpd="sng" algn="ctr">
-        <a:solidFill>
-          <a:schemeClr val="tx1">
-            <a:lumMod val="15000"/>
-            <a:lumOff val="85000"/>
-          </a:schemeClr>
-        </a:solidFill>
-        <a:round/>
-      </a:ln>
+      <a:gradFill flip="none" rotWithShape="1">
+        <a:gsLst>
+          <a:gs pos="0">
+            <a:schemeClr val="dk1">
+              <a:lumMod val="65000"/>
+              <a:lumOff val="35000"/>
+            </a:schemeClr>
+          </a:gs>
+          <a:gs pos="100000">
+            <a:schemeClr val="dk1">
+              <a:lumMod val="85000"/>
+              <a:lumOff val="15000"/>
+            </a:schemeClr>
+          </a:gs>
+        </a:gsLst>
+        <a:path path="circle">
+          <a:fillToRect l="50000" t="50000" r="50000" b="50000"/>
+        </a:path>
+        <a:tileRect/>
+      </a:gradFill>
     </cs:spPr>
-    <cs:defRPr sz="1000" kern="1200"/>
+    <cs:defRPr sz="1330" kern="1200"/>
   </cs:chartArea>
   <cs:dataLabel>
     <cs:lnRef idx="0"/>
     <cs:fillRef idx="0"/>
     <cs:effectRef idx="0"/>
     <cs:fontRef idx="minor">
-      <a:schemeClr val="tx1">
-        <a:lumMod val="75000"/>
-        <a:lumOff val="25000"/>
+      <a:schemeClr val="lt1">
+        <a:lumMod val="85000"/>
       </a:schemeClr>
     </cs:fontRef>
-    <cs:defRPr sz="900" kern="1200"/>
+    <cs:defRPr sz="1197" kern="1200"/>
   </cs:dataLabel>
   <cs:dataLabelCallout>
     <cs:lnRef idx="0"/>
@@ -4816,51 +4948,43 @@
       <a:solidFill>
         <a:schemeClr val="lt1"/>
       </a:solidFill>
-      <a:ln>
-        <a:solidFill>
-          <a:schemeClr val="dk1">
-            <a:lumMod val="25000"/>
-            <a:lumOff val="75000"/>
-          </a:schemeClr>
-        </a:solidFill>
-      </a:ln>
     </cs:spPr>
-    <cs:defRPr sz="900" kern="1200"/>
+    <cs:defRPr sz="1197" kern="1200"/>
     <cs:bodyPr rot="0" spcFirstLastPara="1" vertOverflow="clip" horzOverflow="clip" vert="horz" wrap="square" lIns="36576" tIns="18288" rIns="36576" bIns="18288" anchor="ctr" anchorCtr="1">
       <a:spAutoFit/>
     </cs:bodyPr>
   </cs:dataLabelCallout>
   <cs:dataPoint>
     <cs:lnRef idx="0"/>
-    <cs:fillRef idx="1">
+    <cs:fillRef idx="3">
       <cs:styleClr val="auto"/>
     </cs:fillRef>
-    <cs:effectRef idx="0"/>
+    <cs:effectRef idx="3"/>
     <cs:fontRef idx="minor">
-      <a:schemeClr val="tx1"/>
+      <a:schemeClr val="lt1"/>
     </cs:fontRef>
   </cs:dataPoint>
   <cs:dataPoint3D>
     <cs:lnRef idx="0"/>
-    <cs:fillRef idx="1">
+    <cs:fillRef idx="3">
       <cs:styleClr val="auto"/>
     </cs:fillRef>
-    <cs:effectRef idx="0"/>
+    <cs:effectRef idx="3"/>
     <cs:fontRef idx="minor">
-      <a:schemeClr val="tx1"/>
+      <a:schemeClr val="lt1"/>
     </cs:fontRef>
   </cs:dataPoint3D>
   <cs:dataPointLine>
     <cs:lnRef idx="0">
       <cs:styleClr val="auto"/>
     </cs:lnRef>
-    <cs:fillRef idx="1"/>
-    <cs:effectRef idx="0"/>
+    <cs:fillRef idx="3"/>
+    <cs:effectRef idx="3"/>
     <cs:fontRef idx="minor">
-      <a:schemeClr val="tx1"/>
+      <a:schemeClr val="lt1"/>
     </cs:fontRef>
     <cs:spPr>
-      <a:ln w="28575" cap="rnd">
+      <a:ln w="34925" cap="rnd">
         <a:solidFill>
           <a:schemeClr val="phClr"/>
         </a:solidFill>
@@ -4872,30 +4996,31 @@
     <cs:lnRef idx="0">
       <cs:styleClr val="auto"/>
     </cs:lnRef>
-    <cs:fillRef idx="1">
+    <cs:fillRef idx="3">
       <cs:styleClr val="auto"/>
     </cs:fillRef>
-    <cs:effectRef idx="0"/>
+    <cs:effectRef idx="3"/>
     <cs:fontRef idx="minor">
-      <a:schemeClr val="tx1"/>
+      <a:schemeClr val="lt1"/>
     </cs:fontRef>
     <cs:spPr>
       <a:ln w="9525">
         <a:solidFill>
           <a:schemeClr val="phClr"/>
         </a:solidFill>
+        <a:round/>
       </a:ln>
     </cs:spPr>
   </cs:dataPointMarker>
-  <cs:dataPointMarkerLayout symbol="circle" size="5"/>
+  <cs:dataPointMarkerLayout symbol="circle" size="6"/>
   <cs:dataPointWireframe>
     <cs:lnRef idx="0">
       <cs:styleClr val="auto"/>
     </cs:lnRef>
-    <cs:fillRef idx="1"/>
-    <cs:effectRef idx="0"/>
+    <cs:fillRef idx="3"/>
+    <cs:effectRef idx="3"/>
     <cs:fontRef idx="minor">
-      <a:schemeClr val="tx1"/>
+      <a:schemeClr val="lt1"/>
     </cs:fontRef>
     <cs:spPr>
       <a:ln w="9525" cap="rnd">
@@ -4911,44 +5036,41 @@
     <cs:fillRef idx="0"/>
     <cs:effectRef idx="0"/>
     <cs:fontRef idx="minor">
-      <a:schemeClr val="tx1">
-        <a:lumMod val="65000"/>
-        <a:lumOff val="35000"/>
+      <a:schemeClr val="lt1">
+        <a:lumMod val="85000"/>
       </a:schemeClr>
     </cs:fontRef>
     <cs:spPr>
-      <a:noFill/>
-      <a:ln w="9525" cap="flat" cmpd="sng" algn="ctr">
+      <a:ln w="9525">
         <a:solidFill>
-          <a:schemeClr val="tx1">
-            <a:lumMod val="15000"/>
-            <a:lumOff val="85000"/>
+          <a:schemeClr val="lt1">
+            <a:lumMod val="95000"/>
+            <a:alpha val="54000"/>
           </a:schemeClr>
         </a:solidFill>
-        <a:round/>
       </a:ln>
     </cs:spPr>
-    <cs:defRPr sz="900" kern="1200"/>
+    <cs:defRPr sz="1197" kern="1200"/>
   </cs:dataTable>
   <cs:downBar>
     <cs:lnRef idx="0"/>
     <cs:fillRef idx="0"/>
     <cs:effectRef idx="0"/>
     <cs:fontRef idx="minor">
-      <a:schemeClr val="dk1"/>
+      <a:schemeClr val="lt1"/>
     </cs:fontRef>
     <cs:spPr>
       <a:solidFill>
         <a:schemeClr val="dk1">
-          <a:lumMod val="65000"/>
-          <a:lumOff val="35000"/>
+          <a:lumMod val="75000"/>
+          <a:lumOff val="25000"/>
         </a:schemeClr>
       </a:solidFill>
       <a:ln w="9525">
         <a:solidFill>
-          <a:schemeClr val="tx1">
-            <a:lumMod val="65000"/>
-            <a:lumOff val="35000"/>
+          <a:schemeClr val="lt1">
+            <a:lumMod val="95000"/>
+            <a:alpha val="54000"/>
           </a:schemeClr>
         </a:solidFill>
       </a:ln>
@@ -4959,17 +5081,17 @@
     <cs:fillRef idx="0"/>
     <cs:effectRef idx="0"/>
     <cs:fontRef idx="minor">
-      <a:schemeClr val="tx1"/>
+      <a:schemeClr val="lt1"/>
     </cs:fontRef>
     <cs:spPr>
-      <a:ln w="9525" cap="flat" cmpd="sng" algn="ctr">
+      <a:ln w="9525">
         <a:solidFill>
-          <a:schemeClr val="tx1">
-            <a:lumMod val="35000"/>
-            <a:lumOff val="65000"/>
+          <a:schemeClr val="lt1">
+            <a:lumMod val="95000"/>
+            <a:alpha val="54000"/>
           </a:schemeClr>
         </a:solidFill>
-        <a:round/>
+        <a:prstDash val="dash"/>
       </a:ln>
     </cs:spPr>
   </cs:dropLine>
@@ -4978,14 +5100,13 @@
     <cs:fillRef idx="0"/>
     <cs:effectRef idx="0"/>
     <cs:fontRef idx="minor">
-      <a:schemeClr val="tx1"/>
+      <a:schemeClr val="lt1"/>
     </cs:fontRef>
     <cs:spPr>
       <a:ln w="9525" cap="flat" cmpd="sng" algn="ctr">
         <a:solidFill>
-          <a:schemeClr val="tx1">
-            <a:lumMod val="65000"/>
-            <a:lumOff val="35000"/>
+          <a:schemeClr val="lt1">
+            <a:lumMod val="95000"/>
           </a:schemeClr>
         </a:solidFill>
         <a:round/>
@@ -4997,28 +5118,22 @@
     <cs:fillRef idx="0"/>
     <cs:effectRef idx="0"/>
     <cs:fontRef idx="minor">
-      <a:schemeClr val="tx1"/>
+      <a:schemeClr val="lt1"/>
     </cs:fontRef>
-    <cs:spPr>
-      <a:noFill/>
-      <a:ln>
-        <a:noFill/>
-      </a:ln>
-    </cs:spPr>
   </cs:floor>
   <cs:gridlineMajor>
     <cs:lnRef idx="0"/>
     <cs:fillRef idx="0"/>
     <cs:effectRef idx="0"/>
     <cs:fontRef idx="minor">
-      <a:schemeClr val="tx1"/>
+      <a:schemeClr val="lt1"/>
     </cs:fontRef>
     <cs:spPr>
       <a:ln w="9525" cap="flat" cmpd="sng" algn="ctr">
         <a:solidFill>
-          <a:schemeClr val="tx1">
-            <a:lumMod val="15000"/>
-            <a:lumOff val="85000"/>
+          <a:schemeClr val="lt1">
+            <a:lumMod val="95000"/>
+            <a:alpha val="10000"/>
           </a:schemeClr>
         </a:solidFill>
         <a:round/>
@@ -5030,17 +5145,16 @@
     <cs:fillRef idx="0"/>
     <cs:effectRef idx="0"/>
     <cs:fontRef idx="minor">
-      <a:schemeClr val="tx1"/>
+      <a:schemeClr val="lt1"/>
     </cs:fontRef>
     <cs:spPr>
-      <a:ln w="9525" cap="flat" cmpd="sng" algn="ctr">
+      <a:ln>
         <a:solidFill>
-          <a:schemeClr val="tx1">
-            <a:lumMod val="5000"/>
-            <a:lumOff val="95000"/>
+          <a:schemeClr val="lt1">
+            <a:lumMod val="95000"/>
+            <a:alpha val="5000"/>
           </a:schemeClr>
         </a:solidFill>
-        <a:round/>
       </a:ln>
     </cs:spPr>
   </cs:gridlineMinor>
@@ -5049,17 +5163,17 @@
     <cs:fillRef idx="0"/>
     <cs:effectRef idx="0"/>
     <cs:fontRef idx="minor">
-      <a:schemeClr val="tx1"/>
+      <a:schemeClr val="lt1"/>
     </cs:fontRef>
     <cs:spPr>
-      <a:ln w="9525" cap="flat" cmpd="sng" algn="ctr">
+      <a:ln w="9525">
         <a:solidFill>
-          <a:schemeClr val="tx1">
-            <a:lumMod val="75000"/>
-            <a:lumOff val="25000"/>
+          <a:schemeClr val="lt1">
+            <a:lumMod val="95000"/>
+            <a:alpha val="54000"/>
           </a:schemeClr>
         </a:solidFill>
-        <a:round/>
+        <a:prstDash val="dash"/>
       </a:ln>
     </cs:spPr>
   </cs:hiLoLine>
@@ -5068,17 +5182,16 @@
     <cs:fillRef idx="0"/>
     <cs:effectRef idx="0"/>
     <cs:fontRef idx="minor">
-      <a:schemeClr val="tx1"/>
+      <a:schemeClr val="lt1"/>
     </cs:fontRef>
     <cs:spPr>
-      <a:ln w="9525" cap="flat" cmpd="sng" algn="ctr">
+      <a:ln w="9525">
         <a:solidFill>
-          <a:schemeClr val="tx1">
-            <a:lumMod val="35000"/>
-            <a:lumOff val="65000"/>
+          <a:schemeClr val="lt1">
+            <a:lumMod val="95000"/>
+            <a:alpha val="54000"/>
           </a:schemeClr>
         </a:solidFill>
-        <a:round/>
       </a:ln>
     </cs:spPr>
   </cs:leaderLine>
@@ -5087,27 +5200,26 @@
     <cs:fillRef idx="0"/>
     <cs:effectRef idx="0"/>
     <cs:fontRef idx="minor">
-      <a:schemeClr val="tx1">
-        <a:lumMod val="65000"/>
-        <a:lumOff val="35000"/>
+      <a:schemeClr val="lt1">
+        <a:lumMod val="85000"/>
       </a:schemeClr>
     </cs:fontRef>
-    <cs:defRPr sz="900" kern="1200"/>
+    <cs:defRPr sz="1197" kern="1200"/>
   </cs:legend>
-  <cs:plotArea mods="allowNoFillOverride allowNoLineOverride">
+  <cs:plotArea>
     <cs:lnRef idx="0"/>
     <cs:fillRef idx="0"/>
     <cs:effectRef idx="0"/>
     <cs:fontRef idx="minor">
-      <a:schemeClr val="tx1"/>
+      <a:schemeClr val="lt1"/>
     </cs:fontRef>
   </cs:plotArea>
-  <cs:plotArea3D mods="allowNoFillOverride allowNoLineOverride">
+  <cs:plotArea3D>
     <cs:lnRef idx="0"/>
     <cs:fillRef idx="0"/>
     <cs:effectRef idx="0"/>
     <cs:fontRef idx="minor">
-      <a:schemeClr val="tx1"/>
+      <a:schemeClr val="lt1"/>
     </cs:fontRef>
   </cs:plotArea3D>
   <cs:seriesAxis>
@@ -5115,26 +5227,36 @@
     <cs:fillRef idx="0"/>
     <cs:effectRef idx="0"/>
     <cs:fontRef idx="minor">
-      <a:schemeClr val="tx1">
-        <a:lumMod val="65000"/>
-        <a:lumOff val="35000"/>
+      <a:schemeClr val="lt1">
+        <a:lumMod val="85000"/>
       </a:schemeClr>
     </cs:fontRef>
-    <cs:defRPr sz="900" kern="1200"/>
+    <cs:spPr>
+      <a:ln w="12700" cap="flat" cmpd="sng" algn="ctr">
+        <a:solidFill>
+          <a:schemeClr val="lt1">
+            <a:lumMod val="95000"/>
+            <a:alpha val="54000"/>
+          </a:schemeClr>
+        </a:solidFill>
+        <a:round/>
+      </a:ln>
+    </cs:spPr>
+    <cs:defRPr sz="1197" kern="1200"/>
   </cs:seriesAxis>
   <cs:seriesLine>
     <cs:lnRef idx="0"/>
     <cs:fillRef idx="0"/>
     <cs:effectRef idx="0"/>
     <cs:fontRef idx="minor">
-      <a:schemeClr val="tx1"/>
+      <a:schemeClr val="lt1"/>
     </cs:fontRef>
     <cs:spPr>
       <a:ln w="9525" cap="flat" cmpd="sng" algn="ctr">
         <a:solidFill>
-          <a:schemeClr val="tx1">
-            <a:lumMod val="35000"/>
-            <a:lumOff val="65000"/>
+          <a:schemeClr val="lt1">
+            <a:lumMod val="95000"/>
+            <a:alpha val="54000"/>
           </a:schemeClr>
         </a:solidFill>
         <a:round/>
@@ -5146,12 +5268,19 @@
     <cs:fillRef idx="0"/>
     <cs:effectRef idx="0"/>
     <cs:fontRef idx="minor">
-      <a:schemeClr val="tx1">
-        <a:lumMod val="65000"/>
-        <a:lumOff val="35000"/>
+      <a:schemeClr val="lt1">
+        <a:lumMod val="95000"/>
       </a:schemeClr>
     </cs:fontRef>
-    <cs:defRPr sz="1400" b="0" kern="1200" spc="0" baseline="0"/>
+    <cs:defRPr sz="2128" b="1" kern="1200" spc="100" baseline="0">
+      <a:effectLst>
+        <a:outerShdw blurRad="50800" dist="38100" dir="5400000" algn="t" rotWithShape="0">
+          <a:prstClr val="black">
+            <a:alpha val="40000"/>
+          </a:prstClr>
+        </a:outerShdw>
+      </a:effectLst>
+    </cs:defRPr>
   </cs:title>
   <cs:trendline>
     <cs:lnRef idx="0">
@@ -5160,14 +5289,13 @@
     <cs:fillRef idx="0"/>
     <cs:effectRef idx="0"/>
     <cs:fontRef idx="minor">
-      <a:schemeClr val="tx1"/>
+      <a:schemeClr val="lt1"/>
     </cs:fontRef>
     <cs:spPr>
       <a:ln w="19050" cap="rnd">
         <a:solidFill>
           <a:schemeClr val="phClr"/>
         </a:solidFill>
-        <a:prstDash val="sysDot"/>
       </a:ln>
     </cs:spPr>
   </cs:trendline>
@@ -5176,19 +5304,18 @@
     <cs:fillRef idx="0"/>
     <cs:effectRef idx="0"/>
     <cs:fontRef idx="minor">
-      <a:schemeClr val="tx1">
-        <a:lumMod val="65000"/>
-        <a:lumOff val="35000"/>
+      <a:schemeClr val="lt1">
+        <a:lumMod val="85000"/>
       </a:schemeClr>
     </cs:fontRef>
-    <cs:defRPr sz="900" kern="1200"/>
+    <cs:defRPr sz="1197" kern="1200"/>
   </cs:trendlineLabel>
   <cs:upBar>
     <cs:lnRef idx="0"/>
     <cs:fillRef idx="0"/>
     <cs:effectRef idx="0"/>
     <cs:fontRef idx="minor">
-      <a:schemeClr val="dk1"/>
+      <a:schemeClr val="lt1"/>
     </cs:fontRef>
     <cs:spPr>
       <a:solidFill>
@@ -5196,9 +5323,9 @@
       </a:solidFill>
       <a:ln w="9525">
         <a:solidFill>
-          <a:schemeClr val="tx1">
-            <a:lumMod val="15000"/>
-            <a:lumOff val="85000"/>
+          <a:schemeClr val="lt1">
+            <a:lumMod val="95000"/>
+            <a:alpha val="54000"/>
           </a:schemeClr>
         </a:solidFill>
       </a:ln>
@@ -5209,26 +5336,19 @@
     <cs:fillRef idx="0"/>
     <cs:effectRef idx="0"/>
     <cs:fontRef idx="minor">
-      <a:schemeClr val="tx1">
-        <a:lumMod val="65000"/>
-        <a:lumOff val="35000"/>
+      <a:schemeClr val="lt1">
+        <a:lumMod val="85000"/>
       </a:schemeClr>
     </cs:fontRef>
-    <cs:defRPr sz="900" kern="1200"/>
+    <cs:defRPr sz="1197" kern="1200"/>
   </cs:valueAxis>
   <cs:wall>
     <cs:lnRef idx="0"/>
     <cs:fillRef idx="0"/>
     <cs:effectRef idx="0"/>
     <cs:fontRef idx="minor">
-      <a:schemeClr val="tx1"/>
+      <a:schemeClr val="lt1"/>
     </cs:fontRef>
-    <cs:spPr>
-      <a:noFill/>
-      <a:ln>
-        <a:noFill/>
-      </a:ln>
-    </cs:spPr>
   </cs:wall>
 </cs:chartStyle>
 </file>
@@ -17550,7 +17670,7 @@
             <a:pPr algn="ctr"/>
             <a:r>
               <a:rPr lang="en-US" dirty="0"/>
-              <a:t>This is physical record size 4096</a:t>
+              <a:t>* With a physical record size of 4096</a:t>
             </a:r>
           </a:p>
         </p:txBody>
@@ -17570,14 +17690,14 @@
           <p:nvPr>
             <p:extLst>
               <p:ext uri="{D42A27DB-BD31-4B8C-83A1-F6EECF244321}">
-                <p14:modId xmlns:p14="http://schemas.microsoft.com/office/powerpoint/2010/main" val="1056938609"/>
+                <p14:modId xmlns:p14="http://schemas.microsoft.com/office/powerpoint/2010/main" val="1796511011"/>
               </p:ext>
             </p:extLst>
           </p:nvPr>
         </p:nvGraphicFramePr>
         <p:xfrm>
-          <a:off x="3158835" y="1615045"/>
-          <a:ext cx="5807033" cy="3721350"/>
+          <a:off x="2892489" y="1371599"/>
+          <a:ext cx="6400800" cy="4114800"/>
         </p:xfrm>
         <a:graphic>
           <a:graphicData uri="http://schemas.openxmlformats.org/drawingml/2006/chart">
@@ -17747,11 +17867,17 @@
           <p:cNvGraphicFramePr>
             <a:graphicFrameLocks/>
           </p:cNvGraphicFramePr>
-          <p:nvPr/>
+          <p:nvPr>
+            <p:extLst>
+              <p:ext uri="{D42A27DB-BD31-4B8C-83A1-F6EECF244321}">
+                <p14:modId xmlns:p14="http://schemas.microsoft.com/office/powerpoint/2010/main" val="4119521761"/>
+              </p:ext>
+            </p:extLst>
+          </p:nvPr>
         </p:nvGraphicFramePr>
         <p:xfrm>
-          <a:off x="3182587" y="1516856"/>
-          <a:ext cx="5783282" cy="3922037"/>
+          <a:off x="2892489" y="1371599"/>
+          <a:ext cx="6400800" cy="4114800"/>
         </p:xfrm>
         <a:graphic>
           <a:graphicData uri="http://schemas.openxmlformats.org/drawingml/2006/chart">
@@ -20697,14 +20823,14 @@
           <p:nvPr>
             <p:extLst>
               <p:ext uri="{D42A27DB-BD31-4B8C-83A1-F6EECF244321}">
-                <p14:modId xmlns:p14="http://schemas.microsoft.com/office/powerpoint/2010/main" val="3876237696"/>
+                <p14:modId xmlns:p14="http://schemas.microsoft.com/office/powerpoint/2010/main" val="647681923"/>
               </p:ext>
             </p:extLst>
           </p:nvPr>
         </p:nvGraphicFramePr>
         <p:xfrm>
-          <a:off x="615821" y="1686304"/>
-          <a:ext cx="5480180" cy="3884071"/>
+          <a:off x="615820" y="1686303"/>
+          <a:ext cx="5486400" cy="4572000"/>
         </p:xfrm>
         <a:graphic>
           <a:graphicData uri="http://schemas.openxmlformats.org/drawingml/2006/chart">
@@ -20727,14 +20853,14 @@
           <p:nvPr>
             <p:extLst>
               <p:ext uri="{D42A27DB-BD31-4B8C-83A1-F6EECF244321}">
-                <p14:modId xmlns:p14="http://schemas.microsoft.com/office/powerpoint/2010/main" val="1804255460"/>
+                <p14:modId xmlns:p14="http://schemas.microsoft.com/office/powerpoint/2010/main" val="4202395464"/>
               </p:ext>
             </p:extLst>
           </p:nvPr>
         </p:nvGraphicFramePr>
         <p:xfrm>
           <a:off x="6096001" y="1686304"/>
-          <a:ext cx="5473958" cy="3884066"/>
+          <a:ext cx="5486400" cy="4572000"/>
         </p:xfrm>
         <a:graphic>
           <a:graphicData uri="http://schemas.openxmlformats.org/drawingml/2006/chart">
@@ -20864,14 +20990,14 @@
           <p:nvPr>
             <p:extLst>
               <p:ext uri="{D42A27DB-BD31-4B8C-83A1-F6EECF244321}">
-                <p14:modId xmlns:p14="http://schemas.microsoft.com/office/powerpoint/2010/main" val="3259557444"/>
+                <p14:modId xmlns:p14="http://schemas.microsoft.com/office/powerpoint/2010/main" val="190651254"/>
               </p:ext>
             </p:extLst>
           </p:nvPr>
         </p:nvGraphicFramePr>
         <p:xfrm>
-          <a:off x="2493818" y="1752820"/>
-          <a:ext cx="8122722" cy="1497258"/>
+          <a:off x="2031528" y="1722120"/>
+          <a:ext cx="8122722" cy="1706880"/>
         </p:xfrm>
         <a:graphic>
           <a:graphicData uri="http://schemas.openxmlformats.org/drawingml/2006/table">
@@ -20910,7 +21036,7 @@
                     <a:p>
                       <a:pPr algn="ctr"/>
                       <a:r>
-                        <a:rPr lang="en-US" dirty="0">
+                        <a:rPr lang="en-US" sz="2200" dirty="0">
                           <a:solidFill>
                             <a:schemeClr val="tx1"/>
                           </a:solidFill>
@@ -20934,7 +21060,7 @@
                     <a:p>
                       <a:pPr algn="ctr"/>
                       <a:r>
-                        <a:rPr lang="en-US" dirty="0">
+                        <a:rPr lang="en-US" sz="2200" dirty="0">
                           <a:solidFill>
                             <a:schemeClr val="tx1"/>
                           </a:solidFill>
@@ -20958,7 +21084,7 @@
                     <a:p>
                       <a:pPr algn="ctr"/>
                       <a:r>
-                        <a:rPr lang="en-US" dirty="0">
+                        <a:rPr lang="en-US" sz="2200" dirty="0">
                           <a:solidFill>
                             <a:schemeClr val="tx1"/>
                           </a:solidFill>
@@ -20988,7 +21114,7 @@
                     <a:lstStyle/>
                     <a:p>
                       <a:r>
-                        <a:rPr lang="en-US" dirty="0"/>
+                        <a:rPr lang="en-US" sz="2200" dirty="0"/>
                         <a:t>t2 micro</a:t>
                       </a:r>
                     </a:p>
@@ -21001,7 +21127,7 @@
                     <a:lstStyle/>
                     <a:p>
                       <a:r>
-                        <a:rPr lang="en-US" dirty="0"/>
+                        <a:rPr lang="en-US" sz="2200" dirty="0"/>
                         <a:t>1 v Cores,  1 thread,1 GB , 2.5 GHz</a:t>
                       </a:r>
                     </a:p>
@@ -21014,7 +21140,7 @@
                     <a:lstStyle/>
                     <a:p>
                       <a:r>
-                        <a:rPr lang="en-US" dirty="0"/>
+                        <a:rPr lang="en-US" sz="2200" dirty="0"/>
                         <a:t>Free</a:t>
                       </a:r>
                     </a:p>
@@ -21034,7 +21160,7 @@
                     <a:lstStyle/>
                     <a:p>
                       <a:r>
-                        <a:rPr lang="en-US" dirty="0"/>
+                        <a:rPr lang="en-US" sz="2200" dirty="0"/>
                         <a:t>t3 large</a:t>
                       </a:r>
                     </a:p>
@@ -21047,7 +21173,7 @@
                     <a:lstStyle/>
                     <a:p>
                       <a:r>
-                        <a:rPr lang="en-US" dirty="0"/>
+                        <a:rPr lang="en-US" sz="2200" dirty="0"/>
                         <a:t>1 core, 2 threads</a:t>
                       </a:r>
                     </a:p>
@@ -21060,14 +21186,14 @@
                     <a:lstStyle/>
                     <a:p>
                       <a:r>
-                        <a:rPr lang="en-US" dirty="0"/>
+                        <a:rPr lang="en-US" sz="2200" dirty="0"/>
                         <a:t>$0.0832 /</a:t>
                       </a:r>
                       <a:r>
-                        <a:rPr lang="en-US" dirty="0" err="1"/>
+                        <a:rPr lang="en-US" sz="2200" dirty="0" err="1"/>
                         <a:t>hr</a:t>
                       </a:r>
-                      <a:endParaRPr lang="en-US" dirty="0"/>
+                      <a:endParaRPr lang="en-US" sz="2200" dirty="0"/>
                     </a:p>
                   </a:txBody>
                   <a:tcPr/>
@@ -21085,14 +21211,14 @@
                     <a:lstStyle/>
                     <a:p>
                       <a:r>
-                        <a:rPr lang="en-US" dirty="0"/>
+                        <a:rPr lang="en-US" sz="2200" dirty="0"/>
                         <a:t>d3 </a:t>
                       </a:r>
                       <a:r>
-                        <a:rPr lang="en-US" dirty="0" err="1"/>
+                        <a:rPr lang="en-US" sz="2200" dirty="0" err="1"/>
                         <a:t>xlarge</a:t>
                       </a:r>
-                      <a:endParaRPr lang="en-US" dirty="0"/>
+                      <a:endParaRPr lang="en-US" sz="2200" dirty="0"/>
                     </a:p>
                   </a:txBody>
                   <a:tcPr/>
@@ -21103,7 +21229,7 @@
                     <a:lstStyle/>
                     <a:p>
                       <a:r>
-                        <a:rPr lang="en-US" dirty="0"/>
+                        <a:rPr lang="en-US" sz="2200" dirty="0"/>
                         <a:t>2 cores, 4 threads, 32 GB, 2.5 GHz</a:t>
                       </a:r>
                     </a:p>
@@ -21116,14 +21242,14 @@
                     <a:lstStyle/>
                     <a:p>
                       <a:r>
-                        <a:rPr lang="en-US" dirty="0"/>
+                        <a:rPr lang="en-US" sz="2200" dirty="0"/>
                         <a:t>$0.499 / </a:t>
                       </a:r>
                       <a:r>
-                        <a:rPr lang="en-US" dirty="0" err="1"/>
+                        <a:rPr lang="en-US" sz="2200" dirty="0" err="1"/>
                         <a:t>hr</a:t>
                       </a:r>
-                      <a:endParaRPr lang="en-US" dirty="0"/>
+                      <a:endParaRPr lang="en-US" sz="2200" dirty="0"/>
                     </a:p>
                   </a:txBody>
                   <a:tcPr/>

</xml_diff>

<commit_message>
few more slides, replaces plots
</commit_message>
<xml_diff>
--- a/Proj_presentation.pptx
+++ b/Proj_presentation.pptx
@@ -5,7 +5,7 @@
     <p:sldMasterId id="2147483648" r:id="rId1"/>
   </p:sldMasterIdLst>
   <p:notesMasterIdLst>
-    <p:notesMasterId r:id="rId13"/>
+    <p:notesMasterId r:id="rId15"/>
   </p:notesMasterIdLst>
   <p:sldIdLst>
     <p:sldId id="256" r:id="rId2"/>
@@ -18,7 +18,9 @@
     <p:sldId id="265" r:id="rId9"/>
     <p:sldId id="268" r:id="rId10"/>
     <p:sldId id="266" r:id="rId11"/>
-    <p:sldId id="267" r:id="rId12"/>
+    <p:sldId id="270" r:id="rId12"/>
+    <p:sldId id="267" r:id="rId13"/>
+    <p:sldId id="269" r:id="rId14"/>
   </p:sldIdLst>
   <p:sldSz cx="12192000" cy="6858000"/>
   <p:notesSz cx="6858000" cy="9144000"/>
@@ -146,9 +148,12 @@
           <a:lstStyle/>
           <a:p>
             <a:pPr>
-              <a:defRPr sz="2000" b="1" i="0" u="none" strike="noStrike" kern="1200" spc="0" baseline="0">
+              <a:defRPr sz="1400" b="0" i="0" u="none" strike="noStrike" kern="1200" spc="0" baseline="0">
                 <a:solidFill>
-                  <a:schemeClr val="tx1"/>
+                  <a:schemeClr val="tx1">
+                    <a:lumMod val="65000"/>
+                    <a:lumOff val="35000"/>
+                  </a:schemeClr>
                 </a:solidFill>
                 <a:latin typeface="+mn-lt"/>
                 <a:ea typeface="+mn-ea"/>
@@ -156,46 +161,34 @@
               </a:defRPr>
             </a:pPr>
             <a:r>
-              <a:rPr lang="en-US" sz="2000" b="1">
-                <a:solidFill>
-                  <a:schemeClr val="tx1"/>
-                </a:solidFill>
-              </a:rPr>
+              <a:rPr lang="en-US" dirty="0"/>
               <a:t>WSL Test Run</a:t>
             </a:r>
           </a:p>
           <a:p>
             <a:pPr>
-              <a:defRPr sz="2000" b="1">
-                <a:solidFill>
-                  <a:schemeClr val="tx1"/>
-                </a:solidFill>
-              </a:defRPr>
+              <a:defRPr/>
             </a:pPr>
             <a:r>
-              <a:rPr lang="en-US" sz="2000" b="1">
-                <a:solidFill>
-                  <a:schemeClr val="tx1"/>
-                </a:solidFill>
-              </a:rPr>
+              <a:rPr lang="en-US" dirty="0"/>
               <a:t>Times</a:t>
             </a:r>
             <a:r>
-              <a:rPr lang="en-US" sz="2000" b="1" baseline="0">
-                <a:solidFill>
-                  <a:schemeClr val="tx1"/>
-                </a:solidFill>
-              </a:rPr>
+              <a:rPr lang="en-US" baseline="0" dirty="0"/>
               <a:t> in seconds</a:t>
             </a:r>
-            <a:endParaRPr lang="en-US" sz="2000" b="1">
-              <a:solidFill>
-                <a:schemeClr val="tx1"/>
-              </a:solidFill>
-            </a:endParaRPr>
+            <a:endParaRPr lang="en-US" dirty="0"/>
           </a:p>
         </c:rich>
       </c:tx>
+      <c:layout>
+        <c:manualLayout>
+          <c:xMode val="edge"/>
+          <c:yMode val="edge"/>
+          <c:x val="0.37182767284481488"/>
+          <c:y val="2.810715465408558E-2"/>
+        </c:manualLayout>
+      </c:layout>
       <c:overlay val="0"/>
       <c:spPr>
         <a:noFill/>
@@ -209,9 +202,12 @@
         <a:lstStyle/>
         <a:p>
           <a:pPr>
-            <a:defRPr sz="2000" b="1" i="0" u="none" strike="noStrike" kern="1200" spc="0" baseline="0">
+            <a:defRPr sz="1400" b="0" i="0" u="none" strike="noStrike" kern="1200" spc="0" baseline="0">
               <a:solidFill>
-                <a:schemeClr val="tx1"/>
+                <a:schemeClr val="tx1">
+                  <a:lumMod val="65000"/>
+                  <a:lumOff val="35000"/>
+                </a:schemeClr>
               </a:solidFill>
               <a:latin typeface="+mn-lt"/>
               <a:ea typeface="+mn-ea"/>
@@ -323,7 +319,7 @@
           <c:smooth val="0"/>
           <c:extLst>
             <c:ext xmlns:c16="http://schemas.microsoft.com/office/drawing/2014/chart" uri="{C3380CC4-5D6E-409C-BE32-E72D297353CC}">
-              <c16:uniqueId val="{00000000-2636-4E1A-9C52-D3812D4D85B0}"/>
+              <c16:uniqueId val="{00000000-99D2-4E2B-9EA4-14F638CD01F0}"/>
             </c:ext>
           </c:extLst>
         </c:ser>
@@ -422,7 +418,7 @@
           <c:smooth val="0"/>
           <c:extLst>
             <c:ext xmlns:c16="http://schemas.microsoft.com/office/drawing/2014/chart" uri="{C3380CC4-5D6E-409C-BE32-E72D297353CC}">
-              <c16:uniqueId val="{00000001-2636-4E1A-9C52-D3812D4D85B0}"/>
+              <c16:uniqueId val="{00000001-99D2-4E2B-9EA4-14F638CD01F0}"/>
             </c:ext>
           </c:extLst>
         </c:ser>
@@ -521,7 +517,7 @@
           <c:smooth val="0"/>
           <c:extLst>
             <c:ext xmlns:c16="http://schemas.microsoft.com/office/drawing/2014/chart" uri="{C3380CC4-5D6E-409C-BE32-E72D297353CC}">
-              <c16:uniqueId val="{00000002-2636-4E1A-9C52-D3812D4D85B0}"/>
+              <c16:uniqueId val="{00000002-99D2-4E2B-9EA4-14F638CD01F0}"/>
             </c:ext>
           </c:extLst>
         </c:ser>
@@ -542,7 +538,7 @@
           <c:spPr>
             <a:ln w="28575" cap="rnd">
               <a:solidFill>
-                <a:schemeClr val="accent4"/>
+                <a:srgbClr val="7030A0"/>
               </a:solidFill>
               <a:round/>
             </a:ln>
@@ -620,7 +616,7 @@
           <c:smooth val="0"/>
           <c:extLst>
             <c:ext xmlns:c16="http://schemas.microsoft.com/office/drawing/2014/chart" uri="{C3380CC4-5D6E-409C-BE32-E72D297353CC}">
-              <c16:uniqueId val="{00000003-2636-4E1A-9C52-D3812D4D85B0}"/>
+              <c16:uniqueId val="{00000003-99D2-4E2B-9EA4-14F638CD01F0}"/>
             </c:ext>
           </c:extLst>
         </c:ser>
@@ -719,7 +715,7 @@
           <c:smooth val="0"/>
           <c:extLst>
             <c:ext xmlns:c16="http://schemas.microsoft.com/office/drawing/2014/chart" uri="{C3380CC4-5D6E-409C-BE32-E72D297353CC}">
-              <c16:uniqueId val="{00000004-2636-4E1A-9C52-D3812D4D85B0}"/>
+              <c16:uniqueId val="{00000004-99D2-4E2B-9EA4-14F638CD01F0}"/>
             </c:ext>
           </c:extLst>
         </c:ser>
@@ -765,9 +761,12 @@
           <a:lstStyle/>
           <a:p>
             <a:pPr>
-              <a:defRPr sz="1400" b="0" i="0" u="none" strike="noStrike" kern="1200" baseline="0">
+              <a:defRPr sz="1100" b="0" i="0" u="none" strike="noStrike" kern="1200" baseline="0">
                 <a:solidFill>
-                  <a:schemeClr val="tx1"/>
+                  <a:schemeClr val="tx1">
+                    <a:lumMod val="65000"/>
+                    <a:lumOff val="35000"/>
+                  </a:schemeClr>
                 </a:solidFill>
                 <a:latin typeface="+mn-lt"/>
                 <a:ea typeface="+mn-ea"/>
@@ -805,7 +804,7 @@
             <a:effectLst/>
           </c:spPr>
         </c:majorGridlines>
-        <c:numFmt formatCode="General" sourceLinked="1"/>
+        <c:numFmt formatCode="#,##0.00" sourceLinked="0"/>
         <c:majorTickMark val="none"/>
         <c:minorTickMark val="none"/>
         <c:tickLblPos val="nextTo"/>
@@ -821,9 +820,12 @@
           <a:lstStyle/>
           <a:p>
             <a:pPr>
-              <a:defRPr sz="1400" b="0" i="0" u="none" strike="noStrike" kern="1200" baseline="0">
+              <a:defRPr sz="1050" b="0" i="0" u="none" strike="noStrike" kern="1200" baseline="0">
                 <a:solidFill>
-                  <a:schemeClr val="tx1"/>
+                  <a:schemeClr val="tx1">
+                    <a:lumMod val="65000"/>
+                    <a:lumOff val="35000"/>
+                  </a:schemeClr>
                 </a:solidFill>
                 <a:latin typeface="+mn-lt"/>
                 <a:ea typeface="+mn-ea"/>
@@ -854,9 +856,12 @@
           <a:lstStyle/>
           <a:p>
             <a:pPr>
-              <a:defRPr sz="1400" b="0" i="0" u="none" strike="noStrike" kern="1200" baseline="0">
+              <a:defRPr sz="1100" b="0" i="0" u="none" strike="noStrike" kern="1200" baseline="0">
                 <a:solidFill>
-                  <a:schemeClr val="tx1"/>
+                  <a:schemeClr val="tx1">
+                    <a:lumMod val="65000"/>
+                    <a:lumOff val="35000"/>
+                  </a:schemeClr>
                 </a:solidFill>
                 <a:latin typeface="+mn-lt"/>
                 <a:ea typeface="+mn-ea"/>
@@ -874,9 +879,12 @@
           <a:lstStyle/>
           <a:p>
             <a:pPr>
-              <a:defRPr sz="1400" b="0" i="0" u="none" strike="noStrike" kern="1200" baseline="0">
+              <a:defRPr sz="1100" b="0" i="0" u="none" strike="noStrike" kern="1200" baseline="0">
                 <a:solidFill>
-                  <a:schemeClr val="tx1"/>
+                  <a:schemeClr val="tx1">
+                    <a:lumMod val="65000"/>
+                    <a:lumOff val="35000"/>
+                  </a:schemeClr>
                 </a:solidFill>
                 <a:latin typeface="+mn-lt"/>
                 <a:ea typeface="+mn-ea"/>
@@ -894,9 +902,12 @@
           <a:lstStyle/>
           <a:p>
             <a:pPr>
-              <a:defRPr sz="1400" b="0" i="0" u="none" strike="noStrike" kern="1200" baseline="0">
+              <a:defRPr sz="1100" b="0" i="0" u="none" strike="noStrike" kern="1200" baseline="0">
                 <a:solidFill>
-                  <a:schemeClr val="tx1"/>
+                  <a:schemeClr val="tx1">
+                    <a:lumMod val="65000"/>
+                    <a:lumOff val="35000"/>
+                  </a:schemeClr>
                 </a:solidFill>
                 <a:latin typeface="+mn-lt"/>
                 <a:ea typeface="+mn-ea"/>
@@ -914,9 +925,12 @@
           <a:lstStyle/>
           <a:p>
             <a:pPr>
-              <a:defRPr sz="1400" b="0" i="0" u="none" strike="noStrike" kern="1200" baseline="0">
+              <a:defRPr sz="1100" b="0" i="0" u="none" strike="noStrike" kern="1200" baseline="0">
                 <a:solidFill>
-                  <a:schemeClr val="tx1"/>
+                  <a:schemeClr val="tx1">
+                    <a:lumMod val="65000"/>
+                    <a:lumOff val="35000"/>
+                  </a:schemeClr>
                 </a:solidFill>
                 <a:latin typeface="+mn-lt"/>
                 <a:ea typeface="+mn-ea"/>
@@ -934,9 +948,12 @@
           <a:lstStyle/>
           <a:p>
             <a:pPr>
-              <a:defRPr sz="1400" b="0" i="0" u="none" strike="noStrike" kern="1200" baseline="0">
+              <a:defRPr sz="1100" b="0" i="0" u="none" strike="noStrike" kern="1200" baseline="0">
                 <a:solidFill>
-                  <a:schemeClr val="tx1"/>
+                  <a:schemeClr val="tx1">
+                    <a:lumMod val="65000"/>
+                    <a:lumOff val="35000"/>
+                  </a:schemeClr>
                 </a:solidFill>
                 <a:latin typeface="+mn-lt"/>
                 <a:ea typeface="+mn-ea"/>
@@ -960,9 +977,12 @@
         <a:lstStyle/>
         <a:p>
           <a:pPr>
-            <a:defRPr sz="1400" b="0" i="0" u="none" strike="noStrike" kern="1200" baseline="0">
+            <a:defRPr sz="900" b="0" i="0" u="none" strike="noStrike" kern="1200" baseline="0">
               <a:solidFill>
-                <a:schemeClr val="tx1"/>
+                <a:schemeClr val="tx1">
+                  <a:lumMod val="65000"/>
+                  <a:lumOff val="35000"/>
+                </a:schemeClr>
               </a:solidFill>
               <a:latin typeface="+mn-lt"/>
               <a:ea typeface="+mn-ea"/>
@@ -1028,9 +1048,12 @@
           <a:lstStyle/>
           <a:p>
             <a:pPr>
-              <a:defRPr sz="2000" b="1" i="0" u="none" strike="noStrike" kern="1200" spc="0" baseline="0">
+              <a:defRPr sz="1400" b="0" i="0" u="none" strike="noStrike" kern="1200" spc="0" baseline="0">
                 <a:solidFill>
-                  <a:schemeClr val="tx1"/>
+                  <a:schemeClr val="tx1">
+                    <a:lumMod val="65000"/>
+                    <a:lumOff val="35000"/>
+                  </a:schemeClr>
                 </a:solidFill>
                 <a:latin typeface="+mn-lt"/>
                 <a:ea typeface="+mn-ea"/>
@@ -1038,43 +1061,23 @@
               </a:defRPr>
             </a:pPr>
             <a:r>
-              <a:rPr lang="en-US" sz="2000" b="1">
-                <a:solidFill>
-                  <a:schemeClr val="tx1"/>
-                </a:solidFill>
-              </a:rPr>
+              <a:rPr lang="en-US"/>
               <a:t>T2</a:t>
             </a:r>
             <a:r>
-              <a:rPr lang="en-US" sz="2000" b="1" baseline="0">
-                <a:solidFill>
-                  <a:schemeClr val="tx1"/>
-                </a:solidFill>
-              </a:rPr>
+              <a:rPr lang="en-US" baseline="0"/>
               <a:t> Micro</a:t>
             </a:r>
           </a:p>
           <a:p>
             <a:pPr>
-              <a:defRPr sz="2000" b="1">
-                <a:solidFill>
-                  <a:schemeClr val="tx1"/>
-                </a:solidFill>
-              </a:defRPr>
+              <a:defRPr/>
             </a:pPr>
             <a:r>
-              <a:rPr lang="en-US" sz="2000" b="1" baseline="0">
-                <a:solidFill>
-                  <a:schemeClr val="tx1"/>
-                </a:solidFill>
-              </a:rPr>
+              <a:rPr lang="en-US" baseline="0"/>
               <a:t>Times in Seconds</a:t>
             </a:r>
-            <a:endParaRPr lang="en-US" sz="2000" b="1">
-              <a:solidFill>
-                <a:schemeClr val="tx1"/>
-              </a:solidFill>
-            </a:endParaRPr>
+            <a:endParaRPr lang="en-US"/>
           </a:p>
         </c:rich>
       </c:tx>
@@ -1091,9 +1094,12 @@
         <a:lstStyle/>
         <a:p>
           <a:pPr>
-            <a:defRPr sz="2000" b="1" i="0" u="none" strike="noStrike" kern="1200" spc="0" baseline="0">
+            <a:defRPr sz="1400" b="0" i="0" u="none" strike="noStrike" kern="1200" spc="0" baseline="0">
               <a:solidFill>
-                <a:schemeClr val="tx1"/>
+                <a:schemeClr val="tx1">
+                  <a:lumMod val="65000"/>
+                  <a:lumOff val="35000"/>
+                </a:schemeClr>
               </a:solidFill>
               <a:latin typeface="+mn-lt"/>
               <a:ea typeface="+mn-ea"/>
@@ -1205,7 +1211,7 @@
           <c:smooth val="0"/>
           <c:extLst>
             <c:ext xmlns:c16="http://schemas.microsoft.com/office/drawing/2014/chart" uri="{C3380CC4-5D6E-409C-BE32-E72D297353CC}">
-              <c16:uniqueId val="{00000000-BEA0-4D03-B777-43C3D5171F58}"/>
+              <c16:uniqueId val="{00000000-EF27-4547-A2C2-4DEC8E076164}"/>
             </c:ext>
           </c:extLst>
         </c:ser>
@@ -1304,7 +1310,7 @@
           <c:smooth val="0"/>
           <c:extLst>
             <c:ext xmlns:c16="http://schemas.microsoft.com/office/drawing/2014/chart" uri="{C3380CC4-5D6E-409C-BE32-E72D297353CC}">
-              <c16:uniqueId val="{00000001-BEA0-4D03-B777-43C3D5171F58}"/>
+              <c16:uniqueId val="{00000001-EF27-4547-A2C2-4DEC8E076164}"/>
             </c:ext>
           </c:extLst>
         </c:ser>
@@ -1403,7 +1409,7 @@
           <c:smooth val="0"/>
           <c:extLst>
             <c:ext xmlns:c16="http://schemas.microsoft.com/office/drawing/2014/chart" uri="{C3380CC4-5D6E-409C-BE32-E72D297353CC}">
-              <c16:uniqueId val="{00000002-BEA0-4D03-B777-43C3D5171F58}"/>
+              <c16:uniqueId val="{00000002-EF27-4547-A2C2-4DEC8E076164}"/>
             </c:ext>
           </c:extLst>
         </c:ser>
@@ -1424,7 +1430,7 @@
           <c:spPr>
             <a:ln w="28575" cap="rnd">
               <a:solidFill>
-                <a:schemeClr val="accent4"/>
+                <a:srgbClr val="7030A0"/>
               </a:solidFill>
               <a:round/>
             </a:ln>
@@ -1502,7 +1508,7 @@
           <c:smooth val="0"/>
           <c:extLst>
             <c:ext xmlns:c16="http://schemas.microsoft.com/office/drawing/2014/chart" uri="{C3380CC4-5D6E-409C-BE32-E72D297353CC}">
-              <c16:uniqueId val="{00000003-BEA0-4D03-B777-43C3D5171F58}"/>
+              <c16:uniqueId val="{00000003-EF27-4547-A2C2-4DEC8E076164}"/>
             </c:ext>
           </c:extLst>
         </c:ser>
@@ -1601,7 +1607,7 @@
           <c:smooth val="0"/>
           <c:extLst>
             <c:ext xmlns:c16="http://schemas.microsoft.com/office/drawing/2014/chart" uri="{C3380CC4-5D6E-409C-BE32-E72D297353CC}">
-              <c16:uniqueId val="{00000004-BEA0-4D03-B777-43C3D5171F58}"/>
+              <c16:uniqueId val="{00000004-EF27-4547-A2C2-4DEC8E076164}"/>
             </c:ext>
           </c:extLst>
         </c:ser>
@@ -1647,9 +1653,12 @@
           <a:lstStyle/>
           <a:p>
             <a:pPr>
-              <a:defRPr sz="1400" b="0" i="0" u="none" strike="noStrike" kern="1200" baseline="0">
+              <a:defRPr sz="1050" b="0" i="0" u="none" strike="noStrike" kern="1200" baseline="0">
                 <a:solidFill>
-                  <a:schemeClr val="tx1"/>
+                  <a:schemeClr val="tx1">
+                    <a:lumMod val="65000"/>
+                    <a:lumOff val="35000"/>
+                  </a:schemeClr>
                 </a:solidFill>
                 <a:latin typeface="+mn-lt"/>
                 <a:ea typeface="+mn-ea"/>
@@ -1687,7 +1696,7 @@
             <a:effectLst/>
           </c:spPr>
         </c:majorGridlines>
-        <c:numFmt formatCode="General" sourceLinked="1"/>
+        <c:numFmt formatCode="#,##0.00" sourceLinked="0"/>
         <c:majorTickMark val="none"/>
         <c:minorTickMark val="none"/>
         <c:tickLblPos val="nextTo"/>
@@ -1703,9 +1712,12 @@
           <a:lstStyle/>
           <a:p>
             <a:pPr>
-              <a:defRPr sz="1400" b="0" i="0" u="none" strike="noStrike" kern="1200" baseline="0">
+              <a:defRPr sz="1050" b="0" i="0" u="none" strike="noStrike" kern="1200" baseline="0">
                 <a:solidFill>
-                  <a:schemeClr val="tx1"/>
+                  <a:schemeClr val="tx1">
+                    <a:lumMod val="65000"/>
+                    <a:lumOff val="35000"/>
+                  </a:schemeClr>
                 </a:solidFill>
                 <a:latin typeface="+mn-lt"/>
                 <a:ea typeface="+mn-ea"/>
@@ -1736,9 +1748,12 @@
           <a:lstStyle/>
           <a:p>
             <a:pPr>
-              <a:defRPr sz="1400" b="0" i="0" u="none" strike="noStrike" kern="1200" baseline="0">
+              <a:defRPr sz="1100" b="0" i="0" u="none" strike="noStrike" kern="1200" baseline="0">
                 <a:solidFill>
-                  <a:schemeClr val="tx1"/>
+                  <a:schemeClr val="tx1">
+                    <a:lumMod val="65000"/>
+                    <a:lumOff val="35000"/>
+                  </a:schemeClr>
                 </a:solidFill>
                 <a:latin typeface="+mn-lt"/>
                 <a:ea typeface="+mn-ea"/>
@@ -1756,9 +1771,12 @@
           <a:lstStyle/>
           <a:p>
             <a:pPr>
-              <a:defRPr sz="1400" b="0" i="0" u="none" strike="noStrike" kern="1200" baseline="0">
+              <a:defRPr sz="1100" b="0" i="0" u="none" strike="noStrike" kern="1200" baseline="0">
                 <a:solidFill>
-                  <a:schemeClr val="tx1"/>
+                  <a:schemeClr val="tx1">
+                    <a:lumMod val="65000"/>
+                    <a:lumOff val="35000"/>
+                  </a:schemeClr>
                 </a:solidFill>
                 <a:latin typeface="+mn-lt"/>
                 <a:ea typeface="+mn-ea"/>
@@ -1776,9 +1794,12 @@
           <a:lstStyle/>
           <a:p>
             <a:pPr>
-              <a:defRPr sz="1400" b="0" i="0" u="none" strike="noStrike" kern="1200" baseline="0">
+              <a:defRPr sz="1100" b="0" i="0" u="none" strike="noStrike" kern="1200" baseline="0">
                 <a:solidFill>
-                  <a:schemeClr val="tx1"/>
+                  <a:schemeClr val="tx1">
+                    <a:lumMod val="65000"/>
+                    <a:lumOff val="35000"/>
+                  </a:schemeClr>
                 </a:solidFill>
                 <a:latin typeface="+mn-lt"/>
                 <a:ea typeface="+mn-ea"/>
@@ -1796,9 +1817,12 @@
           <a:lstStyle/>
           <a:p>
             <a:pPr>
-              <a:defRPr sz="1400" b="0" i="0" u="none" strike="noStrike" kern="1200" baseline="0">
+              <a:defRPr sz="1100" b="0" i="0" u="none" strike="noStrike" kern="1200" baseline="0">
                 <a:solidFill>
-                  <a:schemeClr val="tx1"/>
+                  <a:schemeClr val="tx1">
+                    <a:lumMod val="65000"/>
+                    <a:lumOff val="35000"/>
+                  </a:schemeClr>
                 </a:solidFill>
                 <a:latin typeface="+mn-lt"/>
                 <a:ea typeface="+mn-ea"/>
@@ -1816,9 +1840,12 @@
           <a:lstStyle/>
           <a:p>
             <a:pPr>
-              <a:defRPr sz="1400" b="0" i="0" u="none" strike="noStrike" kern="1200" baseline="0">
+              <a:defRPr sz="1100" b="0" i="0" u="none" strike="noStrike" kern="1200" baseline="0">
                 <a:solidFill>
-                  <a:schemeClr val="tx1"/>
+                  <a:schemeClr val="tx1">
+                    <a:lumMod val="65000"/>
+                    <a:lumOff val="35000"/>
+                  </a:schemeClr>
                 </a:solidFill>
                 <a:latin typeface="+mn-lt"/>
                 <a:ea typeface="+mn-ea"/>
@@ -1842,9 +1869,12 @@
         <a:lstStyle/>
         <a:p>
           <a:pPr>
-            <a:defRPr sz="1400" b="0" i="0" u="none" strike="noStrike" kern="1200" baseline="0">
+            <a:defRPr sz="900" b="0" i="0" u="none" strike="noStrike" kern="1200" baseline="0">
               <a:solidFill>
-                <a:schemeClr val="tx1"/>
+                <a:schemeClr val="tx1">
+                  <a:lumMod val="65000"/>
+                  <a:lumOff val="35000"/>
+                </a:schemeClr>
               </a:solidFill>
               <a:latin typeface="+mn-lt"/>
               <a:ea typeface="+mn-ea"/>
@@ -1910,27 +1940,18 @@
           <a:lstStyle/>
           <a:p>
             <a:pPr>
-              <a:defRPr sz="2400" b="1" i="0" u="none" strike="noStrike" kern="1200" spc="100" baseline="0">
+              <a:defRPr sz="1600" b="0" i="0" u="none" strike="noStrike" kern="1200" spc="0" baseline="0">
                 <a:solidFill>
-                  <a:schemeClr val="lt1">
-                    <a:lumMod val="95000"/>
-                  </a:schemeClr>
+                  <a:schemeClr val="bg1"/>
                 </a:solidFill>
-                <a:effectLst>
-                  <a:outerShdw blurRad="50800" dist="38100" dir="5400000" algn="t" rotWithShape="0">
-                    <a:prstClr val="black">
-                      <a:alpha val="40000"/>
-                    </a:prstClr>
-                  </a:outerShdw>
-                </a:effectLst>
                 <a:latin typeface="+mn-lt"/>
                 <a:ea typeface="+mn-ea"/>
                 <a:cs typeface="+mn-cs"/>
               </a:defRPr>
             </a:pPr>
             <a:r>
-              <a:rPr lang="en-US" sz="2400"/>
-              <a:t>Processing Time To Build Dictionary</a:t>
+              <a:rPr lang="en-US" sz="2400" b="1" dirty="0"/>
+              <a:t>Time to Build Dictionary</a:t>
             </a:r>
           </a:p>
         </c:rich>
@@ -1948,19 +1969,10 @@
         <a:lstStyle/>
         <a:p>
           <a:pPr>
-            <a:defRPr sz="2400" b="1" i="0" u="none" strike="noStrike" kern="1200" spc="100" baseline="0">
+            <a:defRPr sz="1600" b="0" i="0" u="none" strike="noStrike" kern="1200" spc="0" baseline="0">
               <a:solidFill>
-                <a:schemeClr val="lt1">
-                  <a:lumMod val="95000"/>
-                </a:schemeClr>
+                <a:schemeClr val="bg1"/>
               </a:solidFill>
-              <a:effectLst>
-                <a:outerShdw blurRad="50800" dist="38100" dir="5400000" algn="t" rotWithShape="0">
-                  <a:prstClr val="black">
-                    <a:alpha val="40000"/>
-                  </a:prstClr>
-                </a:outerShdw>
-              </a:effectLst>
               <a:latin typeface="+mn-lt"/>
               <a:ea typeface="+mn-ea"/>
               <a:cs typeface="+mn-cs"/>
@@ -1992,42 +2004,13 @@
             </c:strRef>
           </c:tx>
           <c:spPr>
-            <a:gradFill rotWithShape="1">
-              <a:gsLst>
-                <a:gs pos="0">
-                  <a:schemeClr val="accent1">
-                    <a:satMod val="103000"/>
-                    <a:lumMod val="102000"/>
-                    <a:tint val="94000"/>
-                  </a:schemeClr>
-                </a:gs>
-                <a:gs pos="50000">
-                  <a:schemeClr val="accent1">
-                    <a:satMod val="110000"/>
-                    <a:lumMod val="100000"/>
-                    <a:shade val="100000"/>
-                  </a:schemeClr>
-                </a:gs>
-                <a:gs pos="100000">
-                  <a:schemeClr val="accent1">
-                    <a:lumMod val="99000"/>
-                    <a:satMod val="120000"/>
-                    <a:shade val="78000"/>
-                  </a:schemeClr>
-                </a:gs>
-              </a:gsLst>
-              <a:lin ang="5400000" scaled="0"/>
-            </a:gradFill>
+            <a:solidFill>
+              <a:schemeClr val="accent1"/>
+            </a:solidFill>
             <a:ln>
               <a:noFill/>
             </a:ln>
-            <a:effectLst>
-              <a:outerShdw blurRad="57150" dist="19050" dir="5400000" algn="ctr" rotWithShape="0">
-                <a:srgbClr val="000000">
-                  <a:alpha val="63000"/>
-                </a:srgbClr>
-              </a:outerShdw>
-            </a:effectLst>
+            <a:effectLst/>
           </c:spPr>
           <c:invertIfNegative val="0"/>
           <c:cat>
@@ -2068,7 +2051,7 @@
           </c:val>
           <c:extLst>
             <c:ext xmlns:c16="http://schemas.microsoft.com/office/drawing/2014/chart" uri="{C3380CC4-5D6E-409C-BE32-E72D297353CC}">
-              <c16:uniqueId val="{00000000-DA3C-4CF4-8365-0ACFD8B880E3}"/>
+              <c16:uniqueId val="{00000000-FF0A-450C-9320-985DF61CFFFC}"/>
             </c:ext>
           </c:extLst>
         </c:ser>
@@ -2087,42 +2070,13 @@
             </c:strRef>
           </c:tx>
           <c:spPr>
-            <a:gradFill rotWithShape="1">
-              <a:gsLst>
-                <a:gs pos="0">
-                  <a:schemeClr val="accent2">
-                    <a:satMod val="103000"/>
-                    <a:lumMod val="102000"/>
-                    <a:tint val="94000"/>
-                  </a:schemeClr>
-                </a:gs>
-                <a:gs pos="50000">
-                  <a:schemeClr val="accent2">
-                    <a:satMod val="110000"/>
-                    <a:lumMod val="100000"/>
-                    <a:shade val="100000"/>
-                  </a:schemeClr>
-                </a:gs>
-                <a:gs pos="100000">
-                  <a:schemeClr val="accent2">
-                    <a:lumMod val="99000"/>
-                    <a:satMod val="120000"/>
-                    <a:shade val="78000"/>
-                  </a:schemeClr>
-                </a:gs>
-              </a:gsLst>
-              <a:lin ang="5400000" scaled="0"/>
-            </a:gradFill>
+            <a:solidFill>
+              <a:schemeClr val="accent2"/>
+            </a:solidFill>
             <a:ln>
               <a:noFill/>
             </a:ln>
-            <a:effectLst>
-              <a:outerShdw blurRad="57150" dist="19050" dir="5400000" algn="ctr" rotWithShape="0">
-                <a:srgbClr val="000000">
-                  <a:alpha val="63000"/>
-                </a:srgbClr>
-              </a:outerShdw>
-            </a:effectLst>
+            <a:effectLst/>
           </c:spPr>
           <c:invertIfNegative val="0"/>
           <c:cat>
@@ -2163,7 +2117,7 @@
           </c:val>
           <c:extLst>
             <c:ext xmlns:c16="http://schemas.microsoft.com/office/drawing/2014/chart" uri="{C3380CC4-5D6E-409C-BE32-E72D297353CC}">
-              <c16:uniqueId val="{00000001-DA3C-4CF4-8365-0ACFD8B880E3}"/>
+              <c16:uniqueId val="{00000001-FF0A-450C-9320-985DF61CFFFC}"/>
             </c:ext>
           </c:extLst>
         </c:ser>
@@ -2182,42 +2136,13 @@
             </c:strRef>
           </c:tx>
           <c:spPr>
-            <a:gradFill rotWithShape="1">
-              <a:gsLst>
-                <a:gs pos="0">
-                  <a:schemeClr val="accent3">
-                    <a:satMod val="103000"/>
-                    <a:lumMod val="102000"/>
-                    <a:tint val="94000"/>
-                  </a:schemeClr>
-                </a:gs>
-                <a:gs pos="50000">
-                  <a:schemeClr val="accent3">
-                    <a:satMod val="110000"/>
-                    <a:lumMod val="100000"/>
-                    <a:shade val="100000"/>
-                  </a:schemeClr>
-                </a:gs>
-                <a:gs pos="100000">
-                  <a:schemeClr val="accent3">
-                    <a:lumMod val="99000"/>
-                    <a:satMod val="120000"/>
-                    <a:shade val="78000"/>
-                  </a:schemeClr>
-                </a:gs>
-              </a:gsLst>
-              <a:lin ang="5400000" scaled="0"/>
-            </a:gradFill>
+            <a:solidFill>
+              <a:schemeClr val="accent3"/>
+            </a:solidFill>
             <a:ln>
               <a:noFill/>
             </a:ln>
-            <a:effectLst>
-              <a:outerShdw blurRad="57150" dist="19050" dir="5400000" algn="ctr" rotWithShape="0">
-                <a:srgbClr val="000000">
-                  <a:alpha val="63000"/>
-                </a:srgbClr>
-              </a:outerShdw>
-            </a:effectLst>
+            <a:effectLst/>
           </c:spPr>
           <c:invertIfNegative val="0"/>
           <c:cat>
@@ -2258,7 +2183,73 @@
           </c:val>
           <c:extLst>
             <c:ext xmlns:c16="http://schemas.microsoft.com/office/drawing/2014/chart" uri="{C3380CC4-5D6E-409C-BE32-E72D297353CC}">
-              <c16:uniqueId val="{00000002-DA3C-4CF4-8365-0ACFD8B880E3}"/>
+              <c16:uniqueId val="{00000002-FF0A-450C-9320-985DF61CFFFC}"/>
+            </c:ext>
+          </c:extLst>
+        </c:ser>
+        <c:ser>
+          <c:idx val="3"/>
+          <c:order val="3"/>
+          <c:tx>
+            <c:strRef>
+              <c:f>Sheet3!$Q$64</c:f>
+              <c:strCache>
+                <c:ptCount val="1"/>
+                <c:pt idx="0">
+                  <c:v>i4 xlarge</c:v>
+                </c:pt>
+              </c:strCache>
+            </c:strRef>
+          </c:tx>
+          <c:spPr>
+            <a:solidFill>
+              <a:schemeClr val="accent4"/>
+            </a:solidFill>
+            <a:ln>
+              <a:noFill/>
+            </a:ln>
+            <a:effectLst/>
+          </c:spPr>
+          <c:invertIfNegative val="0"/>
+          <c:cat>
+            <c:numRef>
+              <c:f>Sheet3!$M$65:$M$67</c:f>
+              <c:numCache>
+                <c:formatCode>General</c:formatCode>
+                <c:ptCount val="3"/>
+                <c:pt idx="0">
+                  <c:v>512</c:v>
+                </c:pt>
+                <c:pt idx="1">
+                  <c:v>4096</c:v>
+                </c:pt>
+                <c:pt idx="2">
+                  <c:v>32678</c:v>
+                </c:pt>
+              </c:numCache>
+            </c:numRef>
+          </c:cat>
+          <c:val>
+            <c:numRef>
+              <c:f>Sheet3!$Q$65:$Q$67</c:f>
+              <c:numCache>
+                <c:formatCode>General</c:formatCode>
+                <c:ptCount val="3"/>
+                <c:pt idx="0">
+                  <c:v>3.27128</c:v>
+                </c:pt>
+                <c:pt idx="1">
+                  <c:v>3.2439799999999996</c:v>
+                </c:pt>
+                <c:pt idx="2">
+                  <c:v>3.25298</c:v>
+                </c:pt>
+              </c:numCache>
+            </c:numRef>
+          </c:val>
+          <c:extLst>
+            <c:ext xmlns:c16="http://schemas.microsoft.com/office/drawing/2014/chart" uri="{C3380CC4-5D6E-409C-BE32-E72D297353CC}">
+              <c16:uniqueId val="{00000003-FF0A-450C-9320-985DF61CFFFC}"/>
             </c:ext>
           </c:extLst>
         </c:ser>
@@ -2270,13 +2261,12 @@
           <c:showPercent val="0"/>
           <c:showBubbleSize val="0"/>
         </c:dLbls>
-        <c:gapWidth val="100"/>
-        <c:overlap val="-24"/>
-        <c:axId val="679547096"/>
-        <c:axId val="679547456"/>
+        <c:gapWidth val="219"/>
+        <c:axId val="620035448"/>
+        <c:axId val="620034728"/>
       </c:barChart>
       <c:catAx>
-        <c:axId val="679547096"/>
+        <c:axId val="620035448"/>
         <c:scaling>
           <c:orientation val="minMax"/>
         </c:scaling>
@@ -2288,11 +2278,11 @@
         <c:tickLblPos val="nextTo"/>
         <c:spPr>
           <a:noFill/>
-          <a:ln w="12700" cap="flat" cmpd="sng" algn="ctr">
+          <a:ln w="9525" cap="flat" cmpd="sng" algn="ctr">
             <a:solidFill>
-              <a:schemeClr val="lt1">
-                <a:lumMod val="95000"/>
-                <a:alpha val="54000"/>
+              <a:schemeClr val="tx1">
+                <a:lumMod val="15000"/>
+                <a:lumOff val="85000"/>
               </a:schemeClr>
             </a:solidFill>
             <a:round/>
@@ -2304,11 +2294,9 @@
           <a:lstStyle/>
           <a:p>
             <a:pPr>
-              <a:defRPr sz="1400" b="0" i="0" u="none" strike="noStrike" kern="1200" baseline="0">
+              <a:defRPr sz="900" b="0" i="0" u="none" strike="noStrike" kern="1200" baseline="0">
                 <a:solidFill>
-                  <a:schemeClr val="lt1">
-                    <a:lumMod val="85000"/>
-                  </a:schemeClr>
+                  <a:schemeClr val="bg1"/>
                 </a:solidFill>
                 <a:latin typeface="+mn-lt"/>
                 <a:ea typeface="+mn-ea"/>
@@ -2318,7 +2306,7 @@
             <a:endParaRPr lang="en-US"/>
           </a:p>
         </c:txPr>
-        <c:crossAx val="679547456"/>
+        <c:crossAx val="620034728"/>
         <c:crosses val="autoZero"/>
         <c:auto val="1"/>
         <c:lblAlgn val="ctr"/>
@@ -2326,7 +2314,7 @@
         <c:noMultiLvlLbl val="0"/>
       </c:catAx>
       <c:valAx>
-        <c:axId val="679547456"/>
+        <c:axId val="620034728"/>
         <c:scaling>
           <c:orientation val="minMax"/>
         </c:scaling>
@@ -2336,9 +2324,9 @@
           <c:spPr>
             <a:ln w="9525" cap="flat" cmpd="sng" algn="ctr">
               <a:solidFill>
-                <a:schemeClr val="lt1">
-                  <a:lumMod val="95000"/>
-                  <a:alpha val="10000"/>
+                <a:schemeClr val="tx1">
+                  <a:lumMod val="15000"/>
+                  <a:lumOff val="85000"/>
                 </a:schemeClr>
               </a:solidFill>
               <a:round/>
@@ -2346,7 +2334,7 @@
             <a:effectLst/>
           </c:spPr>
         </c:majorGridlines>
-        <c:numFmt formatCode="General" sourceLinked="1"/>
+        <c:numFmt formatCode="#,##0.00" sourceLinked="0"/>
         <c:majorTickMark val="none"/>
         <c:minorTickMark val="none"/>
         <c:tickLblPos val="nextTo"/>
@@ -2362,11 +2350,9 @@
           <a:lstStyle/>
           <a:p>
             <a:pPr>
-              <a:defRPr sz="1400" b="0" i="0" u="none" strike="noStrike" kern="1200" baseline="0">
+              <a:defRPr sz="1100" b="0" i="0" u="none" strike="noStrike" kern="1200" baseline="0">
                 <a:solidFill>
-                  <a:schemeClr val="lt1">
-                    <a:lumMod val="85000"/>
-                  </a:schemeClr>
+                  <a:schemeClr val="bg1"/>
                 </a:solidFill>
                 <a:latin typeface="+mn-lt"/>
                 <a:ea typeface="+mn-ea"/>
@@ -2376,12 +2362,14 @@
             <a:endParaRPr lang="en-US"/>
           </a:p>
         </c:txPr>
-        <c:crossAx val="679547096"/>
+        <c:crossAx val="620035448"/>
         <c:crosses val="autoZero"/>
         <c:crossBetween val="between"/>
       </c:valAx>
       <c:spPr>
-        <a:noFill/>
+        <a:solidFill>
+          <a:schemeClr val="tx1"/>
+        </a:solidFill>
         <a:ln>
           <a:noFill/>
         </a:ln>
@@ -2390,72 +2378,6 @@
     </c:plotArea>
     <c:legend>
       <c:legendPos val="b"/>
-      <c:legendEntry>
-        <c:idx val="0"/>
-        <c:txPr>
-          <a:bodyPr rot="0" spcFirstLastPara="1" vertOverflow="ellipsis" vert="horz" wrap="square" anchor="ctr" anchorCtr="1"/>
-          <a:lstStyle/>
-          <a:p>
-            <a:pPr>
-              <a:defRPr sz="1400" b="0" i="0" u="none" strike="noStrike" kern="1200" baseline="0">
-                <a:solidFill>
-                  <a:schemeClr val="lt1">
-                    <a:lumMod val="85000"/>
-                  </a:schemeClr>
-                </a:solidFill>
-                <a:latin typeface="+mn-lt"/>
-                <a:ea typeface="+mn-ea"/>
-                <a:cs typeface="+mn-cs"/>
-              </a:defRPr>
-            </a:pPr>
-            <a:endParaRPr lang="en-US"/>
-          </a:p>
-        </c:txPr>
-      </c:legendEntry>
-      <c:legendEntry>
-        <c:idx val="1"/>
-        <c:txPr>
-          <a:bodyPr rot="0" spcFirstLastPara="1" vertOverflow="ellipsis" vert="horz" wrap="square" anchor="ctr" anchorCtr="1"/>
-          <a:lstStyle/>
-          <a:p>
-            <a:pPr>
-              <a:defRPr sz="1400" b="0" i="0" u="none" strike="noStrike" kern="1200" baseline="0">
-                <a:solidFill>
-                  <a:schemeClr val="lt1">
-                    <a:lumMod val="85000"/>
-                  </a:schemeClr>
-                </a:solidFill>
-                <a:latin typeface="+mn-lt"/>
-                <a:ea typeface="+mn-ea"/>
-                <a:cs typeface="+mn-cs"/>
-              </a:defRPr>
-            </a:pPr>
-            <a:endParaRPr lang="en-US"/>
-          </a:p>
-        </c:txPr>
-      </c:legendEntry>
-      <c:legendEntry>
-        <c:idx val="2"/>
-        <c:txPr>
-          <a:bodyPr rot="0" spcFirstLastPara="1" vertOverflow="ellipsis" vert="horz" wrap="square" anchor="ctr" anchorCtr="1"/>
-          <a:lstStyle/>
-          <a:p>
-            <a:pPr>
-              <a:defRPr sz="1400" b="0" i="0" u="none" strike="noStrike" kern="1200" baseline="0">
-                <a:solidFill>
-                  <a:schemeClr val="lt1">
-                    <a:lumMod val="85000"/>
-                  </a:schemeClr>
-                </a:solidFill>
-                <a:latin typeface="+mn-lt"/>
-                <a:ea typeface="+mn-ea"/>
-                <a:cs typeface="+mn-cs"/>
-              </a:defRPr>
-            </a:pPr>
-            <a:endParaRPr lang="en-US"/>
-          </a:p>
-        </c:txPr>
-      </c:legendEntry>
       <c:overlay val="0"/>
       <c:spPr>
         <a:noFill/>
@@ -2471,9 +2393,7 @@
           <a:pPr>
             <a:defRPr sz="1400" b="0" i="0" u="none" strike="noStrike" kern="1200" baseline="0">
               <a:solidFill>
-                <a:schemeClr val="lt1">
-                  <a:lumMod val="85000"/>
-                </a:schemeClr>
+                <a:schemeClr val="bg1"/>
               </a:solidFill>
               <a:latin typeface="+mn-lt"/>
               <a:ea typeface="+mn-ea"/>
@@ -2496,28 +2416,17 @@
     <c:showDLblsOverMax val="0"/>
   </c:chart>
   <c:spPr>
-    <a:gradFill flip="none" rotWithShape="1">
-      <a:gsLst>
-        <a:gs pos="0">
-          <a:schemeClr val="dk1">
-            <a:lumMod val="65000"/>
-            <a:lumOff val="35000"/>
-          </a:schemeClr>
-        </a:gs>
-        <a:gs pos="100000">
-          <a:schemeClr val="dk1">
-            <a:lumMod val="85000"/>
-            <a:lumOff val="15000"/>
-          </a:schemeClr>
-        </a:gs>
-      </a:gsLst>
-      <a:path path="circle">
-        <a:fillToRect l="50000" t="50000" r="50000" b="50000"/>
-      </a:path>
-      <a:tileRect/>
-    </a:gradFill>
-    <a:ln>
-      <a:noFill/>
+    <a:solidFill>
+      <a:schemeClr val="tx1"/>
+    </a:solidFill>
+    <a:ln w="9525" cap="flat" cmpd="sng" algn="ctr">
+      <a:solidFill>
+        <a:schemeClr val="tx1">
+          <a:lumMod val="15000"/>
+          <a:lumOff val="85000"/>
+        </a:schemeClr>
+      </a:solidFill>
+      <a:round/>
     </a:ln>
     <a:effectLst/>
   </c:spPr>
@@ -2526,7 +2435,11 @@
     <a:lstStyle/>
     <a:p>
       <a:pPr>
-        <a:defRPr/>
+        <a:defRPr>
+          <a:solidFill>
+            <a:schemeClr val="bg1"/>
+          </a:solidFill>
+        </a:defRPr>
       </a:pPr>
       <a:endParaRPr lang="en-US"/>
     </a:p>
@@ -3154,26 +3067,9 @@
     <c:showDLblsOverMax val="0"/>
   </c:chart>
   <c:spPr>
-    <a:gradFill flip="none" rotWithShape="1">
-      <a:gsLst>
-        <a:gs pos="0">
-          <a:schemeClr val="dk1">
-            <a:lumMod val="65000"/>
-            <a:lumOff val="35000"/>
-          </a:schemeClr>
-        </a:gs>
-        <a:gs pos="100000">
-          <a:schemeClr val="dk1">
-            <a:lumMod val="85000"/>
-            <a:lumOff val="15000"/>
-          </a:schemeClr>
-        </a:gs>
-      </a:gsLst>
-      <a:path path="circle">
-        <a:fillToRect l="50000" t="50000" r="50000" b="50000"/>
-      </a:path>
-      <a:tileRect/>
-    </a:gradFill>
+    <a:solidFill>
+      <a:schemeClr val="tx1"/>
+    </a:solidFill>
     <a:ln>
       <a:noFill/>
     </a:ln>
@@ -3185,6 +3081,469 @@
     <a:p>
       <a:pPr>
         <a:defRPr/>
+      </a:pPr>
+      <a:endParaRPr lang="en-US"/>
+    </a:p>
+  </c:txPr>
+  <c:externalData r:id="rId3">
+    <c:autoUpdate val="0"/>
+  </c:externalData>
+</c:chartSpace>
+</file>
+
+<file path=ppt/charts/chart5.xml><?xml version="1.0" encoding="utf-8"?>
+<c:chartSpace xmlns:c="http://schemas.openxmlformats.org/drawingml/2006/chart" xmlns:a="http://schemas.openxmlformats.org/drawingml/2006/main" xmlns:r="http://schemas.openxmlformats.org/officeDocument/2006/relationships" xmlns:c16r2="http://schemas.microsoft.com/office/drawing/2015/06/chart">
+  <c:date1904 val="0"/>
+  <c:lang val="en-US"/>
+  <c:roundedCorners val="0"/>
+  <mc:AlternateContent xmlns:mc="http://schemas.openxmlformats.org/markup-compatibility/2006">
+    <mc:Choice xmlns:c14="http://schemas.microsoft.com/office/drawing/2007/8/2/chart" Requires="c14">
+      <c14:style val="102"/>
+    </mc:Choice>
+    <mc:Fallback>
+      <c:style val="2"/>
+    </mc:Fallback>
+  </mc:AlternateContent>
+  <c:chart>
+    <c:title>
+      <c:tx>
+        <c:rich>
+          <a:bodyPr rot="0" spcFirstLastPara="1" vertOverflow="ellipsis" vert="horz" wrap="square" anchor="ctr" anchorCtr="1"/>
+          <a:lstStyle/>
+          <a:p>
+            <a:pPr>
+              <a:defRPr sz="1400" b="0" i="0" u="none" strike="noStrike" kern="1200" spc="0" baseline="0">
+                <a:solidFill>
+                  <a:schemeClr val="bg1"/>
+                </a:solidFill>
+                <a:latin typeface="+mn-lt"/>
+                <a:ea typeface="+mn-ea"/>
+                <a:cs typeface="+mn-cs"/>
+              </a:defRPr>
+            </a:pPr>
+            <a:r>
+              <a:rPr lang="en-US" sz="2400" b="1" dirty="0"/>
+              <a:t>Random IO while reading keys</a:t>
+            </a:r>
+          </a:p>
+        </c:rich>
+      </c:tx>
+      <c:overlay val="0"/>
+      <c:spPr>
+        <a:noFill/>
+        <a:ln>
+          <a:noFill/>
+        </a:ln>
+        <a:effectLst/>
+      </c:spPr>
+      <c:txPr>
+        <a:bodyPr rot="0" spcFirstLastPara="1" vertOverflow="ellipsis" vert="horz" wrap="square" anchor="ctr" anchorCtr="1"/>
+        <a:lstStyle/>
+        <a:p>
+          <a:pPr>
+            <a:defRPr sz="1400" b="0" i="0" u="none" strike="noStrike" kern="1200" spc="0" baseline="0">
+              <a:solidFill>
+                <a:schemeClr val="bg1"/>
+              </a:solidFill>
+              <a:latin typeface="+mn-lt"/>
+              <a:ea typeface="+mn-ea"/>
+              <a:cs typeface="+mn-cs"/>
+            </a:defRPr>
+          </a:pPr>
+          <a:endParaRPr lang="en-US"/>
+        </a:p>
+      </c:txPr>
+    </c:title>
+    <c:autoTitleDeleted val="0"/>
+    <c:plotArea>
+      <c:layout/>
+      <c:barChart>
+        <c:barDir val="col"/>
+        <c:grouping val="clustered"/>
+        <c:varyColors val="0"/>
+        <c:ser>
+          <c:idx val="0"/>
+          <c:order val="0"/>
+          <c:tx>
+            <c:strRef>
+              <c:f>Sheet3!$B$60</c:f>
+              <c:strCache>
+                <c:ptCount val="1"/>
+                <c:pt idx="0">
+                  <c:v>t3 io2</c:v>
+                </c:pt>
+              </c:strCache>
+            </c:strRef>
+          </c:tx>
+          <c:spPr>
+            <a:solidFill>
+              <a:schemeClr val="accent1"/>
+            </a:solidFill>
+            <a:ln>
+              <a:noFill/>
+            </a:ln>
+            <a:effectLst/>
+          </c:spPr>
+          <c:invertIfNegative val="0"/>
+          <c:cat>
+            <c:numRef>
+              <c:f>Sheet3!$A$61:$A$63</c:f>
+              <c:numCache>
+                <c:formatCode>General</c:formatCode>
+                <c:ptCount val="3"/>
+                <c:pt idx="0">
+                  <c:v>512</c:v>
+                </c:pt>
+                <c:pt idx="1">
+                  <c:v>4096</c:v>
+                </c:pt>
+                <c:pt idx="2">
+                  <c:v>32768</c:v>
+                </c:pt>
+              </c:numCache>
+            </c:numRef>
+          </c:cat>
+          <c:val>
+            <c:numRef>
+              <c:f>Sheet3!$B$61:$B$63</c:f>
+              <c:numCache>
+                <c:formatCode>General</c:formatCode>
+                <c:ptCount val="3"/>
+                <c:pt idx="0">
+                  <c:v>1.0904800000000001</c:v>
+                </c:pt>
+                <c:pt idx="1">
+                  <c:v>1.2574999999999998</c:v>
+                </c:pt>
+                <c:pt idx="2">
+                  <c:v>2.0150399999999999</c:v>
+                </c:pt>
+              </c:numCache>
+            </c:numRef>
+          </c:val>
+          <c:extLst>
+            <c:ext xmlns:c16="http://schemas.microsoft.com/office/drawing/2014/chart" uri="{C3380CC4-5D6E-409C-BE32-E72D297353CC}">
+              <c16:uniqueId val="{00000000-A7FD-435A-96A4-41B3B86754CC}"/>
+            </c:ext>
+          </c:extLst>
+        </c:ser>
+        <c:ser>
+          <c:idx val="1"/>
+          <c:order val="1"/>
+          <c:tx>
+            <c:strRef>
+              <c:f>Sheet3!$C$60</c:f>
+              <c:strCache>
+                <c:ptCount val="1"/>
+                <c:pt idx="0">
+                  <c:v>D3</c:v>
+                </c:pt>
+              </c:strCache>
+            </c:strRef>
+          </c:tx>
+          <c:spPr>
+            <a:solidFill>
+              <a:schemeClr val="accent2"/>
+            </a:solidFill>
+            <a:ln>
+              <a:noFill/>
+            </a:ln>
+            <a:effectLst/>
+          </c:spPr>
+          <c:invertIfNegative val="0"/>
+          <c:cat>
+            <c:numRef>
+              <c:f>Sheet3!$A$61:$A$63</c:f>
+              <c:numCache>
+                <c:formatCode>General</c:formatCode>
+                <c:ptCount val="3"/>
+                <c:pt idx="0">
+                  <c:v>512</c:v>
+                </c:pt>
+                <c:pt idx="1">
+                  <c:v>4096</c:v>
+                </c:pt>
+                <c:pt idx="2">
+                  <c:v>32768</c:v>
+                </c:pt>
+              </c:numCache>
+            </c:numRef>
+          </c:cat>
+          <c:val>
+            <c:numRef>
+              <c:f>Sheet3!$C$61:$C$63</c:f>
+              <c:numCache>
+                <c:formatCode>General</c:formatCode>
+                <c:ptCount val="3"/>
+                <c:pt idx="0">
+                  <c:v>1.23508</c:v>
+                </c:pt>
+                <c:pt idx="1">
+                  <c:v>1.2037200000000001</c:v>
+                </c:pt>
+                <c:pt idx="2">
+                  <c:v>2.1371199999999999</c:v>
+                </c:pt>
+              </c:numCache>
+            </c:numRef>
+          </c:val>
+          <c:extLst>
+            <c:ext xmlns:c16="http://schemas.microsoft.com/office/drawing/2014/chart" uri="{C3380CC4-5D6E-409C-BE32-E72D297353CC}">
+              <c16:uniqueId val="{00000001-A7FD-435A-96A4-41B3B86754CC}"/>
+            </c:ext>
+          </c:extLst>
+        </c:ser>
+        <c:ser>
+          <c:idx val="2"/>
+          <c:order val="2"/>
+          <c:tx>
+            <c:strRef>
+              <c:f>Sheet3!$D$60</c:f>
+              <c:strCache>
+                <c:ptCount val="1"/>
+                <c:pt idx="0">
+                  <c:v>i4 (nitro)</c:v>
+                </c:pt>
+              </c:strCache>
+            </c:strRef>
+          </c:tx>
+          <c:spPr>
+            <a:solidFill>
+              <a:schemeClr val="accent3"/>
+            </a:solidFill>
+            <a:ln>
+              <a:noFill/>
+            </a:ln>
+            <a:effectLst/>
+          </c:spPr>
+          <c:invertIfNegative val="0"/>
+          <c:cat>
+            <c:numRef>
+              <c:f>Sheet3!$A$61:$A$63</c:f>
+              <c:numCache>
+                <c:formatCode>General</c:formatCode>
+                <c:ptCount val="3"/>
+                <c:pt idx="0">
+                  <c:v>512</c:v>
+                </c:pt>
+                <c:pt idx="1">
+                  <c:v>4096</c:v>
+                </c:pt>
+                <c:pt idx="2">
+                  <c:v>32768</c:v>
+                </c:pt>
+              </c:numCache>
+            </c:numRef>
+          </c:cat>
+          <c:val>
+            <c:numRef>
+              <c:f>Sheet3!$D$61:$D$63</c:f>
+              <c:numCache>
+                <c:formatCode>General</c:formatCode>
+                <c:ptCount val="3"/>
+                <c:pt idx="0">
+                  <c:v>0.75616000000000005</c:v>
+                </c:pt>
+                <c:pt idx="1">
+                  <c:v>0.85816000000000003</c:v>
+                </c:pt>
+                <c:pt idx="2">
+                  <c:v>1.4287599999999998</c:v>
+                </c:pt>
+              </c:numCache>
+            </c:numRef>
+          </c:val>
+          <c:extLst>
+            <c:ext xmlns:c16="http://schemas.microsoft.com/office/drawing/2014/chart" uri="{C3380CC4-5D6E-409C-BE32-E72D297353CC}">
+              <c16:uniqueId val="{00000002-A7FD-435A-96A4-41B3B86754CC}"/>
+            </c:ext>
+          </c:extLst>
+        </c:ser>
+        <c:dLbls>
+          <c:showLegendKey val="0"/>
+          <c:showVal val="0"/>
+          <c:showCatName val="0"/>
+          <c:showSerName val="0"/>
+          <c:showPercent val="0"/>
+          <c:showBubbleSize val="0"/>
+        </c:dLbls>
+        <c:gapWidth val="219"/>
+        <c:axId val="620177192"/>
+        <c:axId val="620178632"/>
+      </c:barChart>
+      <c:catAx>
+        <c:axId val="620177192"/>
+        <c:scaling>
+          <c:orientation val="minMax"/>
+        </c:scaling>
+        <c:delete val="0"/>
+        <c:axPos val="b"/>
+        <c:numFmt formatCode="General" sourceLinked="1"/>
+        <c:majorTickMark val="none"/>
+        <c:minorTickMark val="none"/>
+        <c:tickLblPos val="nextTo"/>
+        <c:spPr>
+          <a:noFill/>
+          <a:ln w="9525" cap="flat" cmpd="sng" algn="ctr">
+            <a:solidFill>
+              <a:schemeClr val="tx1">
+                <a:lumMod val="15000"/>
+                <a:lumOff val="85000"/>
+              </a:schemeClr>
+            </a:solidFill>
+            <a:round/>
+          </a:ln>
+          <a:effectLst/>
+        </c:spPr>
+        <c:txPr>
+          <a:bodyPr rot="-60000000" spcFirstLastPara="1" vertOverflow="ellipsis" vert="horz" wrap="square" anchor="ctr" anchorCtr="1"/>
+          <a:lstStyle/>
+          <a:p>
+            <a:pPr>
+              <a:defRPr sz="900" b="0" i="0" u="none" strike="noStrike" kern="1200" baseline="0">
+                <a:solidFill>
+                  <a:schemeClr val="bg1"/>
+                </a:solidFill>
+                <a:latin typeface="+mn-lt"/>
+                <a:ea typeface="+mn-ea"/>
+                <a:cs typeface="+mn-cs"/>
+              </a:defRPr>
+            </a:pPr>
+            <a:endParaRPr lang="en-US"/>
+          </a:p>
+        </c:txPr>
+        <c:crossAx val="620178632"/>
+        <c:crosses val="autoZero"/>
+        <c:auto val="1"/>
+        <c:lblAlgn val="ctr"/>
+        <c:lblOffset val="100"/>
+        <c:noMultiLvlLbl val="0"/>
+      </c:catAx>
+      <c:valAx>
+        <c:axId val="620178632"/>
+        <c:scaling>
+          <c:orientation val="minMax"/>
+        </c:scaling>
+        <c:delete val="0"/>
+        <c:axPos val="l"/>
+        <c:majorGridlines>
+          <c:spPr>
+            <a:ln w="9525" cap="flat" cmpd="sng" algn="ctr">
+              <a:solidFill>
+                <a:schemeClr val="tx1">
+                  <a:lumMod val="15000"/>
+                  <a:lumOff val="85000"/>
+                </a:schemeClr>
+              </a:solidFill>
+              <a:round/>
+            </a:ln>
+            <a:effectLst/>
+          </c:spPr>
+        </c:majorGridlines>
+        <c:numFmt formatCode="General" sourceLinked="1"/>
+        <c:majorTickMark val="none"/>
+        <c:minorTickMark val="none"/>
+        <c:tickLblPos val="nextTo"/>
+        <c:spPr>
+          <a:noFill/>
+          <a:ln>
+            <a:noFill/>
+          </a:ln>
+          <a:effectLst/>
+        </c:spPr>
+        <c:txPr>
+          <a:bodyPr rot="-60000000" spcFirstLastPara="1" vertOverflow="ellipsis" vert="horz" wrap="square" anchor="ctr" anchorCtr="1"/>
+          <a:lstStyle/>
+          <a:p>
+            <a:pPr>
+              <a:defRPr sz="1200" b="0" i="0" u="none" strike="noStrike" kern="1200" baseline="0">
+                <a:solidFill>
+                  <a:schemeClr val="bg1"/>
+                </a:solidFill>
+                <a:latin typeface="+mn-lt"/>
+                <a:ea typeface="+mn-ea"/>
+                <a:cs typeface="+mn-cs"/>
+              </a:defRPr>
+            </a:pPr>
+            <a:endParaRPr lang="en-US"/>
+          </a:p>
+        </c:txPr>
+        <c:crossAx val="620177192"/>
+        <c:crosses val="autoZero"/>
+        <c:crossBetween val="between"/>
+      </c:valAx>
+      <c:spPr>
+        <a:noFill/>
+        <a:ln>
+          <a:noFill/>
+        </a:ln>
+        <a:effectLst/>
+      </c:spPr>
+    </c:plotArea>
+    <c:legend>
+      <c:legendPos val="b"/>
+      <c:overlay val="0"/>
+      <c:spPr>
+        <a:noFill/>
+        <a:ln>
+          <a:noFill/>
+        </a:ln>
+        <a:effectLst/>
+      </c:spPr>
+      <c:txPr>
+        <a:bodyPr rot="0" spcFirstLastPara="1" vertOverflow="ellipsis" vert="horz" wrap="square" anchor="ctr" anchorCtr="1"/>
+        <a:lstStyle/>
+        <a:p>
+          <a:pPr>
+            <a:defRPr sz="1400" b="0" i="0" u="none" strike="noStrike" kern="1200" baseline="0">
+              <a:solidFill>
+                <a:schemeClr val="bg1"/>
+              </a:solidFill>
+              <a:latin typeface="+mn-lt"/>
+              <a:ea typeface="+mn-ea"/>
+              <a:cs typeface="+mn-cs"/>
+            </a:defRPr>
+          </a:pPr>
+          <a:endParaRPr lang="en-US"/>
+        </a:p>
+      </c:txPr>
+    </c:legend>
+    <c:plotVisOnly val="1"/>
+    <c:dispBlanksAs val="gap"/>
+    <c:extLst>
+      <c:ext xmlns:c16r3="http://schemas.microsoft.com/office/drawing/2017/03/chart" uri="{56B9EC1D-385E-4148-901F-78D8002777C0}">
+        <c16r3:dataDisplayOptions16>
+          <c16r3:dispNaAsBlank val="1"/>
+        </c16r3:dataDisplayOptions16>
+      </c:ext>
+    </c:extLst>
+    <c:showDLblsOverMax val="0"/>
+  </c:chart>
+  <c:spPr>
+    <a:solidFill>
+      <a:schemeClr val="tx1"/>
+    </a:solidFill>
+    <a:ln w="9525" cap="flat" cmpd="sng" algn="ctr">
+      <a:solidFill>
+        <a:schemeClr val="tx1">
+          <a:lumMod val="15000"/>
+          <a:lumOff val="85000"/>
+        </a:schemeClr>
+      </a:solidFill>
+      <a:round/>
+    </a:ln>
+    <a:effectLst/>
+  </c:spPr>
+  <c:txPr>
+    <a:bodyPr/>
+    <a:lstStyle/>
+    <a:p>
+      <a:pPr>
+        <a:defRPr>
+          <a:solidFill>
+            <a:schemeClr val="bg1"/>
+          </a:solidFill>
+        </a:defRPr>
       </a:pPr>
       <a:endParaRPr lang="en-US"/>
     </a:p>
@@ -3316,6 +3675,46 @@
 </file>
 
 <file path=ppt/charts/colors4.xml><?xml version="1.0" encoding="utf-8"?>
+<cs:colorStyle xmlns:cs="http://schemas.microsoft.com/office/drawing/2012/chartStyle" xmlns:a="http://schemas.openxmlformats.org/drawingml/2006/main" meth="cycle" id="10">
+  <a:schemeClr val="accent1"/>
+  <a:schemeClr val="accent2"/>
+  <a:schemeClr val="accent3"/>
+  <a:schemeClr val="accent4"/>
+  <a:schemeClr val="accent5"/>
+  <a:schemeClr val="accent6"/>
+  <cs:variation/>
+  <cs:variation>
+    <a:lumMod val="60000"/>
+  </cs:variation>
+  <cs:variation>
+    <a:lumMod val="80000"/>
+    <a:lumOff val="20000"/>
+  </cs:variation>
+  <cs:variation>
+    <a:lumMod val="80000"/>
+  </cs:variation>
+  <cs:variation>
+    <a:lumMod val="60000"/>
+    <a:lumOff val="40000"/>
+  </cs:variation>
+  <cs:variation>
+    <a:lumMod val="50000"/>
+  </cs:variation>
+  <cs:variation>
+    <a:lumMod val="70000"/>
+    <a:lumOff val="30000"/>
+  </cs:variation>
+  <cs:variation>
+    <a:lumMod val="70000"/>
+  </cs:variation>
+  <cs:variation>
+    <a:lumMod val="50000"/>
+    <a:lumOff val="50000"/>
+  </cs:variation>
+</cs:colorStyle>
+</file>
+
+<file path=ppt/charts/colors5.xml><?xml version="1.0" encoding="utf-8"?>
 <cs:colorStyle xmlns:cs="http://schemas.microsoft.com/office/drawing/2012/chartStyle" xmlns:a="http://schemas.openxmlformats.org/drawingml/2006/main" meth="cycle" id="10">
   <a:schemeClr val="accent1"/>
   <a:schemeClr val="accent2"/>
@@ -4362,81 +4761,76 @@
 </file>
 
 <file path=ppt/charts/style3.xml><?xml version="1.0" encoding="utf-8"?>
-<cs:chartStyle xmlns:cs="http://schemas.microsoft.com/office/drawing/2012/chartStyle" xmlns:a="http://schemas.openxmlformats.org/drawingml/2006/main" id="209">
+<cs:chartStyle xmlns:cs="http://schemas.microsoft.com/office/drawing/2012/chartStyle" xmlns:a="http://schemas.openxmlformats.org/drawingml/2006/main" id="332">
   <cs:axisTitle>
     <cs:lnRef idx="0"/>
     <cs:fillRef idx="0"/>
     <cs:effectRef idx="0"/>
     <cs:fontRef idx="minor">
-      <a:schemeClr val="lt1">
-        <a:lumMod val="85000"/>
+      <a:schemeClr val="tx1">
+        <a:lumMod val="65000"/>
+        <a:lumOff val="35000"/>
       </a:schemeClr>
     </cs:fontRef>
-    <cs:defRPr sz="1197" b="1" kern="1200" cap="all"/>
+    <cs:defRPr sz="1000" kern="1200"/>
   </cs:axisTitle>
   <cs:categoryAxis>
     <cs:lnRef idx="0"/>
     <cs:fillRef idx="0"/>
     <cs:effectRef idx="0"/>
     <cs:fontRef idx="minor">
-      <a:schemeClr val="lt1">
-        <a:lumMod val="85000"/>
+      <a:schemeClr val="tx1">
+        <a:lumMod val="65000"/>
+        <a:lumOff val="35000"/>
       </a:schemeClr>
     </cs:fontRef>
     <cs:spPr>
-      <a:ln w="12700" cap="flat" cmpd="sng" algn="ctr">
+      <a:ln w="9525" cap="flat" cmpd="sng" algn="ctr">
         <a:solidFill>
-          <a:schemeClr val="lt1">
-            <a:lumMod val="95000"/>
-            <a:alpha val="54000"/>
+          <a:schemeClr val="tx1">
+            <a:lumMod val="15000"/>
+            <a:lumOff val="85000"/>
           </a:schemeClr>
         </a:solidFill>
         <a:round/>
       </a:ln>
     </cs:spPr>
-    <cs:defRPr sz="1197" kern="1200"/>
+    <cs:defRPr sz="900" kern="1200"/>
   </cs:categoryAxis>
-  <cs:chartArea>
+  <cs:chartArea mods="allowNoFillOverride allowNoLineOverride">
     <cs:lnRef idx="0"/>
     <cs:fillRef idx="0"/>
     <cs:effectRef idx="0"/>
     <cs:fontRef idx="minor">
-      <a:schemeClr val="dk1"/>
+      <a:schemeClr val="tx1"/>
     </cs:fontRef>
     <cs:spPr>
-      <a:gradFill flip="none" rotWithShape="1">
-        <a:gsLst>
-          <a:gs pos="0">
-            <a:schemeClr val="dk1">
-              <a:lumMod val="65000"/>
-              <a:lumOff val="35000"/>
-            </a:schemeClr>
-          </a:gs>
-          <a:gs pos="100000">
-            <a:schemeClr val="dk1">
-              <a:lumMod val="85000"/>
-              <a:lumOff val="15000"/>
-            </a:schemeClr>
-          </a:gs>
-        </a:gsLst>
-        <a:path path="circle">
-          <a:fillToRect l="50000" t="50000" r="50000" b="50000"/>
-        </a:path>
-        <a:tileRect/>
-      </a:gradFill>
+      <a:solidFill>
+        <a:schemeClr val="bg1"/>
+      </a:solidFill>
+      <a:ln w="9525" cap="flat" cmpd="sng" algn="ctr">
+        <a:solidFill>
+          <a:schemeClr val="tx1">
+            <a:lumMod val="15000"/>
+            <a:lumOff val="85000"/>
+          </a:schemeClr>
+        </a:solidFill>
+        <a:round/>
+      </a:ln>
     </cs:spPr>
-    <cs:defRPr sz="1330" kern="1200"/>
+    <cs:defRPr sz="1000" kern="1200"/>
   </cs:chartArea>
   <cs:dataLabel>
     <cs:lnRef idx="0"/>
     <cs:fillRef idx="0"/>
     <cs:effectRef idx="0"/>
     <cs:fontRef idx="minor">
-      <a:schemeClr val="lt1">
-        <a:lumMod val="85000"/>
+      <a:schemeClr val="tx1">
+        <a:lumMod val="75000"/>
+        <a:lumOff val="25000"/>
       </a:schemeClr>
     </cs:fontRef>
-    <cs:defRPr sz="1197" kern="1200"/>
+    <cs:defRPr sz="900" kern="1200"/>
   </cs:dataLabel>
   <cs:dataLabelCallout>
     <cs:lnRef idx="0"/>
@@ -4452,43 +4846,51 @@
       <a:solidFill>
         <a:schemeClr val="lt1"/>
       </a:solidFill>
+      <a:ln>
+        <a:solidFill>
+          <a:schemeClr val="dk1">
+            <a:lumMod val="25000"/>
+            <a:lumOff val="75000"/>
+          </a:schemeClr>
+        </a:solidFill>
+      </a:ln>
     </cs:spPr>
-    <cs:defRPr sz="1197" kern="1200"/>
+    <cs:defRPr sz="900" kern="1200"/>
     <cs:bodyPr rot="0" spcFirstLastPara="1" vertOverflow="clip" horzOverflow="clip" vert="horz" wrap="square" lIns="36576" tIns="18288" rIns="36576" bIns="18288" anchor="ctr" anchorCtr="1">
       <a:spAutoFit/>
     </cs:bodyPr>
   </cs:dataLabelCallout>
   <cs:dataPoint>
     <cs:lnRef idx="0"/>
-    <cs:fillRef idx="3">
+    <cs:fillRef idx="1">
       <cs:styleClr val="auto"/>
     </cs:fillRef>
-    <cs:effectRef idx="3"/>
+    <cs:effectRef idx="0"/>
     <cs:fontRef idx="minor">
-      <a:schemeClr val="lt1"/>
+      <a:schemeClr val="tx1"/>
     </cs:fontRef>
   </cs:dataPoint>
   <cs:dataPoint3D>
     <cs:lnRef idx="0"/>
-    <cs:fillRef idx="3">
+    <cs:fillRef idx="1">
       <cs:styleClr val="auto"/>
     </cs:fillRef>
-    <cs:effectRef idx="3"/>
+    <cs:effectRef idx="0"/>
     <cs:fontRef idx="minor">
-      <a:schemeClr val="lt1"/>
+      <a:schemeClr val="tx1"/>
     </cs:fontRef>
   </cs:dataPoint3D>
   <cs:dataPointLine>
     <cs:lnRef idx="0">
       <cs:styleClr val="auto"/>
     </cs:lnRef>
-    <cs:fillRef idx="3"/>
-    <cs:effectRef idx="3"/>
+    <cs:fillRef idx="1"/>
+    <cs:effectRef idx="0"/>
     <cs:fontRef idx="minor">
-      <a:schemeClr val="lt1"/>
+      <a:schemeClr val="tx1"/>
     </cs:fontRef>
     <cs:spPr>
-      <a:ln w="34925" cap="rnd">
+      <a:ln w="28575" cap="rnd">
         <a:solidFill>
           <a:schemeClr val="phClr"/>
         </a:solidFill>
@@ -4500,31 +4902,30 @@
     <cs:lnRef idx="0">
       <cs:styleClr val="auto"/>
     </cs:lnRef>
-    <cs:fillRef idx="3">
+    <cs:fillRef idx="1">
       <cs:styleClr val="auto"/>
     </cs:fillRef>
-    <cs:effectRef idx="3"/>
+    <cs:effectRef idx="0"/>
     <cs:fontRef idx="minor">
-      <a:schemeClr val="lt1"/>
+      <a:schemeClr val="tx1"/>
     </cs:fontRef>
     <cs:spPr>
       <a:ln w="9525">
         <a:solidFill>
           <a:schemeClr val="phClr"/>
         </a:solidFill>
-        <a:round/>
       </a:ln>
     </cs:spPr>
   </cs:dataPointMarker>
-  <cs:dataPointMarkerLayout symbol="circle" size="6"/>
+  <cs:dataPointMarkerLayout symbol="circle" size="5"/>
   <cs:dataPointWireframe>
     <cs:lnRef idx="0">
       <cs:styleClr val="auto"/>
     </cs:lnRef>
-    <cs:fillRef idx="3"/>
-    <cs:effectRef idx="3"/>
+    <cs:fillRef idx="1"/>
+    <cs:effectRef idx="0"/>
     <cs:fontRef idx="minor">
-      <a:schemeClr val="lt1"/>
+      <a:schemeClr val="tx1"/>
     </cs:fontRef>
     <cs:spPr>
       <a:ln w="9525" cap="rnd">
@@ -4540,41 +4941,44 @@
     <cs:fillRef idx="0"/>
     <cs:effectRef idx="0"/>
     <cs:fontRef idx="minor">
-      <a:schemeClr val="lt1">
-        <a:lumMod val="85000"/>
+      <a:schemeClr val="tx1">
+        <a:lumMod val="65000"/>
+        <a:lumOff val="35000"/>
       </a:schemeClr>
     </cs:fontRef>
     <cs:spPr>
-      <a:ln w="9525">
+      <a:noFill/>
+      <a:ln w="9525" cap="flat" cmpd="sng" algn="ctr">
         <a:solidFill>
-          <a:schemeClr val="lt1">
-            <a:lumMod val="95000"/>
-            <a:alpha val="54000"/>
+          <a:schemeClr val="tx1">
+            <a:lumMod val="15000"/>
+            <a:lumOff val="85000"/>
           </a:schemeClr>
         </a:solidFill>
+        <a:round/>
       </a:ln>
     </cs:spPr>
-    <cs:defRPr sz="1197" kern="1200"/>
+    <cs:defRPr sz="900" kern="1200"/>
   </cs:dataTable>
   <cs:downBar>
     <cs:lnRef idx="0"/>
     <cs:fillRef idx="0"/>
     <cs:effectRef idx="0"/>
     <cs:fontRef idx="minor">
-      <a:schemeClr val="lt1"/>
+      <a:schemeClr val="dk1"/>
     </cs:fontRef>
     <cs:spPr>
       <a:solidFill>
         <a:schemeClr val="dk1">
-          <a:lumMod val="75000"/>
-          <a:lumOff val="25000"/>
+          <a:lumMod val="65000"/>
+          <a:lumOff val="35000"/>
         </a:schemeClr>
       </a:solidFill>
       <a:ln w="9525">
         <a:solidFill>
-          <a:schemeClr val="lt1">
-            <a:lumMod val="95000"/>
-            <a:alpha val="54000"/>
+          <a:schemeClr val="tx1">
+            <a:lumMod val="65000"/>
+            <a:lumOff val="35000"/>
           </a:schemeClr>
         </a:solidFill>
       </a:ln>
@@ -4585,17 +4989,17 @@
     <cs:fillRef idx="0"/>
     <cs:effectRef idx="0"/>
     <cs:fontRef idx="minor">
-      <a:schemeClr val="lt1"/>
+      <a:schemeClr val="tx1"/>
     </cs:fontRef>
     <cs:spPr>
-      <a:ln w="9525">
+      <a:ln w="9525" cap="flat" cmpd="sng" algn="ctr">
         <a:solidFill>
-          <a:schemeClr val="lt1">
-            <a:lumMod val="95000"/>
-            <a:alpha val="54000"/>
+          <a:schemeClr val="tx1">
+            <a:lumMod val="35000"/>
+            <a:lumOff val="65000"/>
           </a:schemeClr>
         </a:solidFill>
-        <a:prstDash val="dash"/>
+        <a:round/>
       </a:ln>
     </cs:spPr>
   </cs:dropLine>
@@ -4604,13 +5008,14 @@
     <cs:fillRef idx="0"/>
     <cs:effectRef idx="0"/>
     <cs:fontRef idx="minor">
-      <a:schemeClr val="lt1"/>
+      <a:schemeClr val="tx1"/>
     </cs:fontRef>
     <cs:spPr>
       <a:ln w="9525" cap="flat" cmpd="sng" algn="ctr">
         <a:solidFill>
-          <a:schemeClr val="lt1">
-            <a:lumMod val="95000"/>
+          <a:schemeClr val="tx1">
+            <a:lumMod val="65000"/>
+            <a:lumOff val="35000"/>
           </a:schemeClr>
         </a:solidFill>
         <a:round/>
@@ -4622,22 +5027,28 @@
     <cs:fillRef idx="0"/>
     <cs:effectRef idx="0"/>
     <cs:fontRef idx="minor">
-      <a:schemeClr val="lt1"/>
+      <a:schemeClr val="tx1"/>
     </cs:fontRef>
+    <cs:spPr>
+      <a:noFill/>
+      <a:ln>
+        <a:noFill/>
+      </a:ln>
+    </cs:spPr>
   </cs:floor>
   <cs:gridlineMajor>
     <cs:lnRef idx="0"/>
     <cs:fillRef idx="0"/>
     <cs:effectRef idx="0"/>
     <cs:fontRef idx="minor">
-      <a:schemeClr val="lt1"/>
+      <a:schemeClr val="tx1"/>
     </cs:fontRef>
     <cs:spPr>
       <a:ln w="9525" cap="flat" cmpd="sng" algn="ctr">
         <a:solidFill>
-          <a:schemeClr val="lt1">
-            <a:lumMod val="95000"/>
-            <a:alpha val="10000"/>
+          <a:schemeClr val="tx1">
+            <a:lumMod val="15000"/>
+            <a:lumOff val="85000"/>
           </a:schemeClr>
         </a:solidFill>
         <a:round/>
@@ -4649,16 +5060,17 @@
     <cs:fillRef idx="0"/>
     <cs:effectRef idx="0"/>
     <cs:fontRef idx="minor">
-      <a:schemeClr val="lt1"/>
+      <a:schemeClr val="tx1"/>
     </cs:fontRef>
     <cs:spPr>
-      <a:ln>
+      <a:ln w="9525" cap="flat" cmpd="sng" algn="ctr">
         <a:solidFill>
-          <a:schemeClr val="lt1">
-            <a:lumMod val="95000"/>
-            <a:alpha val="5000"/>
+          <a:schemeClr val="tx1">
+            <a:lumMod val="5000"/>
+            <a:lumOff val="95000"/>
           </a:schemeClr>
         </a:solidFill>
+        <a:round/>
       </a:ln>
     </cs:spPr>
   </cs:gridlineMinor>
@@ -4667,17 +5079,17 @@
     <cs:fillRef idx="0"/>
     <cs:effectRef idx="0"/>
     <cs:fontRef idx="minor">
-      <a:schemeClr val="lt1"/>
+      <a:schemeClr val="tx1"/>
     </cs:fontRef>
     <cs:spPr>
-      <a:ln w="9525">
+      <a:ln w="9525" cap="flat" cmpd="sng" algn="ctr">
         <a:solidFill>
-          <a:schemeClr val="lt1">
-            <a:lumMod val="95000"/>
-            <a:alpha val="54000"/>
+          <a:schemeClr val="tx1">
+            <a:lumMod val="75000"/>
+            <a:lumOff val="25000"/>
           </a:schemeClr>
         </a:solidFill>
-        <a:prstDash val="dash"/>
+        <a:round/>
       </a:ln>
     </cs:spPr>
   </cs:hiLoLine>
@@ -4686,16 +5098,17 @@
     <cs:fillRef idx="0"/>
     <cs:effectRef idx="0"/>
     <cs:fontRef idx="minor">
-      <a:schemeClr val="lt1"/>
+      <a:schemeClr val="tx1"/>
     </cs:fontRef>
     <cs:spPr>
-      <a:ln w="9525">
+      <a:ln w="9525" cap="flat" cmpd="sng" algn="ctr">
         <a:solidFill>
-          <a:schemeClr val="lt1">
-            <a:lumMod val="95000"/>
-            <a:alpha val="54000"/>
+          <a:schemeClr val="tx1">
+            <a:lumMod val="35000"/>
+            <a:lumOff val="65000"/>
           </a:schemeClr>
         </a:solidFill>
+        <a:round/>
       </a:ln>
     </cs:spPr>
   </cs:leaderLine>
@@ -4704,26 +5117,27 @@
     <cs:fillRef idx="0"/>
     <cs:effectRef idx="0"/>
     <cs:fontRef idx="minor">
-      <a:schemeClr val="lt1">
-        <a:lumMod val="85000"/>
+      <a:schemeClr val="tx1">
+        <a:lumMod val="65000"/>
+        <a:lumOff val="35000"/>
       </a:schemeClr>
     </cs:fontRef>
-    <cs:defRPr sz="1197" kern="1200"/>
+    <cs:defRPr sz="900" kern="1200"/>
   </cs:legend>
-  <cs:plotArea>
+  <cs:plotArea mods="allowNoFillOverride allowNoLineOverride">
     <cs:lnRef idx="0"/>
     <cs:fillRef idx="0"/>
     <cs:effectRef idx="0"/>
     <cs:fontRef idx="minor">
-      <a:schemeClr val="lt1"/>
+      <a:schemeClr val="tx1"/>
     </cs:fontRef>
   </cs:plotArea>
-  <cs:plotArea3D>
+  <cs:plotArea3D mods="allowNoFillOverride allowNoLineOverride">
     <cs:lnRef idx="0"/>
     <cs:fillRef idx="0"/>
     <cs:effectRef idx="0"/>
     <cs:fontRef idx="minor">
-      <a:schemeClr val="lt1"/>
+      <a:schemeClr val="tx1"/>
     </cs:fontRef>
   </cs:plotArea3D>
   <cs:seriesAxis>
@@ -4731,36 +5145,26 @@
     <cs:fillRef idx="0"/>
     <cs:effectRef idx="0"/>
     <cs:fontRef idx="minor">
-      <a:schemeClr val="lt1">
-        <a:lumMod val="85000"/>
+      <a:schemeClr val="tx1">
+        <a:lumMod val="65000"/>
+        <a:lumOff val="35000"/>
       </a:schemeClr>
     </cs:fontRef>
-    <cs:spPr>
-      <a:ln w="12700" cap="flat" cmpd="sng" algn="ctr">
-        <a:solidFill>
-          <a:schemeClr val="lt1">
-            <a:lumMod val="95000"/>
-            <a:alpha val="54000"/>
-          </a:schemeClr>
-        </a:solidFill>
-        <a:round/>
-      </a:ln>
-    </cs:spPr>
-    <cs:defRPr sz="1197" kern="1200"/>
+    <cs:defRPr sz="900" kern="1200"/>
   </cs:seriesAxis>
   <cs:seriesLine>
     <cs:lnRef idx="0"/>
     <cs:fillRef idx="0"/>
     <cs:effectRef idx="0"/>
     <cs:fontRef idx="minor">
-      <a:schemeClr val="lt1"/>
+      <a:schemeClr val="tx1"/>
     </cs:fontRef>
     <cs:spPr>
       <a:ln w="9525" cap="flat" cmpd="sng" algn="ctr">
         <a:solidFill>
-          <a:schemeClr val="lt1">
-            <a:lumMod val="95000"/>
-            <a:alpha val="54000"/>
+          <a:schemeClr val="tx1">
+            <a:lumMod val="35000"/>
+            <a:lumOff val="65000"/>
           </a:schemeClr>
         </a:solidFill>
         <a:round/>
@@ -4772,19 +5176,12 @@
     <cs:fillRef idx="0"/>
     <cs:effectRef idx="0"/>
     <cs:fontRef idx="minor">
-      <a:schemeClr val="lt1">
-        <a:lumMod val="95000"/>
+      <a:schemeClr val="tx1">
+        <a:lumMod val="65000"/>
+        <a:lumOff val="35000"/>
       </a:schemeClr>
     </cs:fontRef>
-    <cs:defRPr sz="2128" b="1" kern="1200" spc="100" baseline="0">
-      <a:effectLst>
-        <a:outerShdw blurRad="50800" dist="38100" dir="5400000" algn="t" rotWithShape="0">
-          <a:prstClr val="black">
-            <a:alpha val="40000"/>
-          </a:prstClr>
-        </a:outerShdw>
-      </a:effectLst>
-    </cs:defRPr>
+    <cs:defRPr sz="1400" b="0" kern="1200" spc="0" baseline="0"/>
   </cs:title>
   <cs:trendline>
     <cs:lnRef idx="0">
@@ -4793,13 +5190,14 @@
     <cs:fillRef idx="0"/>
     <cs:effectRef idx="0"/>
     <cs:fontRef idx="minor">
-      <a:schemeClr val="lt1"/>
+      <a:schemeClr val="tx1"/>
     </cs:fontRef>
     <cs:spPr>
       <a:ln w="19050" cap="rnd">
         <a:solidFill>
           <a:schemeClr val="phClr"/>
         </a:solidFill>
+        <a:prstDash val="sysDot"/>
       </a:ln>
     </cs:spPr>
   </cs:trendline>
@@ -4808,18 +5206,19 @@
     <cs:fillRef idx="0"/>
     <cs:effectRef idx="0"/>
     <cs:fontRef idx="minor">
-      <a:schemeClr val="lt1">
-        <a:lumMod val="85000"/>
+      <a:schemeClr val="tx1">
+        <a:lumMod val="65000"/>
+        <a:lumOff val="35000"/>
       </a:schemeClr>
     </cs:fontRef>
-    <cs:defRPr sz="1197" kern="1200"/>
+    <cs:defRPr sz="900" kern="1200"/>
   </cs:trendlineLabel>
   <cs:upBar>
     <cs:lnRef idx="0"/>
     <cs:fillRef idx="0"/>
     <cs:effectRef idx="0"/>
     <cs:fontRef idx="minor">
-      <a:schemeClr val="lt1"/>
+      <a:schemeClr val="dk1"/>
     </cs:fontRef>
     <cs:spPr>
       <a:solidFill>
@@ -4827,9 +5226,9 @@
       </a:solidFill>
       <a:ln w="9525">
         <a:solidFill>
-          <a:schemeClr val="lt1">
-            <a:lumMod val="95000"/>
-            <a:alpha val="54000"/>
+          <a:schemeClr val="tx1">
+            <a:lumMod val="15000"/>
+            <a:lumOff val="85000"/>
           </a:schemeClr>
         </a:solidFill>
       </a:ln>
@@ -4840,19 +5239,26 @@
     <cs:fillRef idx="0"/>
     <cs:effectRef idx="0"/>
     <cs:fontRef idx="minor">
-      <a:schemeClr val="lt1">
-        <a:lumMod val="85000"/>
+      <a:schemeClr val="tx1">
+        <a:lumMod val="65000"/>
+        <a:lumOff val="35000"/>
       </a:schemeClr>
     </cs:fontRef>
-    <cs:defRPr sz="1197" kern="1200"/>
+    <cs:defRPr sz="900" kern="1200"/>
   </cs:valueAxis>
   <cs:wall>
     <cs:lnRef idx="0"/>
     <cs:fillRef idx="0"/>
     <cs:effectRef idx="0"/>
     <cs:fontRef idx="minor">
-      <a:schemeClr val="lt1"/>
+      <a:schemeClr val="tx1"/>
     </cs:fontRef>
+    <cs:spPr>
+      <a:noFill/>
+      <a:ln>
+        <a:noFill/>
+      </a:ln>
+    </cs:spPr>
   </cs:wall>
 </cs:chartStyle>
 </file>
@@ -5349,6 +5755,509 @@
     <cs:fontRef idx="minor">
       <a:schemeClr val="lt1"/>
     </cs:fontRef>
+  </cs:wall>
+</cs:chartStyle>
+</file>
+
+<file path=ppt/charts/style5.xml><?xml version="1.0" encoding="utf-8"?>
+<cs:chartStyle xmlns:cs="http://schemas.microsoft.com/office/drawing/2012/chartStyle" xmlns:a="http://schemas.openxmlformats.org/drawingml/2006/main" id="332">
+  <cs:axisTitle>
+    <cs:lnRef idx="0"/>
+    <cs:fillRef idx="0"/>
+    <cs:effectRef idx="0"/>
+    <cs:fontRef idx="minor">
+      <a:schemeClr val="tx1">
+        <a:lumMod val="65000"/>
+        <a:lumOff val="35000"/>
+      </a:schemeClr>
+    </cs:fontRef>
+    <cs:defRPr sz="1000" kern="1200"/>
+  </cs:axisTitle>
+  <cs:categoryAxis>
+    <cs:lnRef idx="0"/>
+    <cs:fillRef idx="0"/>
+    <cs:effectRef idx="0"/>
+    <cs:fontRef idx="minor">
+      <a:schemeClr val="tx1">
+        <a:lumMod val="65000"/>
+        <a:lumOff val="35000"/>
+      </a:schemeClr>
+    </cs:fontRef>
+    <cs:spPr>
+      <a:ln w="9525" cap="flat" cmpd="sng" algn="ctr">
+        <a:solidFill>
+          <a:schemeClr val="tx1">
+            <a:lumMod val="15000"/>
+            <a:lumOff val="85000"/>
+          </a:schemeClr>
+        </a:solidFill>
+        <a:round/>
+      </a:ln>
+    </cs:spPr>
+    <cs:defRPr sz="900" kern="1200"/>
+  </cs:categoryAxis>
+  <cs:chartArea mods="allowNoFillOverride allowNoLineOverride">
+    <cs:lnRef idx="0"/>
+    <cs:fillRef idx="0"/>
+    <cs:effectRef idx="0"/>
+    <cs:fontRef idx="minor">
+      <a:schemeClr val="tx1"/>
+    </cs:fontRef>
+    <cs:spPr>
+      <a:solidFill>
+        <a:schemeClr val="bg1"/>
+      </a:solidFill>
+      <a:ln w="9525" cap="flat" cmpd="sng" algn="ctr">
+        <a:solidFill>
+          <a:schemeClr val="tx1">
+            <a:lumMod val="15000"/>
+            <a:lumOff val="85000"/>
+          </a:schemeClr>
+        </a:solidFill>
+        <a:round/>
+      </a:ln>
+    </cs:spPr>
+    <cs:defRPr sz="1000" kern="1200"/>
+  </cs:chartArea>
+  <cs:dataLabel>
+    <cs:lnRef idx="0"/>
+    <cs:fillRef idx="0"/>
+    <cs:effectRef idx="0"/>
+    <cs:fontRef idx="minor">
+      <a:schemeClr val="tx1">
+        <a:lumMod val="75000"/>
+        <a:lumOff val="25000"/>
+      </a:schemeClr>
+    </cs:fontRef>
+    <cs:defRPr sz="900" kern="1200"/>
+  </cs:dataLabel>
+  <cs:dataLabelCallout>
+    <cs:lnRef idx="0"/>
+    <cs:fillRef idx="0"/>
+    <cs:effectRef idx="0"/>
+    <cs:fontRef idx="minor">
+      <a:schemeClr val="dk1">
+        <a:lumMod val="65000"/>
+        <a:lumOff val="35000"/>
+      </a:schemeClr>
+    </cs:fontRef>
+    <cs:spPr>
+      <a:solidFill>
+        <a:schemeClr val="lt1"/>
+      </a:solidFill>
+      <a:ln>
+        <a:solidFill>
+          <a:schemeClr val="dk1">
+            <a:lumMod val="25000"/>
+            <a:lumOff val="75000"/>
+          </a:schemeClr>
+        </a:solidFill>
+      </a:ln>
+    </cs:spPr>
+    <cs:defRPr sz="900" kern="1200"/>
+    <cs:bodyPr rot="0" spcFirstLastPara="1" vertOverflow="clip" horzOverflow="clip" vert="horz" wrap="square" lIns="36576" tIns="18288" rIns="36576" bIns="18288" anchor="ctr" anchorCtr="1">
+      <a:spAutoFit/>
+    </cs:bodyPr>
+  </cs:dataLabelCallout>
+  <cs:dataPoint>
+    <cs:lnRef idx="0"/>
+    <cs:fillRef idx="1">
+      <cs:styleClr val="auto"/>
+    </cs:fillRef>
+    <cs:effectRef idx="0"/>
+    <cs:fontRef idx="minor">
+      <a:schemeClr val="tx1"/>
+    </cs:fontRef>
+  </cs:dataPoint>
+  <cs:dataPoint3D>
+    <cs:lnRef idx="0"/>
+    <cs:fillRef idx="1">
+      <cs:styleClr val="auto"/>
+    </cs:fillRef>
+    <cs:effectRef idx="0"/>
+    <cs:fontRef idx="minor">
+      <a:schemeClr val="tx1"/>
+    </cs:fontRef>
+  </cs:dataPoint3D>
+  <cs:dataPointLine>
+    <cs:lnRef idx="0">
+      <cs:styleClr val="auto"/>
+    </cs:lnRef>
+    <cs:fillRef idx="1"/>
+    <cs:effectRef idx="0"/>
+    <cs:fontRef idx="minor">
+      <a:schemeClr val="tx1"/>
+    </cs:fontRef>
+    <cs:spPr>
+      <a:ln w="28575" cap="rnd">
+        <a:solidFill>
+          <a:schemeClr val="phClr"/>
+        </a:solidFill>
+        <a:round/>
+      </a:ln>
+    </cs:spPr>
+  </cs:dataPointLine>
+  <cs:dataPointMarker>
+    <cs:lnRef idx="0">
+      <cs:styleClr val="auto"/>
+    </cs:lnRef>
+    <cs:fillRef idx="1">
+      <cs:styleClr val="auto"/>
+    </cs:fillRef>
+    <cs:effectRef idx="0"/>
+    <cs:fontRef idx="minor">
+      <a:schemeClr val="tx1"/>
+    </cs:fontRef>
+    <cs:spPr>
+      <a:ln w="9525">
+        <a:solidFill>
+          <a:schemeClr val="phClr"/>
+        </a:solidFill>
+      </a:ln>
+    </cs:spPr>
+  </cs:dataPointMarker>
+  <cs:dataPointMarkerLayout symbol="circle" size="5"/>
+  <cs:dataPointWireframe>
+    <cs:lnRef idx="0">
+      <cs:styleClr val="auto"/>
+    </cs:lnRef>
+    <cs:fillRef idx="1"/>
+    <cs:effectRef idx="0"/>
+    <cs:fontRef idx="minor">
+      <a:schemeClr val="tx1"/>
+    </cs:fontRef>
+    <cs:spPr>
+      <a:ln w="9525" cap="rnd">
+        <a:solidFill>
+          <a:schemeClr val="phClr"/>
+        </a:solidFill>
+        <a:round/>
+      </a:ln>
+    </cs:spPr>
+  </cs:dataPointWireframe>
+  <cs:dataTable>
+    <cs:lnRef idx="0"/>
+    <cs:fillRef idx="0"/>
+    <cs:effectRef idx="0"/>
+    <cs:fontRef idx="minor">
+      <a:schemeClr val="tx1">
+        <a:lumMod val="65000"/>
+        <a:lumOff val="35000"/>
+      </a:schemeClr>
+    </cs:fontRef>
+    <cs:spPr>
+      <a:noFill/>
+      <a:ln w="9525" cap="flat" cmpd="sng" algn="ctr">
+        <a:solidFill>
+          <a:schemeClr val="tx1">
+            <a:lumMod val="15000"/>
+            <a:lumOff val="85000"/>
+          </a:schemeClr>
+        </a:solidFill>
+        <a:round/>
+      </a:ln>
+    </cs:spPr>
+    <cs:defRPr sz="900" kern="1200"/>
+  </cs:dataTable>
+  <cs:downBar>
+    <cs:lnRef idx="0"/>
+    <cs:fillRef idx="0"/>
+    <cs:effectRef idx="0"/>
+    <cs:fontRef idx="minor">
+      <a:schemeClr val="dk1"/>
+    </cs:fontRef>
+    <cs:spPr>
+      <a:solidFill>
+        <a:schemeClr val="dk1">
+          <a:lumMod val="65000"/>
+          <a:lumOff val="35000"/>
+        </a:schemeClr>
+      </a:solidFill>
+      <a:ln w="9525">
+        <a:solidFill>
+          <a:schemeClr val="tx1">
+            <a:lumMod val="65000"/>
+            <a:lumOff val="35000"/>
+          </a:schemeClr>
+        </a:solidFill>
+      </a:ln>
+    </cs:spPr>
+  </cs:downBar>
+  <cs:dropLine>
+    <cs:lnRef idx="0"/>
+    <cs:fillRef idx="0"/>
+    <cs:effectRef idx="0"/>
+    <cs:fontRef idx="minor">
+      <a:schemeClr val="tx1"/>
+    </cs:fontRef>
+    <cs:spPr>
+      <a:ln w="9525" cap="flat" cmpd="sng" algn="ctr">
+        <a:solidFill>
+          <a:schemeClr val="tx1">
+            <a:lumMod val="35000"/>
+            <a:lumOff val="65000"/>
+          </a:schemeClr>
+        </a:solidFill>
+        <a:round/>
+      </a:ln>
+    </cs:spPr>
+  </cs:dropLine>
+  <cs:errorBar>
+    <cs:lnRef idx="0"/>
+    <cs:fillRef idx="0"/>
+    <cs:effectRef idx="0"/>
+    <cs:fontRef idx="minor">
+      <a:schemeClr val="tx1"/>
+    </cs:fontRef>
+    <cs:spPr>
+      <a:ln w="9525" cap="flat" cmpd="sng" algn="ctr">
+        <a:solidFill>
+          <a:schemeClr val="tx1">
+            <a:lumMod val="65000"/>
+            <a:lumOff val="35000"/>
+          </a:schemeClr>
+        </a:solidFill>
+        <a:round/>
+      </a:ln>
+    </cs:spPr>
+  </cs:errorBar>
+  <cs:floor>
+    <cs:lnRef idx="0"/>
+    <cs:fillRef idx="0"/>
+    <cs:effectRef idx="0"/>
+    <cs:fontRef idx="minor">
+      <a:schemeClr val="tx1"/>
+    </cs:fontRef>
+    <cs:spPr>
+      <a:noFill/>
+      <a:ln>
+        <a:noFill/>
+      </a:ln>
+    </cs:spPr>
+  </cs:floor>
+  <cs:gridlineMajor>
+    <cs:lnRef idx="0"/>
+    <cs:fillRef idx="0"/>
+    <cs:effectRef idx="0"/>
+    <cs:fontRef idx="minor">
+      <a:schemeClr val="tx1"/>
+    </cs:fontRef>
+    <cs:spPr>
+      <a:ln w="9525" cap="flat" cmpd="sng" algn="ctr">
+        <a:solidFill>
+          <a:schemeClr val="tx1">
+            <a:lumMod val="15000"/>
+            <a:lumOff val="85000"/>
+          </a:schemeClr>
+        </a:solidFill>
+        <a:round/>
+      </a:ln>
+    </cs:spPr>
+  </cs:gridlineMajor>
+  <cs:gridlineMinor>
+    <cs:lnRef idx="0"/>
+    <cs:fillRef idx="0"/>
+    <cs:effectRef idx="0"/>
+    <cs:fontRef idx="minor">
+      <a:schemeClr val="tx1"/>
+    </cs:fontRef>
+    <cs:spPr>
+      <a:ln w="9525" cap="flat" cmpd="sng" algn="ctr">
+        <a:solidFill>
+          <a:schemeClr val="tx1">
+            <a:lumMod val="5000"/>
+            <a:lumOff val="95000"/>
+          </a:schemeClr>
+        </a:solidFill>
+        <a:round/>
+      </a:ln>
+    </cs:spPr>
+  </cs:gridlineMinor>
+  <cs:hiLoLine>
+    <cs:lnRef idx="0"/>
+    <cs:fillRef idx="0"/>
+    <cs:effectRef idx="0"/>
+    <cs:fontRef idx="minor">
+      <a:schemeClr val="tx1"/>
+    </cs:fontRef>
+    <cs:spPr>
+      <a:ln w="9525" cap="flat" cmpd="sng" algn="ctr">
+        <a:solidFill>
+          <a:schemeClr val="tx1">
+            <a:lumMod val="75000"/>
+            <a:lumOff val="25000"/>
+          </a:schemeClr>
+        </a:solidFill>
+        <a:round/>
+      </a:ln>
+    </cs:spPr>
+  </cs:hiLoLine>
+  <cs:leaderLine>
+    <cs:lnRef idx="0"/>
+    <cs:fillRef idx="0"/>
+    <cs:effectRef idx="0"/>
+    <cs:fontRef idx="minor">
+      <a:schemeClr val="tx1"/>
+    </cs:fontRef>
+    <cs:spPr>
+      <a:ln w="9525" cap="flat" cmpd="sng" algn="ctr">
+        <a:solidFill>
+          <a:schemeClr val="tx1">
+            <a:lumMod val="35000"/>
+            <a:lumOff val="65000"/>
+          </a:schemeClr>
+        </a:solidFill>
+        <a:round/>
+      </a:ln>
+    </cs:spPr>
+  </cs:leaderLine>
+  <cs:legend>
+    <cs:lnRef idx="0"/>
+    <cs:fillRef idx="0"/>
+    <cs:effectRef idx="0"/>
+    <cs:fontRef idx="minor">
+      <a:schemeClr val="tx1">
+        <a:lumMod val="65000"/>
+        <a:lumOff val="35000"/>
+      </a:schemeClr>
+    </cs:fontRef>
+    <cs:defRPr sz="900" kern="1200"/>
+  </cs:legend>
+  <cs:plotArea mods="allowNoFillOverride allowNoLineOverride">
+    <cs:lnRef idx="0"/>
+    <cs:fillRef idx="0"/>
+    <cs:effectRef idx="0"/>
+    <cs:fontRef idx="minor">
+      <a:schemeClr val="tx1"/>
+    </cs:fontRef>
+  </cs:plotArea>
+  <cs:plotArea3D mods="allowNoFillOverride allowNoLineOverride">
+    <cs:lnRef idx="0"/>
+    <cs:fillRef idx="0"/>
+    <cs:effectRef idx="0"/>
+    <cs:fontRef idx="minor">
+      <a:schemeClr val="tx1"/>
+    </cs:fontRef>
+  </cs:plotArea3D>
+  <cs:seriesAxis>
+    <cs:lnRef idx="0"/>
+    <cs:fillRef idx="0"/>
+    <cs:effectRef idx="0"/>
+    <cs:fontRef idx="minor">
+      <a:schemeClr val="tx1">
+        <a:lumMod val="65000"/>
+        <a:lumOff val="35000"/>
+      </a:schemeClr>
+    </cs:fontRef>
+    <cs:defRPr sz="900" kern="1200"/>
+  </cs:seriesAxis>
+  <cs:seriesLine>
+    <cs:lnRef idx="0"/>
+    <cs:fillRef idx="0"/>
+    <cs:effectRef idx="0"/>
+    <cs:fontRef idx="minor">
+      <a:schemeClr val="tx1"/>
+    </cs:fontRef>
+    <cs:spPr>
+      <a:ln w="9525" cap="flat" cmpd="sng" algn="ctr">
+        <a:solidFill>
+          <a:schemeClr val="tx1">
+            <a:lumMod val="35000"/>
+            <a:lumOff val="65000"/>
+          </a:schemeClr>
+        </a:solidFill>
+        <a:round/>
+      </a:ln>
+    </cs:spPr>
+  </cs:seriesLine>
+  <cs:title>
+    <cs:lnRef idx="0"/>
+    <cs:fillRef idx="0"/>
+    <cs:effectRef idx="0"/>
+    <cs:fontRef idx="minor">
+      <a:schemeClr val="tx1">
+        <a:lumMod val="65000"/>
+        <a:lumOff val="35000"/>
+      </a:schemeClr>
+    </cs:fontRef>
+    <cs:defRPr sz="1400" b="0" kern="1200" spc="0" baseline="0"/>
+  </cs:title>
+  <cs:trendline>
+    <cs:lnRef idx="0">
+      <cs:styleClr val="auto"/>
+    </cs:lnRef>
+    <cs:fillRef idx="0"/>
+    <cs:effectRef idx="0"/>
+    <cs:fontRef idx="minor">
+      <a:schemeClr val="tx1"/>
+    </cs:fontRef>
+    <cs:spPr>
+      <a:ln w="19050" cap="rnd">
+        <a:solidFill>
+          <a:schemeClr val="phClr"/>
+        </a:solidFill>
+        <a:prstDash val="sysDot"/>
+      </a:ln>
+    </cs:spPr>
+  </cs:trendline>
+  <cs:trendlineLabel>
+    <cs:lnRef idx="0"/>
+    <cs:fillRef idx="0"/>
+    <cs:effectRef idx="0"/>
+    <cs:fontRef idx="minor">
+      <a:schemeClr val="tx1">
+        <a:lumMod val="65000"/>
+        <a:lumOff val="35000"/>
+      </a:schemeClr>
+    </cs:fontRef>
+    <cs:defRPr sz="900" kern="1200"/>
+  </cs:trendlineLabel>
+  <cs:upBar>
+    <cs:lnRef idx="0"/>
+    <cs:fillRef idx="0"/>
+    <cs:effectRef idx="0"/>
+    <cs:fontRef idx="minor">
+      <a:schemeClr val="dk1"/>
+    </cs:fontRef>
+    <cs:spPr>
+      <a:solidFill>
+        <a:schemeClr val="lt1"/>
+      </a:solidFill>
+      <a:ln w="9525">
+        <a:solidFill>
+          <a:schemeClr val="tx1">
+            <a:lumMod val="15000"/>
+            <a:lumOff val="85000"/>
+          </a:schemeClr>
+        </a:solidFill>
+      </a:ln>
+    </cs:spPr>
+  </cs:upBar>
+  <cs:valueAxis>
+    <cs:lnRef idx="0"/>
+    <cs:fillRef idx="0"/>
+    <cs:effectRef idx="0"/>
+    <cs:fontRef idx="minor">
+      <a:schemeClr val="tx1">
+        <a:lumMod val="65000"/>
+        <a:lumOff val="35000"/>
+      </a:schemeClr>
+    </cs:fontRef>
+    <cs:defRPr sz="900" kern="1200"/>
+  </cs:valueAxis>
+  <cs:wall>
+    <cs:lnRef idx="0"/>
+    <cs:fillRef idx="0"/>
+    <cs:effectRef idx="0"/>
+    <cs:fontRef idx="minor">
+      <a:schemeClr val="tx1"/>
+    </cs:fontRef>
+    <cs:spPr>
+      <a:noFill/>
+      <a:ln>
+        <a:noFill/>
+      </a:ln>
+    </cs:spPr>
   </cs:wall>
 </cs:chartStyle>
 </file>
@@ -12779,7 +13688,7 @@
           <a:p>
             <a:fld id="{BE2A43AE-C781-437F-82F9-639F52CA20CD}" type="datetimeFigureOut">
               <a:rPr lang="en-US" smtClean="0"/>
-              <a:t>4/25/2023</a:t>
+              <a:t>4/26/2023</a:t>
             </a:fld>
             <a:endParaRPr lang="en-US"/>
           </a:p>
@@ -13628,6 +14537,97 @@
           <a:bodyPr/>
           <a:lstStyle/>
           <a:p>
+            <a:r>
+              <a:rPr lang="en-US" dirty="0"/>
+              <a:t>What </a:t>
+            </a:r>
+            <a:r>
+              <a:rPr lang="en-US"/>
+              <a:t>to beat</a:t>
+            </a:r>
+          </a:p>
+        </p:txBody>
+      </p:sp>
+      <p:sp>
+        <p:nvSpPr>
+          <p:cNvPr id="4" name="Slide Number Placeholder 3"/>
+          <p:cNvSpPr>
+            <a:spLocks noGrp="1"/>
+          </p:cNvSpPr>
+          <p:nvPr>
+            <p:ph type="sldNum" sz="quarter" idx="5"/>
+          </p:nvPr>
+        </p:nvSpPr>
+        <p:spPr/>
+        <p:txBody>
+          <a:bodyPr/>
+          <a:lstStyle/>
+          <a:p>
+            <a:fld id="{1BFF8EC0-4E85-4B5B-B1AE-D39CEADE6519}" type="slidenum">
+              <a:rPr lang="en-US" smtClean="0"/>
+              <a:t>8</a:t>
+            </a:fld>
+            <a:endParaRPr lang="en-US"/>
+          </a:p>
+        </p:txBody>
+      </p:sp>
+    </p:spTree>
+    <p:extLst>
+      <p:ext uri="{BB962C8B-B14F-4D97-AF65-F5344CB8AC3E}">
+        <p14:creationId xmlns:p14="http://schemas.microsoft.com/office/powerpoint/2010/main" val="42855071"/>
+      </p:ext>
+    </p:extLst>
+  </p:cSld>
+  <p:clrMapOvr>
+    <a:masterClrMapping/>
+  </p:clrMapOvr>
+</p:notes>
+</file>
+
+<file path=ppt/notesSlides/notesSlide6.xml><?xml version="1.0" encoding="utf-8"?>
+<p:notes xmlns:a="http://schemas.openxmlformats.org/drawingml/2006/main" xmlns:r="http://schemas.openxmlformats.org/officeDocument/2006/relationships" xmlns:p="http://schemas.openxmlformats.org/presentationml/2006/main">
+  <p:cSld>
+    <p:spTree>
+      <p:nvGrpSpPr>
+        <p:cNvPr id="1" name=""/>
+        <p:cNvGrpSpPr/>
+        <p:nvPr/>
+      </p:nvGrpSpPr>
+      <p:grpSpPr>
+        <a:xfrm>
+          <a:off x="0" y="0"/>
+          <a:ext cx="0" cy="0"/>
+          <a:chOff x="0" y="0"/>
+          <a:chExt cx="0" cy="0"/>
+        </a:xfrm>
+      </p:grpSpPr>
+      <p:sp>
+        <p:nvSpPr>
+          <p:cNvPr id="2" name="Slide Image Placeholder 1"/>
+          <p:cNvSpPr>
+            <a:spLocks noGrp="1" noRot="1" noChangeAspect="1"/>
+          </p:cNvSpPr>
+          <p:nvPr>
+            <p:ph type="sldImg"/>
+          </p:nvPr>
+        </p:nvSpPr>
+        <p:spPr/>
+      </p:sp>
+      <p:sp>
+        <p:nvSpPr>
+          <p:cNvPr id="3" name="Notes Placeholder 2"/>
+          <p:cNvSpPr>
+            <a:spLocks noGrp="1"/>
+          </p:cNvSpPr>
+          <p:nvPr>
+            <p:ph type="body" idx="1"/>
+          </p:nvPr>
+        </p:nvSpPr>
+        <p:spPr/>
+        <p:txBody>
+          <a:bodyPr/>
+          <a:lstStyle/>
+          <a:p>
             <a:endParaRPr lang="en-US" dirty="0"/>
           </a:p>
         </p:txBody>
@@ -13659,6 +14659,90 @@
     <p:extLst>
       <p:ext uri="{BB962C8B-B14F-4D97-AF65-F5344CB8AC3E}">
         <p14:creationId xmlns:p14="http://schemas.microsoft.com/office/powerpoint/2010/main" val="2899586045"/>
+      </p:ext>
+    </p:extLst>
+  </p:cSld>
+  <p:clrMapOvr>
+    <a:masterClrMapping/>
+  </p:clrMapOvr>
+</p:notes>
+</file>
+
+<file path=ppt/notesSlides/notesSlide7.xml><?xml version="1.0" encoding="utf-8"?>
+<p:notes xmlns:a="http://schemas.openxmlformats.org/drawingml/2006/main" xmlns:r="http://schemas.openxmlformats.org/officeDocument/2006/relationships" xmlns:p="http://schemas.openxmlformats.org/presentationml/2006/main">
+  <p:cSld>
+    <p:spTree>
+      <p:nvGrpSpPr>
+        <p:cNvPr id="1" name=""/>
+        <p:cNvGrpSpPr/>
+        <p:nvPr/>
+      </p:nvGrpSpPr>
+      <p:grpSpPr>
+        <a:xfrm>
+          <a:off x="0" y="0"/>
+          <a:ext cx="0" cy="0"/>
+          <a:chOff x="0" y="0"/>
+          <a:chExt cx="0" cy="0"/>
+        </a:xfrm>
+      </p:grpSpPr>
+      <p:sp>
+        <p:nvSpPr>
+          <p:cNvPr id="2" name="Slide Image Placeholder 1"/>
+          <p:cNvSpPr>
+            <a:spLocks noGrp="1" noRot="1" noChangeAspect="1"/>
+          </p:cNvSpPr>
+          <p:nvPr>
+            <p:ph type="sldImg"/>
+          </p:nvPr>
+        </p:nvSpPr>
+        <p:spPr/>
+      </p:sp>
+      <p:sp>
+        <p:nvSpPr>
+          <p:cNvPr id="3" name="Notes Placeholder 2"/>
+          <p:cNvSpPr>
+            <a:spLocks noGrp="1"/>
+          </p:cNvSpPr>
+          <p:nvPr>
+            <p:ph type="body" idx="1"/>
+          </p:nvPr>
+        </p:nvSpPr>
+        <p:spPr/>
+        <p:txBody>
+          <a:bodyPr/>
+          <a:lstStyle/>
+          <a:p>
+            <a:endParaRPr lang="en-US" dirty="0"/>
+          </a:p>
+        </p:txBody>
+      </p:sp>
+      <p:sp>
+        <p:nvSpPr>
+          <p:cNvPr id="4" name="Slide Number Placeholder 3"/>
+          <p:cNvSpPr>
+            <a:spLocks noGrp="1"/>
+          </p:cNvSpPr>
+          <p:nvPr>
+            <p:ph type="sldNum" sz="quarter" idx="5"/>
+          </p:nvPr>
+        </p:nvSpPr>
+        <p:spPr/>
+        <p:txBody>
+          <a:bodyPr/>
+          <a:lstStyle/>
+          <a:p>
+            <a:fld id="{1BFF8EC0-4E85-4B5B-B1AE-D39CEADE6519}" type="slidenum">
+              <a:rPr lang="en-US" smtClean="0"/>
+              <a:t>11</a:t>
+            </a:fld>
+            <a:endParaRPr lang="en-US"/>
+          </a:p>
+        </p:txBody>
+      </p:sp>
+    </p:spTree>
+    <p:extLst>
+      <p:ext uri="{BB962C8B-B14F-4D97-AF65-F5344CB8AC3E}">
+        <p14:creationId xmlns:p14="http://schemas.microsoft.com/office/powerpoint/2010/main" val="3047772127"/>
       </p:ext>
     </p:extLst>
   </p:cSld>
@@ -13815,7 +14899,7 @@
           <a:p>
             <a:fld id="{65DDBF0C-176C-41A2-A7B0-D55ED202E141}" type="datetimeFigureOut">
               <a:rPr lang="en-US" smtClean="0"/>
-              <a:t>4/25/2023</a:t>
+              <a:t>4/26/2023</a:t>
             </a:fld>
             <a:endParaRPr lang="en-US"/>
           </a:p>
@@ -14013,7 +15097,7 @@
           <a:p>
             <a:fld id="{65DDBF0C-176C-41A2-A7B0-D55ED202E141}" type="datetimeFigureOut">
               <a:rPr lang="en-US" smtClean="0"/>
-              <a:t>4/25/2023</a:t>
+              <a:t>4/26/2023</a:t>
             </a:fld>
             <a:endParaRPr lang="en-US"/>
           </a:p>
@@ -14221,7 +15305,7 @@
           <a:p>
             <a:fld id="{65DDBF0C-176C-41A2-A7B0-D55ED202E141}" type="datetimeFigureOut">
               <a:rPr lang="en-US" smtClean="0"/>
-              <a:t>4/25/2023</a:t>
+              <a:t>4/26/2023</a:t>
             </a:fld>
             <a:endParaRPr lang="en-US"/>
           </a:p>
@@ -14419,7 +15503,7 @@
           <a:p>
             <a:fld id="{65DDBF0C-176C-41A2-A7B0-D55ED202E141}" type="datetimeFigureOut">
               <a:rPr lang="en-US" smtClean="0"/>
-              <a:t>4/25/2023</a:t>
+              <a:t>4/26/2023</a:t>
             </a:fld>
             <a:endParaRPr lang="en-US"/>
           </a:p>
@@ -14694,7 +15778,7 @@
           <a:p>
             <a:fld id="{65DDBF0C-176C-41A2-A7B0-D55ED202E141}" type="datetimeFigureOut">
               <a:rPr lang="en-US" smtClean="0"/>
-              <a:t>4/25/2023</a:t>
+              <a:t>4/26/2023</a:t>
             </a:fld>
             <a:endParaRPr lang="en-US"/>
           </a:p>
@@ -14959,7 +16043,7 @@
           <a:p>
             <a:fld id="{65DDBF0C-176C-41A2-A7B0-D55ED202E141}" type="datetimeFigureOut">
               <a:rPr lang="en-US" smtClean="0"/>
-              <a:t>4/25/2023</a:t>
+              <a:t>4/26/2023</a:t>
             </a:fld>
             <a:endParaRPr lang="en-US"/>
           </a:p>
@@ -15371,7 +16455,7 @@
           <a:p>
             <a:fld id="{65DDBF0C-176C-41A2-A7B0-D55ED202E141}" type="datetimeFigureOut">
               <a:rPr lang="en-US" smtClean="0"/>
-              <a:t>4/25/2023</a:t>
+              <a:t>4/26/2023</a:t>
             </a:fld>
             <a:endParaRPr lang="en-US"/>
           </a:p>
@@ -15512,7 +16596,7 @@
           <a:p>
             <a:fld id="{65DDBF0C-176C-41A2-A7B0-D55ED202E141}" type="datetimeFigureOut">
               <a:rPr lang="en-US" smtClean="0"/>
-              <a:t>4/25/2023</a:t>
+              <a:t>4/26/2023</a:t>
             </a:fld>
             <a:endParaRPr lang="en-US"/>
           </a:p>
@@ -15625,7 +16709,7 @@
           <a:p>
             <a:fld id="{65DDBF0C-176C-41A2-A7B0-D55ED202E141}" type="datetimeFigureOut">
               <a:rPr lang="en-US" smtClean="0"/>
-              <a:t>4/25/2023</a:t>
+              <a:t>4/26/2023</a:t>
             </a:fld>
             <a:endParaRPr lang="en-US"/>
           </a:p>
@@ -15936,7 +17020,7 @@
           <a:p>
             <a:fld id="{65DDBF0C-176C-41A2-A7B0-D55ED202E141}" type="datetimeFigureOut">
               <a:rPr lang="en-US" smtClean="0"/>
-              <a:t>4/25/2023</a:t>
+              <a:t>4/26/2023</a:t>
             </a:fld>
             <a:endParaRPr lang="en-US"/>
           </a:p>
@@ -16224,7 +17308,7 @@
           <a:p>
             <a:fld id="{65DDBF0C-176C-41A2-A7B0-D55ED202E141}" type="datetimeFigureOut">
               <a:rPr lang="en-US" smtClean="0"/>
-              <a:t>4/25/2023</a:t>
+              <a:t>4/26/2023</a:t>
             </a:fld>
             <a:endParaRPr lang="en-US"/>
           </a:p>
@@ -16465,7 +17549,7 @@
           <a:p>
             <a:fld id="{65DDBF0C-176C-41A2-A7B0-D55ED202E141}" type="datetimeFigureOut">
               <a:rPr lang="en-US" smtClean="0"/>
-              <a:t>4/25/2023</a:t>
+              <a:t>4/26/2023</a:t>
             </a:fld>
             <a:endParaRPr lang="en-US"/>
           </a:p>
@@ -17663,7 +18747,7 @@
             <a:pPr algn="ctr"/>
             <a:r>
               <a:rPr lang="en-US" sz="2400" dirty="0"/>
-              <a:t>These are the most compute intensive task for various instance types </a:t>
+              <a:t>This is the most compute intensive task for various instance types </a:t>
             </a:r>
           </a:p>
           <a:p>
@@ -17677,10 +18761,10 @@
       </p:sp>
       <p:graphicFrame>
         <p:nvGraphicFramePr>
-          <p:cNvPr id="4" name="Chart 3">
+          <p:cNvPr id="7" name="Chart 6">
             <a:extLst>
               <a:ext uri="{FF2B5EF4-FFF2-40B4-BE49-F238E27FC236}">
-                <a16:creationId xmlns:a16="http://schemas.microsoft.com/office/drawing/2014/main" id="{E14C9B38-8B25-8CE4-973B-70C0B29407F6}"/>
+                <a16:creationId xmlns:a16="http://schemas.microsoft.com/office/drawing/2014/main" id="{CE3DB3EA-9359-4C64-9B8E-EEA0C4598F10}"/>
               </a:ext>
             </a:extLst>
           </p:cNvPr>
@@ -17690,14 +18774,14 @@
           <p:nvPr>
             <p:extLst>
               <p:ext uri="{D42A27DB-BD31-4B8C-83A1-F6EECF244321}">
-                <p14:modId xmlns:p14="http://schemas.microsoft.com/office/powerpoint/2010/main" val="1796511011"/>
+                <p14:modId xmlns:p14="http://schemas.microsoft.com/office/powerpoint/2010/main" val="3107733128"/>
               </p:ext>
             </p:extLst>
           </p:nvPr>
         </p:nvGraphicFramePr>
         <p:xfrm>
-          <a:off x="2892489" y="1371599"/>
-          <a:ext cx="6400800" cy="4114800"/>
+          <a:off x="2434442" y="1287624"/>
+          <a:ext cx="7315200" cy="4048767"/>
         </p:xfrm>
         <a:graphic>
           <a:graphicData uri="http://schemas.openxmlformats.org/drawingml/2006/chart">
@@ -17719,6 +18803,481 @@
 </file>
 
 <file path=ppt/slides/slide11.xml><?xml version="1.0" encoding="utf-8"?>
+<p:sld xmlns:a="http://schemas.openxmlformats.org/drawingml/2006/main" xmlns:r="http://schemas.openxmlformats.org/officeDocument/2006/relationships" xmlns:p="http://schemas.openxmlformats.org/presentationml/2006/main">
+  <p:cSld>
+    <p:spTree>
+      <p:nvGrpSpPr>
+        <p:cNvPr id="1" name=""/>
+        <p:cNvGrpSpPr/>
+        <p:nvPr/>
+      </p:nvGrpSpPr>
+      <p:grpSpPr>
+        <a:xfrm>
+          <a:off x="0" y="0"/>
+          <a:ext cx="0" cy="0"/>
+          <a:chOff x="0" y="0"/>
+          <a:chExt cx="0" cy="0"/>
+        </a:xfrm>
+      </p:grpSpPr>
+      <p:sp>
+        <p:nvSpPr>
+          <p:cNvPr id="2" name="Title 1">
+            <a:extLst>
+              <a:ext uri="{FF2B5EF4-FFF2-40B4-BE49-F238E27FC236}">
+                <a16:creationId xmlns:a16="http://schemas.microsoft.com/office/drawing/2014/main" id="{D0B87F8E-5D83-4513-9285-8A122C4A62CB}"/>
+              </a:ext>
+            </a:extLst>
+          </p:cNvPr>
+          <p:cNvSpPr>
+            <a:spLocks noGrp="1"/>
+          </p:cNvSpPr>
+          <p:nvPr>
+            <p:ph type="title"/>
+          </p:nvPr>
+        </p:nvSpPr>
+        <p:spPr>
+          <a:xfrm>
+            <a:off x="838200" y="308428"/>
+            <a:ext cx="10515600" cy="745218"/>
+          </a:xfrm>
+        </p:spPr>
+        <p:txBody>
+          <a:bodyPr/>
+          <a:lstStyle/>
+          <a:p>
+            <a:r>
+              <a:rPr lang="en-US" dirty="0"/>
+              <a:t>Disk Types Tested</a:t>
+            </a:r>
+          </a:p>
+        </p:txBody>
+      </p:sp>
+      <p:cxnSp>
+        <p:nvCxnSpPr>
+          <p:cNvPr id="5" name="Straight Connector 4">
+            <a:extLst>
+              <a:ext uri="{FF2B5EF4-FFF2-40B4-BE49-F238E27FC236}">
+                <a16:creationId xmlns:a16="http://schemas.microsoft.com/office/drawing/2014/main" id="{86EF85BD-B585-F4FA-AB4B-371C19D22622}"/>
+              </a:ext>
+            </a:extLst>
+          </p:cNvPr>
+          <p:cNvCxnSpPr/>
+          <p:nvPr/>
+        </p:nvCxnSpPr>
+        <p:spPr>
+          <a:xfrm>
+            <a:off x="615820" y="1287624"/>
+            <a:ext cx="10954139" cy="0"/>
+          </a:xfrm>
+          <a:prstGeom prst="line">
+            <a:avLst/>
+          </a:prstGeom>
+          <a:ln w="19050">
+            <a:solidFill>
+              <a:schemeClr val="bg1">
+                <a:lumMod val="50000"/>
+              </a:schemeClr>
+            </a:solidFill>
+            <a:prstDash val="sysDash"/>
+          </a:ln>
+        </p:spPr>
+        <p:style>
+          <a:lnRef idx="1">
+            <a:schemeClr val="accent1"/>
+          </a:lnRef>
+          <a:fillRef idx="0">
+            <a:schemeClr val="accent1"/>
+          </a:fillRef>
+          <a:effectRef idx="0">
+            <a:schemeClr val="accent1"/>
+          </a:effectRef>
+          <a:fontRef idx="minor">
+            <a:schemeClr val="tx1"/>
+          </a:fontRef>
+        </p:style>
+      </p:cxnSp>
+      <p:graphicFrame>
+        <p:nvGraphicFramePr>
+          <p:cNvPr id="7" name="Table 7">
+            <a:extLst>
+              <a:ext uri="{FF2B5EF4-FFF2-40B4-BE49-F238E27FC236}">
+                <a16:creationId xmlns:a16="http://schemas.microsoft.com/office/drawing/2014/main" id="{84ACA5BC-BDE2-913E-314A-3878CE2332A3}"/>
+              </a:ext>
+            </a:extLst>
+          </p:cNvPr>
+          <p:cNvGraphicFramePr>
+            <a:graphicFrameLocks noGrp="1"/>
+          </p:cNvGraphicFramePr>
+          <p:nvPr>
+            <p:extLst>
+              <p:ext uri="{D42A27DB-BD31-4B8C-83A1-F6EECF244321}">
+                <p14:modId xmlns:p14="http://schemas.microsoft.com/office/powerpoint/2010/main" val="277800252"/>
+              </p:ext>
+            </p:extLst>
+          </p:nvPr>
+        </p:nvGraphicFramePr>
+        <p:xfrm>
+          <a:off x="2031528" y="1722120"/>
+          <a:ext cx="9012525" cy="2560320"/>
+        </p:xfrm>
+        <a:graphic>
+          <a:graphicData uri="http://schemas.openxmlformats.org/drawingml/2006/table">
+            <a:tbl>
+              <a:tblPr firstRow="1">
+                <a:tableStyleId>{7DF18680-E054-41AD-8BC1-D1AEF772440D}</a:tableStyleId>
+              </a:tblPr>
+              <a:tblGrid>
+                <a:gridCol w="1873258">
+                  <a:extLst>
+                    <a:ext uri="{9D8B030D-6E8A-4147-A177-3AD203B41FA5}">
+                      <a16:colId xmlns:a16="http://schemas.microsoft.com/office/drawing/2014/main" val="3637802696"/>
+                    </a:ext>
+                  </a:extLst>
+                </a:gridCol>
+                <a:gridCol w="4780726">
+                  <a:extLst>
+                    <a:ext uri="{9D8B030D-6E8A-4147-A177-3AD203B41FA5}">
+                      <a16:colId xmlns:a16="http://schemas.microsoft.com/office/drawing/2014/main" val="2471651903"/>
+                    </a:ext>
+                  </a:extLst>
+                </a:gridCol>
+                <a:gridCol w="2358541">
+                  <a:extLst>
+                    <a:ext uri="{9D8B030D-6E8A-4147-A177-3AD203B41FA5}">
+                      <a16:colId xmlns:a16="http://schemas.microsoft.com/office/drawing/2014/main" val="2856192351"/>
+                    </a:ext>
+                  </a:extLst>
+                </a:gridCol>
+              </a:tblGrid>
+              <a:tr h="384738">
+                <a:tc>
+                  <a:txBody>
+                    <a:bodyPr/>
+                    <a:lstStyle/>
+                    <a:p>
+                      <a:pPr algn="ctr"/>
+                      <a:r>
+                        <a:rPr lang="en-US" sz="2200" dirty="0">
+                          <a:solidFill>
+                            <a:schemeClr val="tx1"/>
+                          </a:solidFill>
+                        </a:rPr>
+                        <a:t>Designation</a:t>
+                      </a:r>
+                    </a:p>
+                  </a:txBody>
+                  <a:tcPr>
+                    <a:solidFill>
+                      <a:schemeClr val="accent5">
+                        <a:alpha val="40000"/>
+                      </a:schemeClr>
+                    </a:solidFill>
+                  </a:tcPr>
+                </a:tc>
+                <a:tc>
+                  <a:txBody>
+                    <a:bodyPr/>
+                    <a:lstStyle/>
+                    <a:p>
+                      <a:pPr algn="ctr"/>
+                      <a:r>
+                        <a:rPr lang="en-US" sz="2200" dirty="0">
+                          <a:solidFill>
+                            <a:schemeClr val="tx1"/>
+                          </a:solidFill>
+                        </a:rPr>
+                        <a:t>Measured Speed</a:t>
+                      </a:r>
+                    </a:p>
+                  </a:txBody>
+                  <a:tcPr>
+                    <a:solidFill>
+                      <a:schemeClr val="accent5">
+                        <a:alpha val="40000"/>
+                      </a:schemeClr>
+                    </a:solidFill>
+                  </a:tcPr>
+                </a:tc>
+                <a:tc>
+                  <a:txBody>
+                    <a:bodyPr/>
+                    <a:lstStyle/>
+                    <a:p>
+                      <a:pPr algn="ctr"/>
+                      <a:r>
+                        <a:rPr lang="en-US" sz="2200" dirty="0">
+                          <a:solidFill>
+                            <a:schemeClr val="tx1"/>
+                          </a:solidFill>
+                        </a:rPr>
+                        <a:t>Size</a:t>
+                      </a:r>
+                    </a:p>
+                  </a:txBody>
+                  <a:tcPr>
+                    <a:solidFill>
+                      <a:schemeClr val="accent5">
+                        <a:alpha val="40000"/>
+                      </a:schemeClr>
+                    </a:solidFill>
+                  </a:tcPr>
+                </a:tc>
+                <a:extLst>
+                  <a:ext uri="{0D108BD9-81ED-4DB2-BD59-A6C34878D82A}">
+                    <a16:rowId xmlns:a16="http://schemas.microsoft.com/office/drawing/2014/main" val="1086210387"/>
+                  </a:ext>
+                </a:extLst>
+              </a:tr>
+              <a:tr h="370840">
+                <a:tc>
+                  <a:txBody>
+                    <a:bodyPr/>
+                    <a:lstStyle/>
+                    <a:p>
+                      <a:r>
+                        <a:rPr lang="en-US" sz="2200" dirty="0"/>
+                        <a:t>GP2</a:t>
+                      </a:r>
+                    </a:p>
+                  </a:txBody>
+                  <a:tcPr/>
+                </a:tc>
+                <a:tc>
+                  <a:txBody>
+                    <a:bodyPr/>
+                    <a:lstStyle/>
+                    <a:p>
+                      <a:r>
+                        <a:rPr lang="en-US" sz="2200" dirty="0"/>
+                        <a:t>81.3 MB /sec</a:t>
+                      </a:r>
+                    </a:p>
+                  </a:txBody>
+                  <a:tcPr/>
+                </a:tc>
+                <a:tc>
+                  <a:txBody>
+                    <a:bodyPr/>
+                    <a:lstStyle/>
+                    <a:p>
+                      <a:r>
+                        <a:rPr lang="en-US" sz="2200" dirty="0"/>
+                        <a:t>8 GB</a:t>
+                      </a:r>
+                    </a:p>
+                  </a:txBody>
+                  <a:tcPr/>
+                </a:tc>
+                <a:extLst>
+                  <a:ext uri="{0D108BD9-81ED-4DB2-BD59-A6C34878D82A}">
+                    <a16:rowId xmlns:a16="http://schemas.microsoft.com/office/drawing/2014/main" val="3424524635"/>
+                  </a:ext>
+                </a:extLst>
+              </a:tr>
+              <a:tr h="370840">
+                <a:tc>
+                  <a:txBody>
+                    <a:bodyPr/>
+                    <a:lstStyle/>
+                    <a:p>
+                      <a:r>
+                        <a:rPr lang="en-US" sz="2200" dirty="0"/>
+                        <a:t>GP3</a:t>
+                      </a:r>
+                    </a:p>
+                  </a:txBody>
+                  <a:tcPr/>
+                </a:tc>
+                <a:tc>
+                  <a:txBody>
+                    <a:bodyPr/>
+                    <a:lstStyle/>
+                    <a:p>
+                      <a:r>
+                        <a:rPr lang="en-US" sz="2200" dirty="0"/>
+                        <a:t>260 MB /sec</a:t>
+                      </a:r>
+                    </a:p>
+                  </a:txBody>
+                  <a:tcPr/>
+                </a:tc>
+                <a:tc>
+                  <a:txBody>
+                    <a:bodyPr/>
+                    <a:lstStyle/>
+                    <a:p>
+                      <a:endParaRPr lang="en-US" sz="2200" dirty="0"/>
+                    </a:p>
+                  </a:txBody>
+                  <a:tcPr/>
+                </a:tc>
+                <a:extLst>
+                  <a:ext uri="{0D108BD9-81ED-4DB2-BD59-A6C34878D82A}">
+                    <a16:rowId xmlns:a16="http://schemas.microsoft.com/office/drawing/2014/main" val="215558811"/>
+                  </a:ext>
+                </a:extLst>
+              </a:tr>
+              <a:tr h="370840">
+                <a:tc>
+                  <a:txBody>
+                    <a:bodyPr/>
+                    <a:lstStyle/>
+                    <a:p>
+                      <a:r>
+                        <a:rPr lang="en-US" sz="2200" dirty="0"/>
+                        <a:t>IO2</a:t>
+                      </a:r>
+                    </a:p>
+                  </a:txBody>
+                  <a:tcPr/>
+                </a:tc>
+                <a:tc>
+                  <a:txBody>
+                    <a:bodyPr/>
+                    <a:lstStyle/>
+                    <a:p>
+                      <a:r>
+                        <a:rPr lang="en-US" sz="2200" dirty="0"/>
+                        <a:t>330 MB /sec</a:t>
+                      </a:r>
+                    </a:p>
+                  </a:txBody>
+                  <a:tcPr/>
+                </a:tc>
+                <a:tc>
+                  <a:txBody>
+                    <a:bodyPr/>
+                    <a:lstStyle/>
+                    <a:p>
+                      <a:r>
+                        <a:rPr lang="en-US" sz="2200" dirty="0"/>
+                        <a:t>10 GB*</a:t>
+                      </a:r>
+                    </a:p>
+                  </a:txBody>
+                  <a:tcPr/>
+                </a:tc>
+                <a:extLst>
+                  <a:ext uri="{0D108BD9-81ED-4DB2-BD59-A6C34878D82A}">
+                    <a16:rowId xmlns:a16="http://schemas.microsoft.com/office/drawing/2014/main" val="951036050"/>
+                  </a:ext>
+                </a:extLst>
+              </a:tr>
+              <a:tr h="370840">
+                <a:tc>
+                  <a:txBody>
+                    <a:bodyPr/>
+                    <a:lstStyle/>
+                    <a:p>
+                      <a:r>
+                        <a:rPr lang="en-US" sz="2200" dirty="0"/>
+                        <a:t>D3</a:t>
+                      </a:r>
+                    </a:p>
+                  </a:txBody>
+                  <a:tcPr/>
+                </a:tc>
+                <a:tc>
+                  <a:txBody>
+                    <a:bodyPr/>
+                    <a:lstStyle/>
+                    <a:p>
+                      <a:r>
+                        <a:rPr lang="en-US" sz="2200" dirty="0"/>
+                        <a:t>181 MB /sec</a:t>
+                      </a:r>
+                    </a:p>
+                  </a:txBody>
+                  <a:tcPr/>
+                </a:tc>
+                <a:tc>
+                  <a:txBody>
+                    <a:bodyPr/>
+                    <a:lstStyle/>
+                    <a:p>
+                      <a:r>
+                        <a:rPr lang="en-US" sz="2200" dirty="0"/>
+                        <a:t>1.8 TB**</a:t>
+                      </a:r>
+                    </a:p>
+                  </a:txBody>
+                  <a:tcPr/>
+                </a:tc>
+                <a:extLst>
+                  <a:ext uri="{0D108BD9-81ED-4DB2-BD59-A6C34878D82A}">
+                    <a16:rowId xmlns:a16="http://schemas.microsoft.com/office/drawing/2014/main" val="3253797614"/>
+                  </a:ext>
+                </a:extLst>
+              </a:tr>
+              <a:tr h="370840">
+                <a:tc>
+                  <a:txBody>
+                    <a:bodyPr/>
+                    <a:lstStyle/>
+                    <a:p>
+                      <a:r>
+                        <a:rPr lang="en-US" sz="2200" dirty="0"/>
+                        <a:t>I4 </a:t>
+                      </a:r>
+                      <a:r>
+                        <a:rPr lang="en-US" sz="2200" dirty="0" err="1"/>
+                        <a:t>xlarge</a:t>
+                      </a:r>
+                      <a:endParaRPr lang="en-US" sz="2200" dirty="0"/>
+                    </a:p>
+                  </a:txBody>
+                  <a:tcPr/>
+                </a:tc>
+                <a:tc>
+                  <a:txBody>
+                    <a:bodyPr/>
+                    <a:lstStyle/>
+                    <a:p>
+                      <a:r>
+                        <a:rPr lang="en-US" sz="2200" dirty="0"/>
+                        <a:t>1050 MB / sec</a:t>
+                      </a:r>
+                    </a:p>
+                  </a:txBody>
+                  <a:tcPr/>
+                </a:tc>
+                <a:tc>
+                  <a:txBody>
+                    <a:bodyPr/>
+                    <a:lstStyle/>
+                    <a:p>
+                      <a:r>
+                        <a:rPr lang="en-US" sz="2200" dirty="0"/>
+                        <a:t>800 GB**</a:t>
+                      </a:r>
+                    </a:p>
+                  </a:txBody>
+                  <a:tcPr/>
+                </a:tc>
+                <a:extLst>
+                  <a:ext uri="{0D108BD9-81ED-4DB2-BD59-A6C34878D82A}">
+                    <a16:rowId xmlns:a16="http://schemas.microsoft.com/office/drawing/2014/main" val="2931539327"/>
+                  </a:ext>
+                </a:extLst>
+              </a:tr>
+            </a:tbl>
+          </a:graphicData>
+        </a:graphic>
+      </p:graphicFrame>
+    </p:spTree>
+    <p:extLst>
+      <p:ext uri="{BB962C8B-B14F-4D97-AF65-F5344CB8AC3E}">
+        <p14:creationId xmlns:p14="http://schemas.microsoft.com/office/powerpoint/2010/main" val="1712309537"/>
+      </p:ext>
+    </p:extLst>
+  </p:cSld>
+  <p:clrMapOvr>
+    <a:masterClrMapping/>
+  </p:clrMapOvr>
+</p:sld>
+</file>
+
+<file path=ppt/slides/slide12.xml><?xml version="1.0" encoding="utf-8"?>
 <p:sld xmlns:a="http://schemas.openxmlformats.org/drawingml/2006/main" xmlns:r="http://schemas.openxmlformats.org/officeDocument/2006/relationships" xmlns:p="http://schemas.openxmlformats.org/presentationml/2006/main">
   <p:cSld>
     <p:spTree>
@@ -17826,8 +19385,8 @@
         </p:nvSpPr>
         <p:spPr>
           <a:xfrm>
-            <a:off x="3348842" y="5570374"/>
-            <a:ext cx="5617027" cy="738664"/>
+            <a:off x="2809362" y="5559343"/>
+            <a:ext cx="6567054" cy="738664"/>
           </a:xfrm>
           <a:prstGeom prst="rect">
             <a:avLst/>
@@ -17843,7 +19402,7 @@
             <a:pPr algn="ctr"/>
             <a:r>
               <a:rPr lang="en-US" sz="2400" dirty="0"/>
-              <a:t>This is randomly retrieving the records. </a:t>
+              <a:t>This is randomly retrieving the records T3 large </a:t>
             </a:r>
           </a:p>
           <a:p>
@@ -17870,14 +19429,14 @@
           <p:nvPr>
             <p:extLst>
               <p:ext uri="{D42A27DB-BD31-4B8C-83A1-F6EECF244321}">
-                <p14:modId xmlns:p14="http://schemas.microsoft.com/office/powerpoint/2010/main" val="4119521761"/>
+                <p14:modId xmlns:p14="http://schemas.microsoft.com/office/powerpoint/2010/main" val="949694825"/>
               </p:ext>
             </p:extLst>
           </p:nvPr>
         </p:nvGraphicFramePr>
         <p:xfrm>
-          <a:off x="2892489" y="1371599"/>
-          <a:ext cx="6400800" cy="4114800"/>
+          <a:off x="2458192" y="1287625"/>
+          <a:ext cx="7315199" cy="4037740"/>
         </p:xfrm>
         <a:graphic>
           <a:graphicData uri="http://schemas.openxmlformats.org/drawingml/2006/chart">
@@ -17889,6 +19448,186 @@
     <p:extLst>
       <p:ext uri="{BB962C8B-B14F-4D97-AF65-F5344CB8AC3E}">
         <p14:creationId xmlns:p14="http://schemas.microsoft.com/office/powerpoint/2010/main" val="2837903251"/>
+      </p:ext>
+    </p:extLst>
+  </p:cSld>
+  <p:clrMapOvr>
+    <a:masterClrMapping/>
+  </p:clrMapOvr>
+</p:sld>
+</file>
+
+<file path=ppt/slides/slide13.xml><?xml version="1.0" encoding="utf-8"?>
+<p:sld xmlns:a="http://schemas.openxmlformats.org/drawingml/2006/main" xmlns:r="http://schemas.openxmlformats.org/officeDocument/2006/relationships" xmlns:p="http://schemas.openxmlformats.org/presentationml/2006/main">
+  <p:cSld>
+    <p:spTree>
+      <p:nvGrpSpPr>
+        <p:cNvPr id="1" name=""/>
+        <p:cNvGrpSpPr/>
+        <p:nvPr/>
+      </p:nvGrpSpPr>
+      <p:grpSpPr>
+        <a:xfrm>
+          <a:off x="0" y="0"/>
+          <a:ext cx="0" cy="0"/>
+          <a:chOff x="0" y="0"/>
+          <a:chExt cx="0" cy="0"/>
+        </a:xfrm>
+      </p:grpSpPr>
+      <p:sp>
+        <p:nvSpPr>
+          <p:cNvPr id="2" name="Title 1">
+            <a:extLst>
+              <a:ext uri="{FF2B5EF4-FFF2-40B4-BE49-F238E27FC236}">
+                <a16:creationId xmlns:a16="http://schemas.microsoft.com/office/drawing/2014/main" id="{D0B87F8E-5D83-4513-9285-8A122C4A62CB}"/>
+              </a:ext>
+            </a:extLst>
+          </p:cNvPr>
+          <p:cNvSpPr>
+            <a:spLocks noGrp="1"/>
+          </p:cNvSpPr>
+          <p:nvPr>
+            <p:ph type="title"/>
+          </p:nvPr>
+        </p:nvSpPr>
+        <p:spPr>
+          <a:xfrm>
+            <a:off x="838200" y="308428"/>
+            <a:ext cx="10515600" cy="745218"/>
+          </a:xfrm>
+        </p:spPr>
+        <p:txBody>
+          <a:bodyPr/>
+          <a:lstStyle/>
+          <a:p>
+            <a:r>
+              <a:rPr lang="en-US" dirty="0"/>
+              <a:t>Different Disk Types</a:t>
+            </a:r>
+          </a:p>
+        </p:txBody>
+      </p:sp>
+      <p:cxnSp>
+        <p:nvCxnSpPr>
+          <p:cNvPr id="5" name="Straight Connector 4">
+            <a:extLst>
+              <a:ext uri="{FF2B5EF4-FFF2-40B4-BE49-F238E27FC236}">
+                <a16:creationId xmlns:a16="http://schemas.microsoft.com/office/drawing/2014/main" id="{86EF85BD-B585-F4FA-AB4B-371C19D22622}"/>
+              </a:ext>
+            </a:extLst>
+          </p:cNvPr>
+          <p:cNvCxnSpPr/>
+          <p:nvPr/>
+        </p:nvCxnSpPr>
+        <p:spPr>
+          <a:xfrm>
+            <a:off x="615820" y="1287624"/>
+            <a:ext cx="10954139" cy="0"/>
+          </a:xfrm>
+          <a:prstGeom prst="line">
+            <a:avLst/>
+          </a:prstGeom>
+          <a:ln w="19050">
+            <a:solidFill>
+              <a:schemeClr val="bg1">
+                <a:lumMod val="50000"/>
+              </a:schemeClr>
+            </a:solidFill>
+            <a:prstDash val="sysDash"/>
+          </a:ln>
+        </p:spPr>
+        <p:style>
+          <a:lnRef idx="1">
+            <a:schemeClr val="accent1"/>
+          </a:lnRef>
+          <a:fillRef idx="0">
+            <a:schemeClr val="accent1"/>
+          </a:fillRef>
+          <a:effectRef idx="0">
+            <a:schemeClr val="accent1"/>
+          </a:effectRef>
+          <a:fontRef idx="minor">
+            <a:schemeClr val="tx1"/>
+          </a:fontRef>
+        </p:style>
+      </p:cxnSp>
+      <p:sp>
+        <p:nvSpPr>
+          <p:cNvPr id="3" name="TextBox 2">
+            <a:extLst>
+              <a:ext uri="{FF2B5EF4-FFF2-40B4-BE49-F238E27FC236}">
+                <a16:creationId xmlns:a16="http://schemas.microsoft.com/office/drawing/2014/main" id="{88BB732B-99AF-21B0-EB10-A46AAD81C772}"/>
+              </a:ext>
+            </a:extLst>
+          </p:cNvPr>
+          <p:cNvSpPr txBox="1"/>
+          <p:nvPr/>
+        </p:nvSpPr>
+        <p:spPr>
+          <a:xfrm>
+            <a:off x="2809362" y="5559343"/>
+            <a:ext cx="6567054" cy="738664"/>
+          </a:xfrm>
+          <a:prstGeom prst="rect">
+            <a:avLst/>
+          </a:prstGeom>
+          <a:noFill/>
+        </p:spPr>
+        <p:txBody>
+          <a:bodyPr wrap="square" rtlCol="0">
+            <a:spAutoFit/>
+          </a:bodyPr>
+          <a:lstStyle/>
+          <a:p>
+            <a:pPr algn="ctr"/>
+            <a:r>
+              <a:rPr lang="en-US" sz="2400" dirty="0"/>
+              <a:t>This is randomly retrieving the records  </a:t>
+            </a:r>
+          </a:p>
+          <a:p>
+            <a:pPr algn="ctr"/>
+            <a:r>
+              <a:rPr lang="en-US" dirty="0"/>
+              <a:t>This reading key file</a:t>
+            </a:r>
+          </a:p>
+        </p:txBody>
+      </p:sp>
+      <p:graphicFrame>
+        <p:nvGraphicFramePr>
+          <p:cNvPr id="6" name="Chart 5">
+            <a:extLst>
+              <a:ext uri="{FF2B5EF4-FFF2-40B4-BE49-F238E27FC236}">
+                <a16:creationId xmlns:a16="http://schemas.microsoft.com/office/drawing/2014/main" id="{0B8DD9C1-F4B7-D0BC-5DE6-B2C87FA104BB}"/>
+              </a:ext>
+            </a:extLst>
+          </p:cNvPr>
+          <p:cNvGraphicFramePr>
+            <a:graphicFrameLocks/>
+          </p:cNvGraphicFramePr>
+          <p:nvPr>
+            <p:extLst>
+              <p:ext uri="{D42A27DB-BD31-4B8C-83A1-F6EECF244321}">
+                <p14:modId xmlns:p14="http://schemas.microsoft.com/office/powerpoint/2010/main" val="3393563807"/>
+              </p:ext>
+            </p:extLst>
+          </p:nvPr>
+        </p:nvGraphicFramePr>
+        <p:xfrm>
+          <a:off x="2422567" y="1365664"/>
+          <a:ext cx="7327076" cy="3959697"/>
+        </p:xfrm>
+        <a:graphic>
+          <a:graphicData uri="http://schemas.openxmlformats.org/drawingml/2006/chart">
+            <c:chart xmlns:c="http://schemas.openxmlformats.org/drawingml/2006/chart" xmlns:r="http://schemas.openxmlformats.org/officeDocument/2006/relationships" r:id="rId2"/>
+          </a:graphicData>
+        </a:graphic>
+      </p:graphicFrame>
+    </p:spTree>
+    <p:extLst>
+      <p:ext uri="{BB962C8B-B14F-4D97-AF65-F5344CB8AC3E}">
+        <p14:creationId xmlns:p14="http://schemas.microsoft.com/office/powerpoint/2010/main" val="4250569131"/>
       </p:ext>
     </p:extLst>
   </p:cSld>
@@ -18102,7 +19841,12 @@
             <p:ph idx="1"/>
           </p:nvPr>
         </p:nvSpPr>
-        <p:spPr/>
+        <p:spPr>
+          <a:xfrm>
+            <a:off x="838200" y="1635620"/>
+            <a:ext cx="10515600" cy="4351338"/>
+          </a:xfrm>
+        </p:spPr>
         <p:txBody>
           <a:bodyPr>
             <a:normAutofit/>
@@ -18110,44 +19854,39 @@
           <a:lstStyle/>
           <a:p>
             <a:r>
-              <a:rPr lang="en-US" dirty="0"/>
+              <a:rPr lang="en-US" sz="3200" dirty="0"/>
               <a:t>Simulate actual work conditions</a:t>
             </a:r>
           </a:p>
           <a:p>
             <a:r>
-              <a:rPr lang="en-US" dirty="0"/>
+              <a:rPr lang="en-US" sz="3200" dirty="0"/>
               <a:t>Fairly large amount of IO operations</a:t>
             </a:r>
           </a:p>
           <a:p>
             <a:r>
-              <a:rPr lang="en-US" dirty="0"/>
-              <a:t>Control over the record size</a:t>
+              <a:rPr lang="en-US" sz="3200" dirty="0"/>
+              <a:t>Control over the record size. </a:t>
             </a:r>
-            <a:r>
-              <a:rPr lang="en-US"/>
-              <a:t>. </a:t>
-            </a:r>
-            <a:endParaRPr lang="en-US" dirty="0"/>
           </a:p>
           <a:p>
             <a:r>
-              <a:rPr lang="en-US" dirty="0"/>
+              <a:rPr lang="en-US" sz="3200" dirty="0"/>
               <a:t>File systems on most computers are block devices.  </a:t>
             </a:r>
           </a:p>
           <a:p>
             <a:pPr lvl="1"/>
             <a:r>
-              <a:rPr lang="en-US" dirty="0"/>
+              <a:rPr lang="en-US" sz="2800" dirty="0"/>
               <a:t>Naïve: Hoped that EBS may offer some additional IO capability.</a:t>
             </a:r>
           </a:p>
           <a:p>
             <a:pPr lvl="1"/>
             <a:r>
-              <a:rPr lang="en-US" dirty="0"/>
+              <a:rPr lang="en-US" sz="2800" dirty="0"/>
               <a:t>Additionally, retrieving blocks of storage, as objects, by an identifier seems appealing.</a:t>
             </a:r>
           </a:p>
@@ -18279,7 +20018,12 @@
             <p:ph idx="1"/>
           </p:nvPr>
         </p:nvSpPr>
-        <p:spPr/>
+        <p:spPr>
+          <a:xfrm>
+            <a:off x="835089" y="1635619"/>
+            <a:ext cx="10515600" cy="4351338"/>
+          </a:xfrm>
+        </p:spPr>
         <p:txBody>
           <a:bodyPr>
             <a:normAutofit/>
@@ -18287,21 +20031,21 @@
           <a:lstStyle/>
           <a:p>
             <a:r>
-              <a:rPr lang="en-US" dirty="0"/>
+              <a:rPr lang="en-US" sz="3200" dirty="0"/>
               <a:t>List of registered voters in Harris County (obtained via FOIA request)</a:t>
             </a:r>
           </a:p>
           <a:p>
             <a:pPr lvl="1"/>
             <a:r>
-              <a:rPr lang="en-US" dirty="0"/>
+              <a:rPr lang="en-US" sz="2800" dirty="0"/>
               <a:t>2.48 Million records</a:t>
             </a:r>
           </a:p>
           <a:p>
             <a:pPr lvl="1"/>
             <a:r>
-              <a:rPr lang="en-US" dirty="0"/>
+              <a:rPr lang="en-US" sz="2800" dirty="0"/>
               <a:t>In apparent random order</a:t>
             </a:r>
           </a:p>
@@ -18311,28 +20055,28 @@
           </a:p>
           <a:p>
             <a:r>
-              <a:rPr lang="en-US" dirty="0"/>
+              <a:rPr lang="en-US" sz="3200" dirty="0"/>
               <a:t>List of voters in the county election of 2021</a:t>
             </a:r>
           </a:p>
           <a:p>
             <a:pPr lvl="1"/>
             <a:r>
-              <a:rPr lang="en-US" dirty="0"/>
+              <a:rPr lang="en-US" sz="2800" dirty="0"/>
               <a:t>In-person &amp; Mail-in voting</a:t>
             </a:r>
           </a:p>
           <a:p>
             <a:pPr lvl="1"/>
             <a:r>
-              <a:rPr lang="en-US" dirty="0"/>
+              <a:rPr lang="en-US" sz="2800" dirty="0"/>
               <a:t>Data in order of votes received (apparent random order)</a:t>
             </a:r>
           </a:p>
           <a:p>
             <a:pPr lvl="1"/>
             <a:r>
-              <a:rPr lang="en-US" dirty="0"/>
+              <a:rPr lang="en-US" sz="2800" dirty="0"/>
               <a:t>Used a sample of 215,000 of these voters.</a:t>
             </a:r>
           </a:p>
@@ -18613,7 +20357,7 @@
         <p:spPr>
           <a:xfrm>
             <a:off x="8337444" y="1359063"/>
-            <a:ext cx="2271945" cy="369332"/>
+            <a:ext cx="2271945" cy="400110"/>
           </a:xfrm>
           <a:prstGeom prst="rect">
             <a:avLst/>
@@ -18627,8 +20371,12 @@
           <a:lstStyle/>
           <a:p>
             <a:r>
+              <a:rPr lang="en-US" sz="2000" dirty="0"/>
+              <a:t>Dictionary</a:t>
+            </a:r>
+            <a:r>
               <a:rPr lang="en-US" dirty="0"/>
-              <a:t>Dictionary Entries</a:t>
+              <a:t> Entries</a:t>
             </a:r>
           </a:p>
         </p:txBody>
@@ -20810,7 +22558,7 @@
       </p:cxnSp>
       <p:graphicFrame>
         <p:nvGraphicFramePr>
-          <p:cNvPr id="3" name="Chart 2">
+          <p:cNvPr id="6" name="Chart 5">
             <a:extLst>
               <a:ext uri="{FF2B5EF4-FFF2-40B4-BE49-F238E27FC236}">
                 <a16:creationId xmlns:a16="http://schemas.microsoft.com/office/drawing/2014/main" id="{3DB1F2D7-BA63-0045-3768-D9856A54D0A3}"/>
@@ -20823,24 +22571,24 @@
           <p:nvPr>
             <p:extLst>
               <p:ext uri="{D42A27DB-BD31-4B8C-83A1-F6EECF244321}">
-                <p14:modId xmlns:p14="http://schemas.microsoft.com/office/powerpoint/2010/main" val="647681923"/>
+                <p14:modId xmlns:p14="http://schemas.microsoft.com/office/powerpoint/2010/main" val="486059058"/>
               </p:ext>
             </p:extLst>
           </p:nvPr>
         </p:nvGraphicFramePr>
         <p:xfrm>
-          <a:off x="615820" y="1686303"/>
-          <a:ext cx="5486400" cy="4572000"/>
+          <a:off x="609599" y="1686304"/>
+          <a:ext cx="5486401" cy="3614735"/>
         </p:xfrm>
         <a:graphic>
           <a:graphicData uri="http://schemas.openxmlformats.org/drawingml/2006/chart">
-            <c:chart xmlns:c="http://schemas.openxmlformats.org/drawingml/2006/chart" xmlns:r="http://schemas.openxmlformats.org/officeDocument/2006/relationships" r:id="rId2"/>
+            <c:chart xmlns:c="http://schemas.openxmlformats.org/drawingml/2006/chart" xmlns:r="http://schemas.openxmlformats.org/officeDocument/2006/relationships" r:id="rId3"/>
           </a:graphicData>
         </a:graphic>
       </p:graphicFrame>
       <p:graphicFrame>
         <p:nvGraphicFramePr>
-          <p:cNvPr id="4" name="Chart 3">
+          <p:cNvPr id="7" name="Chart 6">
             <a:extLst>
               <a:ext uri="{FF2B5EF4-FFF2-40B4-BE49-F238E27FC236}">
                 <a16:creationId xmlns:a16="http://schemas.microsoft.com/office/drawing/2014/main" id="{D89C6C12-49E3-8819-78A6-9B6998F8CFD0}"/>
@@ -20853,18 +22601,18 @@
           <p:nvPr>
             <p:extLst>
               <p:ext uri="{D42A27DB-BD31-4B8C-83A1-F6EECF244321}">
-                <p14:modId xmlns:p14="http://schemas.microsoft.com/office/powerpoint/2010/main" val="4202395464"/>
+                <p14:modId xmlns:p14="http://schemas.microsoft.com/office/powerpoint/2010/main" val="2804641899"/>
               </p:ext>
             </p:extLst>
           </p:nvPr>
         </p:nvGraphicFramePr>
         <p:xfrm>
-          <a:off x="6096001" y="1686304"/>
-          <a:ext cx="5486400" cy="4572000"/>
+          <a:off x="6096000" y="1686304"/>
+          <a:ext cx="5473959" cy="3614735"/>
         </p:xfrm>
         <a:graphic>
           <a:graphicData uri="http://schemas.openxmlformats.org/drawingml/2006/chart">
-            <c:chart xmlns:c="http://schemas.openxmlformats.org/drawingml/2006/chart" xmlns:r="http://schemas.openxmlformats.org/officeDocument/2006/relationships" r:id="rId3"/>
+            <c:chart xmlns:c="http://schemas.openxmlformats.org/drawingml/2006/chart" xmlns:r="http://schemas.openxmlformats.org/officeDocument/2006/relationships" r:id="rId4"/>
           </a:graphicData>
         </a:graphic>
       </p:graphicFrame>
@@ -20926,7 +22674,7 @@
           <a:p>
             <a:r>
               <a:rPr lang="en-US" dirty="0"/>
-              <a:t>Instance Types and Disk Types Tested</a:t>
+              <a:t>Instance Types Tested</a:t>
             </a:r>
           </a:p>
         </p:txBody>
@@ -20990,14 +22738,14 @@
           <p:nvPr>
             <p:extLst>
               <p:ext uri="{D42A27DB-BD31-4B8C-83A1-F6EECF244321}">
-                <p14:modId xmlns:p14="http://schemas.microsoft.com/office/powerpoint/2010/main" val="190651254"/>
+                <p14:modId xmlns:p14="http://schemas.microsoft.com/office/powerpoint/2010/main" val="555742764"/>
               </p:ext>
             </p:extLst>
           </p:nvPr>
         </p:nvGraphicFramePr>
         <p:xfrm>
           <a:off x="2031528" y="1722120"/>
-          <a:ext cx="8122722" cy="1706880"/>
+          <a:ext cx="9012525" cy="2133600"/>
         </p:xfrm>
         <a:graphic>
           <a:graphicData uri="http://schemas.openxmlformats.org/drawingml/2006/table">
@@ -21006,21 +22754,21 @@
                 <a:tableStyleId>{7DF18680-E054-41AD-8BC1-D1AEF772440D}</a:tableStyleId>
               </a:tblPr>
               <a:tblGrid>
-                <a:gridCol w="1688312">
+                <a:gridCol w="1873258">
                   <a:extLst>
                     <a:ext uri="{9D8B030D-6E8A-4147-A177-3AD203B41FA5}">
                       <a16:colId xmlns:a16="http://schemas.microsoft.com/office/drawing/2014/main" val="3637802696"/>
                     </a:ext>
                   </a:extLst>
                 </a:gridCol>
-                <a:gridCol w="4308727">
+                <a:gridCol w="4780726">
                   <a:extLst>
                     <a:ext uri="{9D8B030D-6E8A-4147-A177-3AD203B41FA5}">
                       <a16:colId xmlns:a16="http://schemas.microsoft.com/office/drawing/2014/main" val="2471651903"/>
                     </a:ext>
                   </a:extLst>
                 </a:gridCol>
-                <a:gridCol w="2125683">
+                <a:gridCol w="2358541">
                   <a:extLst>
                     <a:ext uri="{9D8B030D-6E8A-4147-A177-3AD203B41FA5}">
                       <a16:colId xmlns:a16="http://schemas.microsoft.com/office/drawing/2014/main" val="2856192351"/>
@@ -21128,7 +22876,7 @@
                     <a:p>
                       <a:r>
                         <a:rPr lang="en-US" sz="2200" dirty="0"/>
-                        <a:t>1 v Cores,  1 thread,1 GB , 2.5 GHz</a:t>
+                        <a:t>1 Core,  1 thread,1 GB , 2.5 GHz, 1 MB</a:t>
                       </a:r>
                     </a:p>
                   </a:txBody>
@@ -21174,7 +22922,7 @@
                     <a:p>
                       <a:r>
                         <a:rPr lang="en-US" sz="2200" dirty="0"/>
-                        <a:t>1 core, 2 threads</a:t>
+                        <a:t>1 core, 2 threads, 8 GB, 2.5 GHz, </a:t>
                       </a:r>
                     </a:p>
                   </a:txBody>
@@ -21257,6 +23005,62 @@
                 <a:extLst>
                   <a:ext uri="{0D108BD9-81ED-4DB2-BD59-A6C34878D82A}">
                     <a16:rowId xmlns:a16="http://schemas.microsoft.com/office/drawing/2014/main" val="3253797614"/>
+                  </a:ext>
+                </a:extLst>
+              </a:tr>
+              <a:tr h="370840">
+                <a:tc>
+                  <a:txBody>
+                    <a:bodyPr/>
+                    <a:lstStyle/>
+                    <a:p>
+                      <a:r>
+                        <a:rPr lang="en-US" sz="2200" dirty="0"/>
+                        <a:t>I4 </a:t>
+                      </a:r>
+                      <a:r>
+                        <a:rPr lang="en-US" sz="2200" dirty="0" err="1"/>
+                        <a:t>xlarge</a:t>
+                      </a:r>
+                      <a:endParaRPr lang="en-US" sz="2200" dirty="0"/>
+                    </a:p>
+                  </a:txBody>
+                  <a:tcPr/>
+                </a:tc>
+                <a:tc>
+                  <a:txBody>
+                    <a:bodyPr/>
+                    <a:lstStyle/>
+                    <a:p>
+                      <a:r>
+                        <a:rPr lang="en-US" sz="2200" dirty="0"/>
+                        <a:t>2 cores, 4 threads, 32 GB, 2.9 GHz</a:t>
+                      </a:r>
+                    </a:p>
+                  </a:txBody>
+                  <a:tcPr/>
+                </a:tc>
+                <a:tc>
+                  <a:txBody>
+                    <a:bodyPr/>
+                    <a:lstStyle/>
+                    <a:p>
+                      <a:r>
+                        <a:rPr lang="en-US" sz="2200" dirty="0"/>
+                        <a:t>$0.343 / </a:t>
+                      </a:r>
+                      <a:r>
+                        <a:rPr lang="en-US" sz="2200" dirty="0" err="1"/>
+                        <a:t>hr</a:t>
+                      </a:r>
+                      <a:endParaRPr lang="en-US" sz="2200" dirty="0"/>
+                    </a:p>
+                  </a:txBody>
+                  <a:tcPr/>
+                </a:tc>
+                <a:extLst>
+                  <a:ext uri="{0D108BD9-81ED-4DB2-BD59-A6C34878D82A}">
+                    <a16:rowId xmlns:a16="http://schemas.microsoft.com/office/drawing/2014/main" val="2931539327"/>
                   </a:ext>
                 </a:extLst>
               </a:tr>

</xml_diff>

<commit_message>
final updates to slides
</commit_message>
<xml_diff>
--- a/Proj_presentation.pptx
+++ b/Proj_presentation.pptx
@@ -21542,13 +21542,14 @@
           <a:p>
             <a:r>
               <a:rPr lang="en-US" dirty="0"/>
-              <a:t>Now, the reason for this is quite simple.</a:t>
+              <a:t>Taking a look at the amount of space used by each, we see S3 is much better</a:t>
             </a:r>
-          </a:p>
-          <a:p>
+            <a:br>
+              <a:rPr lang="en-US" dirty="0"/>
+            </a:br>
             <a:r>
               <a:rPr lang="en-US" dirty="0"/>
-              <a:t>The average record size is about 97 B, but in block storage, all of them are put in 128 B blocks</a:t>
+              <a:t>The reason is quite simple: The average record size is about 97 B, but in block storage, all of them are put in 128 B blocks.</a:t>
             </a:r>
           </a:p>
         </p:txBody>
@@ -21635,25 +21636,25 @@
           <a:p>
             <a:r>
               <a:rPr lang="en-US" dirty="0"/>
-              <a:t>Now, these are impressive numbers.. but not in the right way.</a:t>
+              <a:t>Anyway, we first tried to have each object be a voter record (with the filename being the voter id).</a:t>
             </a:r>
           </a:p>
           <a:p>
             <a:r>
               <a:rPr lang="en-US" dirty="0"/>
-              <a:t>As such, I tried to reduce this by reducing the number of objects.</a:t>
+              <a:t>And, well, these are impressive numbers.. but not in the right way.</a:t>
             </a:r>
           </a:p>
           <a:p>
             <a:r>
               <a:rPr lang="en-US" dirty="0"/>
-              <a:t>  That is, by increasing the number of records per object.</a:t>
+              <a:t>| As such, I tried to reduce this by reducing the number of objects (that is, by increasing the number of records per object).</a:t>
             </a:r>
           </a:p>
           <a:p>
             <a:r>
               <a:rPr lang="en-US" dirty="0"/>
-              <a:t>  For this however, we will need to also build a dictionary for each records location in the object</a:t>
+              <a:t>For this however, we will need to also build a dictionary for each record’s location within the objects.</a:t>
             </a:r>
           </a:p>
         </p:txBody>
@@ -21740,14 +21741,25 @@
           <a:p>
             <a:r>
               <a:rPr lang="en-US" dirty="0"/>
-              <a:t>Between 1, 10, and 100, relatively speaking, there does not appear to be a huge difference.</a:t>
+              <a:t>Put simply, this dictionary refers to the object and line number to find the exact record in the S3 bucket.</a:t>
             </a:r>
           </a:p>
           <a:p>
             <a:r>
               <a:rPr lang="en-US" dirty="0"/>
-              <a:t>One might hope that it’s because it grows logarithmically, but once we get 1000 objects, such hopes are no longer plausible.</a:t>
+              <a:t>Additionally, we ended up using </a:t>
             </a:r>
+            <a:r>
+              <a:rPr lang="en-US" dirty="0" err="1"/>
+              <a:t>linecache</a:t>
+            </a:r>
+            <a:r>
+              <a:rPr lang="en-US" dirty="0"/>
+              <a:t> to improve random access of a line in a downloaded object.</a:t>
+            </a:r>
+          </a:p>
+          <a:p>
+            <a:endParaRPr lang="en-US" dirty="0"/>
           </a:p>
         </p:txBody>
       </p:sp>
@@ -21768,7 +21780,7 @@
           <a:p>
             <a:fld id="{1BFF8EC0-4E85-4B5B-B1AE-D39CEADE6519}" type="slidenum">
               <a:rPr lang="en-US" smtClean="0"/>
-              <a:t>20</a:t>
+              <a:t>19</a:t>
             </a:fld>
             <a:endParaRPr lang="en-US"/>
           </a:p>
@@ -21777,7 +21789,7 @@
     </p:spTree>
     <p:extLst>
       <p:ext uri="{BB962C8B-B14F-4D97-AF65-F5344CB8AC3E}">
-        <p14:creationId xmlns:p14="http://schemas.microsoft.com/office/powerpoint/2010/main" val="1909008404"/>
+        <p14:creationId xmlns:p14="http://schemas.microsoft.com/office/powerpoint/2010/main" val="2977702774"/>
       </p:ext>
     </p:extLst>
   </p:cSld>
@@ -21833,22 +21845,39 @@
           <a:p>
             <a:r>
               <a:rPr lang="en-US" dirty="0"/>
-              <a:t>However, that is not actually the true amount of time that it takes.</a:t>
+              <a:t>Between 1, 10, and 100, relatively speaking, there does not appear to be a huge difference.</a:t>
             </a:r>
           </a:p>
           <a:p>
             <a:r>
               <a:rPr lang="en-US" dirty="0"/>
-              <a:t>The actual time instead in the 100s of seconds, with the average build time and read time being multiplied by 28 and 14, respectively.</a:t>
+              <a:t>One might hope that it’s because It grows logarithmically, but once we get 1000 objects, such hopes are no longer plausible.</a:t>
             </a:r>
           </a:p>
           <a:p>
             <a:endParaRPr lang="en-US" dirty="0"/>
           </a:p>
           <a:p>
+            <a:pPr marL="0" marR="0" lvl="0" indent="0" algn="l" defTabSz="914400" rtl="0" eaLnBrk="1" fontAlgn="auto" latinLnBrk="0" hangingPunct="1">
+              <a:lnSpc>
+                <a:spcPct val="100000"/>
+              </a:lnSpc>
+              <a:spcBef>
+                <a:spcPts val="0"/>
+              </a:spcBef>
+              <a:spcAft>
+                <a:spcPts val="0"/>
+              </a:spcAft>
+              <a:buClrTx/>
+              <a:buSzTx/>
+              <a:buFontTx/>
+              <a:buNone/>
+              <a:tabLst/>
+              <a:defRPr/>
+            </a:pPr>
             <a:r>
               <a:rPr lang="en-US" dirty="0"/>
-              <a:t>Now, all this time is the time it spends waiting. That is, for the S3 objects it requested.</a:t>
+              <a:t>However, this is not actually the true amount of time that it takes.</a:t>
             </a:r>
           </a:p>
         </p:txBody>
@@ -21870,7 +21899,7 @@
           <a:p>
             <a:fld id="{1BFF8EC0-4E85-4B5B-B1AE-D39CEADE6519}" type="slidenum">
               <a:rPr lang="en-US" smtClean="0"/>
-              <a:t>21</a:t>
+              <a:t>20</a:t>
             </a:fld>
             <a:endParaRPr lang="en-US"/>
           </a:p>
@@ -21879,7 +21908,7 @@
     </p:spTree>
     <p:extLst>
       <p:ext uri="{BB962C8B-B14F-4D97-AF65-F5344CB8AC3E}">
-        <p14:creationId xmlns:p14="http://schemas.microsoft.com/office/powerpoint/2010/main" val="3178812513"/>
+        <p14:creationId xmlns:p14="http://schemas.microsoft.com/office/powerpoint/2010/main" val="1909008404"/>
       </p:ext>
     </p:extLst>
   </p:cSld>
@@ -21935,7 +21964,119 @@
           <a:p>
             <a:r>
               <a:rPr lang="en-US" dirty="0"/>
-              <a:t>If time permits: &gt; Now, it gets worse.</a:t>
+              <a:t>The actual time is instead in the 100s of seconds, with the average build time and read time being multiplied by 28 and 14, respectively.</a:t>
+            </a:r>
+          </a:p>
+          <a:p>
+            <a:endParaRPr lang="en-US" dirty="0"/>
+          </a:p>
+          <a:p>
+            <a:r>
+              <a:rPr lang="en-US" dirty="0"/>
+              <a:t>Now, all this additional time is the time it spends waiting for the S3 objects it requested.</a:t>
+            </a:r>
+          </a:p>
+        </p:txBody>
+      </p:sp>
+      <p:sp>
+        <p:nvSpPr>
+          <p:cNvPr id="4" name="Slide Number Placeholder 3"/>
+          <p:cNvSpPr>
+            <a:spLocks noGrp="1"/>
+          </p:cNvSpPr>
+          <p:nvPr>
+            <p:ph type="sldNum" sz="quarter" idx="5"/>
+          </p:nvPr>
+        </p:nvSpPr>
+        <p:spPr/>
+        <p:txBody>
+          <a:bodyPr/>
+          <a:lstStyle/>
+          <a:p>
+            <a:fld id="{1BFF8EC0-4E85-4B5B-B1AE-D39CEADE6519}" type="slidenum">
+              <a:rPr lang="en-US" smtClean="0"/>
+              <a:t>21</a:t>
+            </a:fld>
+            <a:endParaRPr lang="en-US"/>
+          </a:p>
+        </p:txBody>
+      </p:sp>
+    </p:spTree>
+    <p:extLst>
+      <p:ext uri="{BB962C8B-B14F-4D97-AF65-F5344CB8AC3E}">
+        <p14:creationId xmlns:p14="http://schemas.microsoft.com/office/powerpoint/2010/main" val="3178812513"/>
+      </p:ext>
+    </p:extLst>
+  </p:cSld>
+  <p:clrMapOvr>
+    <a:masterClrMapping/>
+  </p:clrMapOvr>
+</p:notes>
+</file>
+
+<file path=ppt/notesSlides/notesSlide16.xml><?xml version="1.0" encoding="utf-8"?>
+<p:notes xmlns:a="http://schemas.openxmlformats.org/drawingml/2006/main" xmlns:r="http://schemas.openxmlformats.org/officeDocument/2006/relationships" xmlns:p="http://schemas.openxmlformats.org/presentationml/2006/main">
+  <p:cSld>
+    <p:spTree>
+      <p:nvGrpSpPr>
+        <p:cNvPr id="1" name=""/>
+        <p:cNvGrpSpPr/>
+        <p:nvPr/>
+      </p:nvGrpSpPr>
+      <p:grpSpPr>
+        <a:xfrm>
+          <a:off x="0" y="0"/>
+          <a:ext cx="0" cy="0"/>
+          <a:chOff x="0" y="0"/>
+          <a:chExt cx="0" cy="0"/>
+        </a:xfrm>
+      </p:grpSpPr>
+      <p:sp>
+        <p:nvSpPr>
+          <p:cNvPr id="2" name="Slide Image Placeholder 1"/>
+          <p:cNvSpPr>
+            <a:spLocks noGrp="1" noRot="1" noChangeAspect="1"/>
+          </p:cNvSpPr>
+          <p:nvPr>
+            <p:ph type="sldImg"/>
+          </p:nvPr>
+        </p:nvSpPr>
+        <p:spPr/>
+      </p:sp>
+      <p:sp>
+        <p:nvSpPr>
+          <p:cNvPr id="3" name="Notes Placeholder 2"/>
+          <p:cNvSpPr>
+            <a:spLocks noGrp="1"/>
+          </p:cNvSpPr>
+          <p:nvPr>
+            <p:ph type="body" idx="1"/>
+          </p:nvPr>
+        </p:nvSpPr>
+        <p:spPr/>
+        <p:txBody>
+          <a:bodyPr/>
+          <a:lstStyle/>
+          <a:p>
+            <a:r>
+              <a:rPr lang="en-US" b="0" dirty="0"/>
+              <a:t>Overall, the challenges with S3 were due to the time it took. </a:t>
+            </a:r>
+          </a:p>
+          <a:p>
+            <a:r>
+              <a:rPr lang="en-US" b="0" dirty="0"/>
+              <a:t>And because of the difference between process time and actual time, I’ve had the EC2 instance kill itself multiple times, whereas my laptop works fine.</a:t>
+            </a:r>
+          </a:p>
+          <a:p>
+            <a:r>
+              <a:rPr lang="en-US" b="1" dirty="0"/>
+              <a:t>If time permits: </a:t>
+            </a:r>
+            <a:r>
+              <a:rPr lang="en-US" dirty="0"/>
+              <a:t>&gt; Now, it gets worse.</a:t>
             </a:r>
           </a:p>
           <a:p>
@@ -22000,7 +22141,7 @@
 </p:notes>
 </file>
 
-<file path=ppt/notesSlides/notesSlide16.xml><?xml version="1.0" encoding="utf-8"?>
+<file path=ppt/notesSlides/notesSlide17.xml><?xml version="1.0" encoding="utf-8"?>
 <p:notes xmlns:a="http://schemas.openxmlformats.org/drawingml/2006/main" xmlns:r="http://schemas.openxmlformats.org/officeDocument/2006/relationships" xmlns:p="http://schemas.openxmlformats.org/presentationml/2006/main">
   <p:cSld>
     <p:spTree>
@@ -22800,7 +22941,22 @@
           <a:p>
             <a:r>
               <a:rPr lang="en-US" dirty="0"/>
-              <a:t>"So, we decided to test it out and check its time performance"</a:t>
+              <a:t>Alright, so S3 as we know is scalable, highly available, absurdly durable, can be used for any type of data, and can store a lot.</a:t>
+            </a:r>
+          </a:p>
+          <a:p>
+            <a:r>
+              <a:rPr lang="en-US" dirty="0"/>
+              <a:t>Furthermore, it is used by millions of businesses and organizations worldwide</a:t>
+            </a:r>
+          </a:p>
+          <a:p>
+            <a:endParaRPr lang="en-US" dirty="0"/>
+          </a:p>
+          <a:p>
+            <a:r>
+              <a:rPr lang="en-US" dirty="0"/>
+              <a:t>So, we decided to test it out and check its performance.</a:t>
             </a:r>
           </a:p>
         </p:txBody>
@@ -32067,7 +32223,7 @@
           <a:p>
             <a:r>
               <a:rPr lang="en-US" dirty="0"/>
-              <a:t>Time performance not meant for many operations</a:t>
+              <a:t>Time performance not meant for many operations at a time</a:t>
             </a:r>
           </a:p>
           <a:p>
@@ -32194,24 +32350,36 @@
           </a:bodyPr>
           <a:lstStyle/>
           <a:p>
+            <a:pPr>
+              <a:spcAft>
+                <a:spcPts val="600"/>
+              </a:spcAft>
+            </a:pPr>
             <a:r>
               <a:rPr lang="en-US" dirty="0"/>
-              <a:t>We didn’t see a lot of difference in the GP2 GP3 and IO2 disks.  The disks used in the “I” family are faster.  </a:t>
+              <a:t>We didn’t see a lot of difference in the GP2 GP3 and IO2 disks.  The disks used in the “I” family are faster. </a:t>
             </a:r>
           </a:p>
           <a:p>
+            <a:pPr>
+              <a:spcAft>
+                <a:spcPts val="600"/>
+              </a:spcAft>
+            </a:pPr>
+            <a:r>
+              <a:rPr lang="en-US" dirty="0"/>
+              <a:t>S3 is not suitable for random access.</a:t>
+            </a:r>
+          </a:p>
+          <a:p>
+            <a:pPr>
+              <a:spcAft>
+                <a:spcPts val="600"/>
+              </a:spcAft>
+            </a:pPr>
             <a:r>
               <a:rPr lang="en-US" dirty="0"/>
               <a:t>The expense is non-trivial.  Daily use for a single user would rival or surpass purchase of a desktop computer, of course the cloud instance is automatically upgradable without capital investment.</a:t>
-            </a:r>
-          </a:p>
-          <a:p>
-            <a:endParaRPr lang="en-US" dirty="0"/>
-          </a:p>
-          <a:p>
-            <a:r>
-              <a:rPr lang="en-US" dirty="0"/>
-              <a:t>S3 is not suitable for random access, even if all records requested are locally stored.</a:t>
             </a:r>
           </a:p>
         </p:txBody>
@@ -32539,27 +32707,44 @@
           <a:bodyPr/>
           <a:lstStyle/>
           <a:p>
+            <a:pPr>
+              <a:spcAft>
+                <a:spcPts val="600"/>
+              </a:spcAft>
+            </a:pPr>
             <a:r>
               <a:rPr lang="en-US" dirty="0"/>
               <a:t>Glenn – Program Architecture – rough draft – ran EC2 experiments</a:t>
             </a:r>
           </a:p>
           <a:p>
+            <a:pPr>
+              <a:spcAft>
+                <a:spcPts val="600"/>
+              </a:spcAft>
+            </a:pPr>
             <a:r>
               <a:rPr lang="en-US" dirty="0"/>
               <a:t>Daniel – Program Refactoring – made Separate Program with streamlined Architecture for S3 – ran S3 experiments</a:t>
             </a:r>
           </a:p>
           <a:p>
-            <a:endParaRPr lang="en-US" dirty="0"/>
-          </a:p>
-          <a:p>
+            <a:pPr>
+              <a:spcAft>
+                <a:spcPts val="600"/>
+              </a:spcAft>
+            </a:pPr>
             <a:r>
               <a:rPr lang="en-US" dirty="0"/>
               <a:t>Both contributed to the slides for this presentation</a:t>
             </a:r>
           </a:p>
           <a:p>
+            <a:pPr>
+              <a:spcAft>
+                <a:spcPts val="600"/>
+              </a:spcAft>
+            </a:pPr>
             <a:endParaRPr lang="en-US" dirty="0"/>
           </a:p>
         </p:txBody>

</xml_diff>